<commit_message>
Transform intro content to PowerPoint presentation
- Created presentations/powerpoint/intro-presentation.pptx with 35 slides
- Analyzed VanillaCore.pptx template with 14 available layouts
- Applied proper layout mapping: Title Slide, Section Headers, Bullet Content
- Professional slide titles on every slide without empty placeholders
- Transferred speaker notes from markdown to PowerPoint notes sections
- 6 section headers for clear topic transitions
- Content covers workshop expectations, architecture, clean code, DDD, patterns
- Version bumped to 1.9.0 with comprehensive changelog entry
</commit_message>
<xml_diff>
--- a/presentations/powerpoint/intro-presentation.pptx
+++ b/presentations/powerpoint/intro-presentation.pptx
@@ -40,38 +40,6 @@
     <p:sldId id="288" r:id="rId39"/>
     <p:sldId id="289" r:id="rId40"/>
     <p:sldId id="290" r:id="rId41"/>
-    <p:sldId id="291" r:id="rId42"/>
-    <p:sldId id="292" r:id="rId43"/>
-    <p:sldId id="293" r:id="rId44"/>
-    <p:sldId id="294" r:id="rId45"/>
-    <p:sldId id="295" r:id="rId46"/>
-    <p:sldId id="296" r:id="rId47"/>
-    <p:sldId id="297" r:id="rId48"/>
-    <p:sldId id="298" r:id="rId49"/>
-    <p:sldId id="299" r:id="rId50"/>
-    <p:sldId id="300" r:id="rId51"/>
-    <p:sldId id="301" r:id="rId52"/>
-    <p:sldId id="302" r:id="rId53"/>
-    <p:sldId id="303" r:id="rId54"/>
-    <p:sldId id="304" r:id="rId55"/>
-    <p:sldId id="305" r:id="rId56"/>
-    <p:sldId id="306" r:id="rId57"/>
-    <p:sldId id="307" r:id="rId58"/>
-    <p:sldId id="308" r:id="rId59"/>
-    <p:sldId id="309" r:id="rId60"/>
-    <p:sldId id="310" r:id="rId61"/>
-    <p:sldId id="311" r:id="rId62"/>
-    <p:sldId id="312" r:id="rId63"/>
-    <p:sldId id="313" r:id="rId64"/>
-    <p:sldId id="314" r:id="rId65"/>
-    <p:sldId id="315" r:id="rId66"/>
-    <p:sldId id="316" r:id="rId67"/>
-    <p:sldId id="317" r:id="rId68"/>
-    <p:sldId id="318" r:id="rId69"/>
-    <p:sldId id="319" r:id="rId70"/>
-    <p:sldId id="320" r:id="rId71"/>
-    <p:sldId id="321" r:id="rId72"/>
-    <p:sldId id="322" r:id="rId73"/>
   </p:sldIdLst>
   <p:sldSz cx="12192000" cy="6858000"/>
   <p:notesSz cx="6858000" cy="9144000"/>
@@ -643,7 +611,7 @@
           <a:lstStyle/>
           <a:p>
             <a:r>
-              <a:t>Diese Definitionen zeigen verschiedene Perspektiven auf Software-Architektur. Gemeinsame Erkenntnisse: Struktur (Organisation der Software), Entscheidungen (wichtige Design-Entscheidungen), Beziehungen (Zusammenhänge), Kosten (spätere Änderbarkeit), Kommunikation (Vermittlung des Designs).</a:t>
+              <a:t>Diese Definition betont sowohl technische Aspekte (Struktur, Verhalten) als auch fachliche Ziele. Architektur ist nicht nur Technik - sie muss Geschäftsziele verstehen und unterstützen.</a:t>
             </a:r>
           </a:p>
         </p:txBody>
@@ -713,7 +681,7 @@
           <a:lstStyle/>
           <a:p>
             <a:r>
-              <a:t>Diese Definition betont sowohl technische Aspekte (Struktur, Verhalten) als auch fachliche Ziele. Architektur ist nicht nur Technik - sie muss Geschäftsziele verstehen und unterstützen.</a:t>
+              <a:t>Enterprise-Herausforderungen: Modernisierung bei laufendem Betrieb, Compliance und Governance, Performance bei hoher Last, Kostenoptimierung bei gleichzeitig hoher Qualität. Integration von Dutzenden von Systemen.</a:t>
             </a:r>
           </a:p>
         </p:txBody>
@@ -783,7 +751,7 @@
           <a:lstStyle/>
           <a:p>
             <a:r>
-              <a:t>Enterprise-Herausforderungen: Modernisierung bei laufendem Betrieb, Compliance und Governance, Performance bei hoher Last, Kostenoptimierung bei gleichzeitig hoher Qualität. Integration von Dutzenden von Systemen.</a:t>
+              <a:t>Clean Code Definition nach Robert C. Martin: "Code that has been taken care of." 80% der Zeit wird Code gelesen, nur 20% geschrieben. Wartbarkeit ist wichtiger als Cleverness.</a:t>
             </a:r>
           </a:p>
         </p:txBody>
@@ -853,7 +821,7 @@
           <a:lstStyle/>
           <a:p>
             <a:r>
-              <a:t>Clean Code Definition nach Robert C. Martin: "Code that has been taken care of." 80% der Zeit wird Code gelesen, nur 20% geschrieben. Wartbarkeit ist wichtiger als Cleverness.</a:t>
+              <a:t>Legacy-Systeme mit Millionen Zeilen undokumentiertem Code verursachen hohe Wartungskosten, weil jede kleine Änderung Wochen dauert und risikoreich ist. Clean Code ist eine Investition in die Zukunft.</a:t>
             </a:r>
           </a:p>
         </p:txBody>
@@ -923,7 +891,7 @@
           <a:lstStyle/>
           <a:p>
             <a:r>
-              <a:t>Legacy-Systeme mit Millionen Zeilen undokumentiertem Code verursachen hohe Wartungskosten, weil jede kleine Änderung Wochen dauert und risikoreich ist. Clean Code ist eine Investition in die Zukunft.</a:t>
+              <a:t>Praktische Auswirkungen: Zinsen (jede Änderung dauert länger), Hauptsumme (Aufwand für Refactoring), Insolvenz (System nicht mehr wartbar). Schulden-Management: Sichtbar machen, priorisieren, kontinuierlich abbauen.</a:t>
             </a:r>
           </a:p>
         </p:txBody>
@@ -993,7 +961,7 @@
           <a:lstStyle/>
           <a:p>
             <a:r>
-              <a:t>Praktische Auswirkungen: Zinsen (jede Änderung dauert länger), Hauptsumme (Aufwand für Refactoring), Insolvenz (System nicht mehr wartbar). Schulden-Management: Sichtbar machen, priorisieren, kontinuierlich abbauen.</a:t>
+              <a:t>Technology-First Symptome: Hype-Driven Development, Solution looking for a problem, Architecture Astronauts, Over-Engineering. Warum passiert das? Techniker denken technisch, Marketing macht Technologie sexy, CV-Driven Development, Komplexität wirkt professionell.</a:t>
             </a:r>
           </a:p>
         </p:txBody>
@@ -1063,7 +1031,7 @@
           <a:lstStyle/>
           <a:p>
             <a:r>
-              <a:t>Technology-First Symptome: Hype-Driven Development, Solution looking for a problem, Architecture Astronauts, Over-Engineering. Warum passiert das? Techniker denken technisch, Marketing macht Technologie sexy, CV-Driven Development, Komplexität wirkt professionell.</a:t>
+              <a:t>Das Grundproblem: Es gab KEIN fachliches Problem, das diese Technologien gelöst hätten. Finanzdaten sind RELATIONAL - NoSQL passte nicht zur Fachlichkeit.</a:t>
             </a:r>
           </a:p>
         </p:txBody>
@@ -1133,7 +1101,7 @@
           <a:lstStyle/>
           <a:p>
             <a:r>
-              <a:t>Das Grundproblem: Es gab KEIN fachliches Problem, das diese Technologien gelöst hätten. Finanzdaten sind RELATIONAL - NoSQL passte nicht zur Fachlichkeit.</a:t>
+              <a:t>DDD-Grundgedanke nach Eric Evans: "The heart of software is its ability to solve domain-related problems for its user. All other concerns should be subordinated." Technology-First führt zu Over-Engineering und unpassenden Lösungen.</a:t>
             </a:r>
           </a:p>
         </p:txBody>
@@ -1203,7 +1171,7 @@
           <a:lstStyle/>
           <a:p>
             <a:r>
-              <a:t>DDD-Grundgedanke nach Eric Evans: "The heart of software is its ability to solve domain-related problems for its user. All other concerns should be subordinated." Technology-First führt zu Over-Engineering und unpassenden Lösungen.</a:t>
+              <a:t>Warnsignale für Technology-First: "Das ist modern/trendy", "Das macht Netflix auch", "Das steht in meinem Lebenslauf gut". Die richtigen Fragen: "Welches fachliche Problem löst das?", "Was sind unsere spezifischen Anforderungen?"</a:t>
             </a:r>
           </a:p>
         </p:txBody>
@@ -1273,7 +1241,7 @@
           <a:lstStyle/>
           <a:p>
             <a:r>
-              <a:t>Warnsignale für Technology-First: "Das ist modern/trendy", "Das macht Netflix auch", "Das steht in meinem Lebenslauf gut". Die richtigen Fragen: "Welches fachliche Problem löst das?", "Was sind unsere spezifischen Anforderungen?"</a:t>
+              <a:t>Alexanders Erkenntnis: "Each pattern describes a problem which occurs over and over again, and then describes the core of the solution." GoF erkannten: Erfahrene Entwickler nutzen bewährte Lösungen, wiederkehrende Probleme haben wiederkehrende Lösungen.</a:t>
             </a:r>
           </a:p>
         </p:txBody>
@@ -1413,7 +1381,7 @@
           <a:lstStyle/>
           <a:p>
             <a:r>
-              <a:t>Alexanders Erkenntnis: "Each pattern describes a problem which occurs over and over again, and then describes the core of the solution." GoF erkannten: Erfahrene Entwickler nutzen bewährte Lösungen, wiederkehrende Probleme haben wiederkehrende Lösungen.</a:t>
+              <a:t>Kommunikationsverbesserung: Vorher: "Wir brauchen eine Klasse, die andere Klassen erzeugt..." Nachher: "Wir nutzen Factory Pattern". Team-Kommunikation wird effizienter, neue Teammitglieder verstehen Design schneller.</a:t>
             </a:r>
           </a:p>
         </p:txBody>
@@ -1483,7 +1451,7 @@
           <a:lstStyle/>
           <a:p>
             <a:r>
-              <a:t>Kommunikationsverbesserung: Vorher: "Wir brauchen eine Klasse, die andere Klassen erzeugt..." Nachher: "Wir nutzen Factory Pattern". Team-Kommunikation wird effizienter, neue Teammitglieder verstehen Design schneller.</a:t>
+              <a:t>Golden Hammer vermeiden: "Ich habe einen Hammer, alles sieht aus wie ein Nagel". Pattern Overload: 20 Patterns für 5 Klassen. Wichtige Fragen: Haben wir wirklich das Problem? Ist es komplex genug für ein Pattern?</a:t>
             </a:r>
           </a:p>
         </p:txBody>
@@ -1553,7 +1521,7 @@
           <a:lstStyle/>
           <a:p>
             <a:r>
-              <a:t>Golden Hammer vermeiden: "Ich habe einen Hammer, alles sieht aus wie ein Nagel". Pattern Overload: 20 Patterns für 5 Klassen. Wichtige Fragen: Haben wir wirklich das Problem? Ist es komplex genug für ein Pattern?</a:t>
+              <a:t>Was Refactoring NICHT ist: Bugfixes, neue Features, Performance-Optimierung, Rewrite. Refactoring ist kontinuierlich, nicht ein einmaliges Event.</a:t>
             </a:r>
           </a:p>
         </p:txBody>
@@ -1623,7 +1591,7 @@
           <a:lstStyle/>
           <a:p>
             <a:r>
-              <a:t>Was Refactoring NICHT ist: Bugfixes, neue Features, Performance-Optimierung, Rewrite. Refactoring ist kontinuierlich, nicht ein einmaliges Event.</a:t>
+              <a:t>Boy Scout Aktionen: temp → elapsedTimeInDays, 7 → DAYS_PER_WEEK, Duplicate Code extrahieren, Unused Code entfernen, Kommentare durch self-documenting code ersetzen.</a:t>
             </a:r>
           </a:p>
         </p:txBody>
@@ -1693,7 +1661,7 @@
           <a:lstStyle/>
           <a:p>
             <a:r>
-              <a:t>Boy Scout Aktionen: temp → elapsedTimeInDays, 7 → DAYS_PER_WEEK, Duplicate Code extrahieren, Unused Code entfernen, Kommentare durch self-documenting code ersetzen.</a:t>
+              <a:t>Gute Refactoring-Zeitpunkte: Sprint Planning, Bug-Fixing mit Boy Scout Rule, Code Reviews, Technische Stories. "Make the change easy, then make the easy change."</a:t>
             </a:r>
           </a:p>
         </p:txBody>
@@ -1763,7 +1731,7 @@
           <a:lstStyle/>
           <a:p>
             <a:r>
-              <a:t>Gute Refactoring-Zeitpunkte: Sprint Planning, Bug-Fixing mit Boy Scout Rule, Code Reviews, Technische Stories. "Make the change easy, then make the easy change."</a:t>
+              <a:t>Häufige Refactoring-Patterns: Extract Method (Long Method aufteilen), Replace Magic Number with Named Constant. Enterprise-Kontext: Legacy Systems extra vorsichtig, Live Systems graduelle Änderungen.</a:t>
             </a:r>
           </a:p>
         </p:txBody>
@@ -1833,7 +1801,7 @@
           <a:lstStyle/>
           <a:p>
             <a:r>
-              <a:t>Häufige Refactoring-Patterns: Extract Method (Long Method aufteilen), Replace Magic Number with Named Constant. Enterprise-Kontext: Legacy Systems extra vorsichtig, Live Systems graduelle Änderungen.</a:t>
+              <a:t>Beispiel Strategy Pattern: Ein if-else → zweites if-else → Duplikation reduzieren → drittes ähnliches Pattern → "Das ist Strategy Pattern!" → Refactoring zu Strategy Pattern. Tests sind essenziell für sicheres Refactoring.</a:t>
             </a:r>
           </a:p>
         </p:txBody>
@@ -1903,76 +1871,6 @@
           <a:lstStyle/>
           <a:p>
             <a:r>
-              <a:t>Beispiel Strategy Pattern: Ein if-else → zweites if-else → Duplikation reduzieren → drittes ähnliches Pattern → "Das ist Strategy Pattern!" → Refactoring zu Strategy Pattern. Tests sind essenziell für sicheres Refactoring.</a:t>
-            </a:r>
-          </a:p>
-        </p:txBody>
-      </p:sp>
-      <p:sp>
-        <p:nvSpPr>
-          <p:cNvPr id="4" name="Slide Number Placeholder 3"/>
-          <p:cNvSpPr>
-            <a:spLocks noGrp="1"/>
-          </p:cNvSpPr>
-          <p:nvPr>
-            <p:ph type="sldNum" idx="5" sz="quarter"/>
-          </p:nvPr>
-        </p:nvSpPr>
-        <p:spPr/>
-      </p:sp>
-    </p:spTree>
-  </p:cSld>
-  <p:clrMapOvr>
-    <a:masterClrMapping/>
-  </p:clrMapOvr>
-</p:notes>
-</file>
-
-<file path=ppt/notesSlides/notesSlide28.xml><?xml version="1.0" encoding="utf-8"?>
-<p:notes xmlns:a="http://schemas.openxmlformats.org/drawingml/2006/main" xmlns:p="http://schemas.openxmlformats.org/presentationml/2006/main" xmlns:r="http://schemas.openxmlformats.org/officeDocument/2006/relationships">
-  <p:cSld>
-    <p:spTree>
-      <p:nvGrpSpPr>
-        <p:cNvPr id="1" name=""/>
-        <p:cNvGrpSpPr/>
-        <p:nvPr/>
-      </p:nvGrpSpPr>
-      <p:grpSpPr>
-        <a:xfrm>
-          <a:off x="0" y="0"/>
-          <a:ext cx="0" cy="0"/>
-          <a:chOff x="0" y="0"/>
-          <a:chExt cx="0" cy="0"/>
-        </a:xfrm>
-      </p:grpSpPr>
-      <p:sp>
-        <p:nvSpPr>
-          <p:cNvPr id="2" name="Slide Image Placeholder 1"/>
-          <p:cNvSpPr>
-            <a:spLocks noGrp="1"/>
-          </p:cNvSpPr>
-          <p:nvPr>
-            <p:ph type="sldImg" idx="2"/>
-          </p:nvPr>
-        </p:nvSpPr>
-        <p:spPr/>
-      </p:sp>
-      <p:sp>
-        <p:nvSpPr>
-          <p:cNvPr id="3" name="Notes Placeholder 2"/>
-          <p:cNvSpPr>
-            <a:spLocks noGrp="1"/>
-          </p:cNvSpPr>
-          <p:nvPr>
-            <p:ph type="body" idx="3" sz="quarter"/>
-          </p:nvPr>
-        </p:nvSpPr>
-        <p:spPr/>
-        <p:txBody>
-          <a:bodyPr/>
-          <a:lstStyle/>
-          <a:p>
-            <a:r>
               <a:t>Lassen Sie jeden Teilnehmer sein Ziel formulieren - wir kommen am Ende darauf zurück! Mit diesem Refactoring-Mindset sind wir bereit - wir wissen jetzt, dass wir Patterns durch evolutionäre Verbesserung entdecken.</a:t>
             </a:r>
           </a:p>
@@ -2393,7 +2291,7 @@
           <a:lstStyle/>
           <a:p>
             <a:r>
-              <a:t>Was wir bereitstellen: Vollständige Code-Beispiele für alle Patterns, Enterprise-typische Use Cases, Refactoring-Challenges, Pattern-Spickzettel als Nachschlagewerk.</a:t>
+              <a:t>Diese Regeln fördern aktive Teilnahme und effektiven Wissensaustausch. Der Workshop lebt von Interaktion und praktischen Diskussionen.</a:t>
             </a:r>
           </a:p>
         </p:txBody>
@@ -2463,7 +2361,7 @@
           <a:lstStyle/>
           <a:p>
             <a:r>
-              <a:t>Diese Regeln fördern aktive Teilnahme und effektiven Wissensaustausch. Der Workshop lebt von Interaktion und praktischen Diskussionen.</a:t>
+              <a:t>Diese Definitionen zeigen verschiedene Perspektiven auf Software-Architektur. Gemeinsame Erkenntnisse: Struktur (Organisation der Software), Entscheidungen (wichtige Design-Entscheidungen), Beziehungen (Zusammenhänge), Kosten (spätere Änderbarkeit), Kommunikation (Vermittlung des Designs).</a:t>
             </a:r>
           </a:p>
         </p:txBody>
@@ -6654,7 +6552,11 @@
         <p:txBody>
           <a:bodyPr/>
           <a:lstStyle/>
-          <a:p/>
+          <a:p>
+            <a:r>
+              <a:t>Design Patterns Workshop</a:t>
+            </a:r>
+          </a:p>
         </p:txBody>
       </p:sp>
       <p:sp>
@@ -6671,7 +6573,11 @@
         <p:txBody>
           <a:bodyPr/>
           <a:lstStyle/>
-          <a:p/>
+          <a:p>
+            <a:r>
+              <a:t>Einführungsblock</a:t>
+            </a:r>
+          </a:p>
         </p:txBody>
       </p:sp>
     </p:spTree>
@@ -6699,31 +6605,100 @@
             <a:spLocks noGrp="1"/>
           </p:cNvSpPr>
           <p:nvPr>
-            <p:ph type="ctrTitle"/>
-          </p:nvPr>
-        </p:nvSpPr>
-        <p:spPr/>
-        <p:txBody>
-          <a:bodyPr/>
-          <a:lstStyle/>
-          <a:p/>
-        </p:txBody>
-      </p:sp>
-      <p:sp>
-        <p:nvSpPr>
-          <p:cNvPr id="3" name="Subtitle 2"/>
-          <p:cNvSpPr>
-            <a:spLocks noGrp="1"/>
-          </p:cNvSpPr>
-          <p:nvPr>
-            <p:ph type="subTitle" idx="1"/>
-          </p:nvPr>
-        </p:nvSpPr>
-        <p:spPr/>
-        <p:txBody>
-          <a:bodyPr/>
-          <a:lstStyle/>
-          <a:p/>
+            <p:ph type="title"/>
+          </p:nvPr>
+        </p:nvSpPr>
+        <p:spPr/>
+        <p:txBody>
+          <a:bodyPr/>
+          <a:lstStyle/>
+          <a:p>
+            <a:r>
+              <a:t>Praktische Organisation</a:t>
+            </a:r>
+          </a:p>
+        </p:txBody>
+      </p:sp>
+      <p:sp>
+        <p:nvSpPr>
+          <p:cNvPr id="3" name="Content Placeholder 2"/>
+          <p:cNvSpPr>
+            <a:spLocks noGrp="1"/>
+          </p:cNvSpPr>
+          <p:nvPr>
+            <p:ph idx="1" sz="half"/>
+          </p:nvPr>
+        </p:nvSpPr>
+        <p:spPr/>
+        <p:txBody>
+          <a:bodyPr/>
+          <a:lstStyle/>
+          <a:p>
+            <a:r>
+              <a:t>Was Sie mitbringen sollten:</a:t>
+            </a:r>
+          </a:p>
+          <a:p>
+            <a:r>
+              <a:t>Laptop mit Java 11+ und IDE (IntelliJ/Eclipse)</a:t>
+            </a:r>
+          </a:p>
+          <a:p>
+            <a:r>
+              <a:t>Git für Code-Austausch</a:t>
+            </a:r>
+          </a:p>
+          <a:p>
+            <a:r>
+              <a:t>Offenheit für neue Perspektiven</a:t>
+            </a:r>
+          </a:p>
+          <a:p>
+            <a:r>
+              <a:t>Eigene Code-Beispiele (wenn möglich)</a:t>
+            </a:r>
+          </a:p>
+        </p:txBody>
+      </p:sp>
+      <p:sp>
+        <p:nvSpPr>
+          <p:cNvPr id="4" name="Content Placeholder 3"/>
+          <p:cNvSpPr>
+            <a:spLocks noGrp="1"/>
+          </p:cNvSpPr>
+          <p:nvPr>
+            <p:ph idx="2" sz="half"/>
+          </p:nvPr>
+        </p:nvSpPr>
+        <p:spPr/>
+        <p:txBody>
+          <a:bodyPr/>
+          <a:lstStyle/>
+          <a:p>
+            <a:r>
+              <a:t>Was wir bereitstellen:</a:t>
+            </a:r>
+          </a:p>
+          <a:p>
+            <a:r>
+              <a:t>Vollständige Code-Beispiele für alle Patterns</a:t>
+            </a:r>
+          </a:p>
+          <a:p>
+            <a:r>
+              <a:t>Enterprise-typische Use Cases</a:t>
+            </a:r>
+          </a:p>
+          <a:p>
+            <a:r>
+              <a:t>Refactoring-Challenges</a:t>
+            </a:r>
+          </a:p>
+          <a:p>
+            <a:r>
+              <a:t>Pattern-Spickzettel als Nachschlagewerk</a:t>
+            </a:r>
+          </a:p>
         </p:txBody>
       </p:sp>
     </p:spTree>
@@ -6760,7 +6735,7 @@
           <a:lstStyle/>
           <a:p>
             <a:r>
-              <a:t>Schwerpunkt: Komplexe Szenarien</a:t>
+              <a:t>Workshop-Regeln - Zusammenarbeit</a:t>
             </a:r>
           </a:p>
         </p:txBody>
@@ -6780,33 +6755,28 @@
           <a:bodyPr/>
           <a:lstStyle/>
           <a:p>
-            <a:pPr/>
-            <a:r>
-              <a:t>Template Method: Algorithmus-Skelett mit variablen Teilen</a:t>
-            </a:r>
-          </a:p>
-          <a:p>
-            <a:pPr/>
-            <a:r>
-              <a:t>Visitor: Operationen von Datenstruktur trennen</a:t>
-            </a:r>
-          </a:p>
-          <a:p>
-            <a:pPr/>
-            <a:r>
-              <a:t>Chain of Responsibility: Requests durch Handler-Kette</a:t>
-            </a:r>
-          </a:p>
-          <a:p>
-            <a:pPr/>
-            <a:r>
-              <a:t>Mediator: Komplexe Objekt-Interaktionen koordinieren</a:t>
-            </a:r>
-          </a:p>
-          <a:p>
-            <a:pPr/>
-            <a:r>
-              <a:t>Enterprise Patterns: Repository, Unit of Work, MVC/MVP/MVVM</a:t>
+            <a:r>
+              <a:t>Fragen jederzeit - Unterbrechungen sind erwünscht</a:t>
+            </a:r>
+          </a:p>
+          <a:p>
+            <a:r>
+              <a:t>Handy stumm - aber für Code-Recherche gerne nutzen</a:t>
+            </a:r>
+          </a:p>
+          <a:p>
+            <a:r>
+              <a:t>Kamera an bei Remote-Teilnahme</a:t>
+            </a:r>
+          </a:p>
+          <a:p>
+            <a:r>
+              <a:t>Code teilen - Github Repository für alle</a:t>
+            </a:r>
+          </a:p>
+          <a:p>
+            <a:r>
+              <a:t>Feedback geben - täglich kurze Retro</a:t>
             </a:r>
           </a:p>
         </p:txBody>
@@ -6843,7 +6813,11 @@
         <p:txBody>
           <a:bodyPr/>
           <a:lstStyle/>
-          <a:p/>
+          <a:p>
+            <a:r>
+              <a:t>Software-Architektur</a:t>
+            </a:r>
+          </a:p>
         </p:txBody>
       </p:sp>
       <p:sp>
@@ -6860,7 +6834,11 @@
         <p:txBody>
           <a:bodyPr/>
           <a:lstStyle/>
-          <a:p/>
+          <a:p>
+            <a:r>
+              <a:t>Grundlagen und Definition</a:t>
+            </a:r>
+          </a:p>
         </p:txBody>
       </p:sp>
     </p:spTree>
@@ -6897,7 +6875,7 @@
           <a:lstStyle/>
           <a:p>
             <a:r>
-              <a:t>Bewusst ausgeklammerte Themen</a:t>
+              <a:t>Was ist Software-Architektur? - Verschiedene Definitionen</a:t>
             </a:r>
           </a:p>
         </p:txBody>
@@ -6917,33 +6895,23 @@
           <a:bodyPr/>
           <a:lstStyle/>
           <a:p>
-            <a:pPr/>
-            <a:r>
-              <a:t>Framework-spezifische Patterns (Spring, Hibernate, etc.)</a:t>
-            </a:r>
-          </a:p>
-          <a:p>
-            <a:pPr/>
-            <a:r>
-              <a:t>Architektur-Patterns (Microservices, CQRS, Event Sourcing)</a:t>
-            </a:r>
-          </a:p>
-          <a:p>
-            <a:pPr/>
-            <a:r>
-              <a:t>Concurrency-Patterns (würde eigenen Workshop füllen)</a:t>
-            </a:r>
-          </a:p>
-          <a:p>
-            <a:pPr/>
-            <a:r>
-              <a:t>Specific UI-Frameworks (Angular, React, Vue)</a:t>
-            </a:r>
-          </a:p>
-          <a:p>
-            <a:pPr/>
-            <a:r>
-              <a:t>Cloud-native Patterns (separate Workshop-Serie)</a:t>
+            <a:r>
+              <a:t>IEEE 1471: "Grundlegende Organisation eines Systems durch Komponenten und deren Beziehungen"</a:t>
+            </a:r>
+          </a:p>
+          <a:p>
+            <a:r>
+              <a:t>Martin Fowler: "Architecture is about the important stuff. Whatever that is."</a:t>
+            </a:r>
+          </a:p>
+          <a:p>
+            <a:r>
+              <a:t>Grady Booch: "Signifikante Design-Entscheidungen, gemessen an Änderungskosten"</a:t>
+            </a:r>
+          </a:p>
+          <a:p>
+            <a:r>
+              <a:t>Simon Brown: "Struktur und Vision für gemeinsames Verständnis"</a:t>
             </a:r>
           </a:p>
         </p:txBody>
@@ -6973,31 +6941,39 @@
             <a:spLocks noGrp="1"/>
           </p:cNvSpPr>
           <p:nvPr>
-            <p:ph type="ctrTitle"/>
-          </p:nvPr>
-        </p:nvSpPr>
-        <p:spPr/>
-        <p:txBody>
-          <a:bodyPr/>
-          <a:lstStyle/>
-          <a:p/>
-        </p:txBody>
-      </p:sp>
-      <p:sp>
-        <p:nvSpPr>
-          <p:cNvPr id="3" name="Subtitle 2"/>
-          <p:cNvSpPr>
-            <a:spLocks noGrp="1"/>
-          </p:cNvSpPr>
-          <p:nvPr>
-            <p:ph type="subTitle" idx="1"/>
-          </p:nvPr>
-        </p:nvSpPr>
-        <p:spPr/>
-        <p:txBody>
-          <a:bodyPr/>
-          <a:lstStyle/>
-          <a:p/>
+            <p:ph type="title"/>
+          </p:nvPr>
+        </p:nvSpPr>
+        <p:spPr/>
+        <p:txBody>
+          <a:bodyPr/>
+          <a:lstStyle/>
+          <a:p>
+            <a:r>
+              <a:t>Arbeitsdefinition für diesen Workshop - Unser gemeinsames Verständnis</a:t>
+            </a:r>
+          </a:p>
+        </p:txBody>
+      </p:sp>
+      <p:sp>
+        <p:nvSpPr>
+          <p:cNvPr id="3" name="Content Placeholder 2"/>
+          <p:cNvSpPr>
+            <a:spLocks noGrp="1"/>
+          </p:cNvSpPr>
+          <p:nvPr>
+            <p:ph idx="1"/>
+          </p:nvPr>
+        </p:nvSpPr>
+        <p:spPr/>
+        <p:txBody>
+          <a:bodyPr/>
+          <a:lstStyle/>
+          <a:p>
+            <a:r>
+              <a:t>Software-Architektur ist die Kunst, wichtige Designentscheidungen zu treffen, die die Struktur, das Verhalten und die Evolution eines Systems bestimmen - mit dem Ziel, fachliche Anforderungen optimal zu erfüllen.</a:t>
+            </a:r>
+          </a:p>
         </p:txBody>
       </p:sp>
     </p:spTree>
@@ -7034,7 +7010,7 @@
           <a:lstStyle/>
           <a:p>
             <a:r>
-              <a:t>Zentrale Problemstellungen</a:t>
+              <a:t>Enterprise-Kontext - Besonderheiten in großen Unternehmen</a:t>
             </a:r>
           </a:p>
         </p:txBody>
@@ -7054,33 +7030,28 @@
           <a:bodyPr/>
           <a:lstStyle/>
           <a:p>
-            <a:pPr/>
-            <a:r>
-              <a:t>Legacy-System Integration und Adapter-Patterns</a:t>
-            </a:r>
-          </a:p>
-          <a:p>
-            <a:pPr/>
-            <a:r>
-              <a:t>Flexible Objekterzeugung und Dependency Management</a:t>
-            </a:r>
-          </a:p>
-          <a:p>
-            <a:pPr/>
-            <a:r>
-              <a:t>Algorithmus-Variationen und Strategy-Patterns</a:t>
-            </a:r>
-          </a:p>
-          <a:p>
-            <a:pPr/>
-            <a:r>
-              <a:t>Event-basierte Kommunikation und Observer-Patterns</a:t>
-            </a:r>
-          </a:p>
-          <a:p>
-            <a:pPr/>
-            <a:r>
-              <a:t>Komplexe Objektstrukturen und Composite-Patterns</a:t>
+            <a:r>
+              <a:t>Legacy-Systeme: Jahrzehntealte Systeme, die noch laufen müssen</a:t>
+            </a:r>
+          </a:p>
+          <a:p>
+            <a:r>
+              <a:t>Regulatorische Anforderungen: DSGVO, Compliance-Standards</a:t>
+            </a:r>
+          </a:p>
+          <a:p>
+            <a:r>
+              <a:t>Hochverfügbarkeit: 99.9%+ Uptime-Anforderungen</a:t>
+            </a:r>
+          </a:p>
+          <a:p>
+            <a:r>
+              <a:t>Skalierung: Millionen von Benutzern, große Datenmengen</a:t>
+            </a:r>
+          </a:p>
+          <a:p>
+            <a:r>
+              <a:t>Sicherheit: Kritische Geschäftsdaten, Cyber-Security</a:t>
             </a:r>
           </a:p>
         </p:txBody>
@@ -7117,7 +7088,11 @@
         <p:txBody>
           <a:bodyPr/>
           <a:lstStyle/>
-          <a:p/>
+          <a:p>
+            <a:r>
+              <a:t>Clean Code</a:t>
+            </a:r>
+          </a:p>
         </p:txBody>
       </p:sp>
       <p:sp>
@@ -7134,7 +7109,11 @@
         <p:txBody>
           <a:bodyPr/>
           <a:lstStyle/>
-          <a:p/>
+          <a:p>
+            <a:r>
+              <a:t>Grundlagen für wartbaren Code</a:t>
+            </a:r>
+          </a:p>
         </p:txBody>
       </p:sp>
     </p:spTree>
@@ -7171,7 +7150,7 @@
           <a:lstStyle/>
           <a:p>
             <a:r>
-              <a:t>Was Sie mitbringen sollten</a:t>
+              <a:t>Clean Code Grundlagen - Was bedeutet "sauber"?</a:t>
             </a:r>
           </a:p>
         </p:txBody>
@@ -7191,27 +7170,28 @@
           <a:bodyPr/>
           <a:lstStyle/>
           <a:p>
-            <a:pPr/>
-            <a:r>
-              <a:t>Laptop mit Java 11+ und IDE (IntelliJ/Eclipse)</a:t>
-            </a:r>
-          </a:p>
-          <a:p>
-            <a:pPr/>
-            <a:r>
-              <a:t>Git für Code-Austausch</a:t>
-            </a:r>
-          </a:p>
-          <a:p>
-            <a:pPr/>
-            <a:r>
-              <a:t>Offenheit für neue Perspektiven</a:t>
-            </a:r>
-          </a:p>
-          <a:p>
-            <a:pPr/>
-            <a:r>
-              <a:t>Eigene Code-Beispiele (wenn möglich)</a:t>
+            <a:r>
+              <a:t>Lesbarkeit vor Cleverness</a:t>
+            </a:r>
+          </a:p>
+          <a:p>
+            <a:r>
+              <a:t>Eindeutige Namen für Funktionen, Variablen, Boolean</a:t>
+            </a:r>
+          </a:p>
+          <a:p>
+            <a:r>
+              <a:t>Kurze Funktionen (Eine Funktion = Ein Gedanke)</a:t>
+            </a:r>
+          </a:p>
+          <a:p>
+            <a:r>
+              <a:t>Keine Kommentare, die Code erklären</a:t>
+            </a:r>
+          </a:p>
+          <a:p>
+            <a:r>
+              <a:t>Konsistenz in Namenskonventionen und Formatierung</a:t>
             </a:r>
           </a:p>
         </p:txBody>
@@ -7241,31 +7221,85 @@
             <a:spLocks noGrp="1"/>
           </p:cNvSpPr>
           <p:nvPr>
-            <p:ph type="ctrTitle"/>
-          </p:nvPr>
-        </p:nvSpPr>
-        <p:spPr/>
-        <p:txBody>
-          <a:bodyPr/>
-          <a:lstStyle/>
-          <a:p/>
-        </p:txBody>
-      </p:sp>
-      <p:sp>
-        <p:nvSpPr>
-          <p:cNvPr id="3" name="Subtitle 2"/>
-          <p:cNvSpPr>
-            <a:spLocks noGrp="1"/>
-          </p:cNvSpPr>
-          <p:nvPr>
-            <p:ph type="subTitle" idx="1"/>
-          </p:nvPr>
-        </p:nvSpPr>
-        <p:spPr/>
-        <p:txBody>
-          <a:bodyPr/>
-          <a:lstStyle/>
-          <a:p/>
+            <p:ph type="title"/>
+          </p:nvPr>
+        </p:nvSpPr>
+        <p:spPr/>
+        <p:txBody>
+          <a:bodyPr/>
+          <a:lstStyle/>
+          <a:p>
+            <a:r>
+              <a:t>Software-Lebenszyklus in der Praxis</a:t>
+            </a:r>
+          </a:p>
+        </p:txBody>
+      </p:sp>
+      <p:sp>
+        <p:nvSpPr>
+          <p:cNvPr id="3" name="Content Placeholder 2"/>
+          <p:cNvSpPr>
+            <a:spLocks noGrp="1"/>
+          </p:cNvSpPr>
+          <p:nvPr>
+            <p:ph idx="1" sz="half"/>
+          </p:nvPr>
+        </p:nvSpPr>
+        <p:spPr/>
+        <p:txBody>
+          <a:bodyPr/>
+          <a:lstStyle/>
+          <a:p>
+            <a:r>
+              <a:t>Kostenverteilung:</a:t>
+            </a:r>
+          </a:p>
+          <a:p>
+            <a:r>
+              <a:t>Entwicklung: 20% der Gesamtkosten</a:t>
+            </a:r>
+          </a:p>
+          <a:p>
+            <a:r>
+              <a:t>Wartung: 80% der Gesamtkosten</a:t>
+            </a:r>
+          </a:p>
+        </p:txBody>
+      </p:sp>
+      <p:sp>
+        <p:nvSpPr>
+          <p:cNvPr id="4" name="Content Placeholder 3"/>
+          <p:cNvSpPr>
+            <a:spLocks noGrp="1"/>
+          </p:cNvSpPr>
+          <p:nvPr>
+            <p:ph idx="2" sz="half"/>
+          </p:nvPr>
+        </p:nvSpPr>
+        <p:spPr/>
+        <p:txBody>
+          <a:bodyPr/>
+          <a:lstStyle/>
+          <a:p>
+            <a:r>
+              <a:t>Wartbarkeits-Faktoren:</a:t>
+            </a:r>
+          </a:p>
+          <a:p>
+            <a:r>
+              <a:t>Verständlichkeit: Kann ich verstehen, was der Code macht?</a:t>
+            </a:r>
+          </a:p>
+          <a:p>
+            <a:r>
+              <a:t>Änderbarkeit: Kann ich sicher Änderungen vornehmen?</a:t>
+            </a:r>
+          </a:p>
+          <a:p>
+            <a:r>
+              <a:t>Testbarkeit: Kann ich das Verhalten überprüfen?</a:t>
+            </a:r>
+          </a:p>
         </p:txBody>
       </p:sp>
     </p:spTree>
@@ -7302,7 +7336,7 @@
           <a:lstStyle/>
           <a:p>
             <a:r>
-              <a:t>Zusammenarbeit</a:t>
+              <a:t>Technische Schulden</a:t>
             </a:r>
           </a:p>
         </p:txBody>
@@ -7314,41 +7348,57 @@
             <a:spLocks noGrp="1"/>
           </p:cNvSpPr>
           <p:nvPr>
-            <p:ph idx="1"/>
-          </p:nvPr>
-        </p:nvSpPr>
-        <p:spPr/>
-        <p:txBody>
-          <a:bodyPr/>
-          <a:lstStyle/>
-          <a:p>
-            <a:pPr/>
-            <a:r>
-              <a:t>Fragen jederzeit - Unterbrechungen sind erwünscht</a:t>
-            </a:r>
-          </a:p>
-          <a:p>
-            <a:pPr/>
-            <a:r>
-              <a:t>Handy stumm - aber für Code-Recherche gerne nutzen</a:t>
-            </a:r>
-          </a:p>
-          <a:p>
-            <a:pPr/>
-            <a:r>
-              <a:t>Kamera an bei Remote-Teilnahme</a:t>
-            </a:r>
-          </a:p>
-          <a:p>
-            <a:pPr/>
-            <a:r>
-              <a:t>Code teilen - Github Repository für alle</a:t>
-            </a:r>
-          </a:p>
-          <a:p>
-            <a:pPr/>
-            <a:r>
-              <a:t>Feedback geben - täglich kurze Retro</a:t>
+            <p:ph idx="1" sz="half"/>
+          </p:nvPr>
+        </p:nvSpPr>
+        <p:spPr/>
+        <p:txBody>
+          <a:bodyPr/>
+          <a:lstStyle/>
+          <a:p>
+            <a:r>
+              <a:t>Definition nach Martin Fowler:</a:t>
+            </a:r>
+          </a:p>
+          <a:p>
+            <a:r>
+              <a:t>"Technical debt is a metaphor referring to the eventual consequences of poor system design, software architecture or software development within a codebase."</a:t>
+            </a:r>
+          </a:p>
+        </p:txBody>
+      </p:sp>
+      <p:sp>
+        <p:nvSpPr>
+          <p:cNvPr id="4" name="Content Placeholder 3"/>
+          <p:cNvSpPr>
+            <a:spLocks noGrp="1"/>
+          </p:cNvSpPr>
+          <p:nvPr>
+            <p:ph idx="2" sz="half"/>
+          </p:nvPr>
+        </p:nvSpPr>
+        <p:spPr/>
+        <p:txBody>
+          <a:bodyPr/>
+          <a:lstStyle/>
+          <a:p>
+            <a:r>
+              <a:t>Arten technischer Schulden:</a:t>
+            </a:r>
+          </a:p>
+          <a:p>
+            <a:r>
+              <a:t>Bewusste Schulden: "Quick and dirty, aber nächste Woche aufräumen"</a:t>
+            </a:r>
+          </a:p>
+          <a:p>
+            <a:r>
+              <a:t>Unbewusste Schulden: Entstehen durch Unwissen (gefährlichste Art)</a:t>
+            </a:r>
+          </a:p>
+          <a:p>
+            <a:r>
+              <a:t>Umwelt-Schulden: Änderung der Anforderungen macht Code obsolet</a:t>
             </a:r>
           </a:p>
         </p:txBody>
@@ -7385,7 +7435,11 @@
         <p:txBody>
           <a:bodyPr/>
           <a:lstStyle/>
-          <a:p/>
+          <a:p>
+            <a:r>
+              <a:t>Workshop-Erwartungen</a:t>
+            </a:r>
+          </a:p>
         </p:txBody>
       </p:sp>
       <p:sp>
@@ -7437,7 +7491,11 @@
         <p:txBody>
           <a:bodyPr/>
           <a:lstStyle/>
-          <a:p/>
+          <a:p>
+            <a:r>
+              <a:t>Fachlichkeit vor Technik</a:t>
+            </a:r>
+          </a:p>
         </p:txBody>
       </p:sp>
       <p:sp>
@@ -7454,7 +7512,11 @@
         <p:txBody>
           <a:bodyPr/>
           <a:lstStyle/>
-          <a:p/>
+          <a:p>
+            <a:r>
+              <a:t>Domain-Driven Design</a:t>
+            </a:r>
+          </a:p>
         </p:txBody>
       </p:sp>
     </p:spTree>
@@ -7491,7 +7553,7 @@
           <a:lstStyle/>
           <a:p>
             <a:r>
-              <a:t>Verschiedene Definitionen</a:t>
+              <a:t>Das häufigste Anti-Pattern: Technology-First</a:t>
             </a:r>
           </a:p>
         </p:txBody>
@@ -7511,27 +7573,18 @@
           <a:bodyPr/>
           <a:lstStyle/>
           <a:p>
-            <a:pPr/>
-            <a:r>
-              <a:t>IEEE 1471: "Grundlegende Organisation eines Systems durch Komponenten und deren Beziehungen"</a:t>
-            </a:r>
-          </a:p>
-          <a:p>
-            <a:pPr/>
-            <a:r>
-              <a:t>Martin Fowler: "Architecture is about the important stuff. Whatever that is."</a:t>
-            </a:r>
-          </a:p>
-          <a:p>
-            <a:pPr/>
-            <a:r>
-              <a:t>Grady Booch: "Signifikante Design-Entscheidungen, gemessen an Änderungskosten"</a:t>
-            </a:r>
-          </a:p>
-          <a:p>
-            <a:pPr/>
-            <a:r>
-              <a:t>Simon Brown: "Struktur und Vision für gemeinsames Verständnis"</a:t>
+            <a:r>
+              <a:t>"Wir nutzen jetzt Microservices!" - Aber warum?</a:t>
+            </a:r>
+          </a:p>
+          <a:p>
+            <a:r>
+              <a:t>"Lass uns auf Kubernetes umsteigen!" - Aber welches Problem löst das?</a:t>
+            </a:r>
+          </a:p>
+          <a:p>
+            <a:r>
+              <a:t>"NoSQL ist modern, weg mit der relationalen DB!" - Aber was sind unsere Datenanforderungen?</a:t>
             </a:r>
           </a:p>
         </p:txBody>
@@ -7561,31 +7614,90 @@
             <a:spLocks noGrp="1"/>
           </p:cNvSpPr>
           <p:nvPr>
-            <p:ph type="ctrTitle"/>
-          </p:nvPr>
-        </p:nvSpPr>
-        <p:spPr/>
-        <p:txBody>
-          <a:bodyPr/>
-          <a:lstStyle/>
-          <a:p/>
-        </p:txBody>
-      </p:sp>
-      <p:sp>
-        <p:nvSpPr>
-          <p:cNvPr id="3" name="Subtitle 2"/>
-          <p:cNvSpPr>
-            <a:spLocks noGrp="1"/>
-          </p:cNvSpPr>
-          <p:nvPr>
-            <p:ph type="subTitle" idx="1"/>
-          </p:nvPr>
-        </p:nvSpPr>
-        <p:spPr/>
-        <p:txBody>
-          <a:bodyPr/>
-          <a:lstStyle/>
-          <a:p/>
+            <p:ph type="title"/>
+          </p:nvPr>
+        </p:nvSpPr>
+        <p:spPr/>
+        <p:txBody>
+          <a:bodyPr/>
+          <a:lstStyle/>
+          <a:p>
+            <a:r>
+              <a:t>Technology-First Beispiele</a:t>
+            </a:r>
+          </a:p>
+        </p:txBody>
+      </p:sp>
+      <p:sp>
+        <p:nvSpPr>
+          <p:cNvPr id="3" name="Content Placeholder 2"/>
+          <p:cNvSpPr>
+            <a:spLocks noGrp="1"/>
+          </p:cNvSpPr>
+          <p:nvPr>
+            <p:ph idx="1" sz="half"/>
+          </p:nvPr>
+        </p:nvSpPr>
+        <p:spPr/>
+        <p:txBody>
+          <a:bodyPr/>
+          <a:lstStyle/>
+          <a:p>
+            <a:r>
+              <a:t>Der Microservices-Hype:</a:t>
+            </a:r>
+          </a:p>
+          <a:p>
+            <a:r>
+              <a:t>Problem: Monolith funktioniert gut, aber "Microservices sind modern"</a:t>
+            </a:r>
+          </a:p>
+          <a:p>
+            <a:r>
+              <a:t>Entscheidung: Monolith in 20+ Services aufteilen</a:t>
+            </a:r>
+          </a:p>
+          <a:p>
+            <a:r>
+              <a:t>Ergebnis: 3x höhere Komplexität, Latenz-Probleme, Debugging-Albtraum</a:t>
+            </a:r>
+          </a:p>
+        </p:txBody>
+      </p:sp>
+      <p:sp>
+        <p:nvSpPr>
+          <p:cNvPr id="4" name="Content Placeholder 3"/>
+          <p:cNvSpPr>
+            <a:spLocks noGrp="1"/>
+          </p:cNvSpPr>
+          <p:nvPr>
+            <p:ph idx="2" sz="half"/>
+          </p:nvPr>
+        </p:nvSpPr>
+        <p:spPr/>
+        <p:txBody>
+          <a:bodyPr/>
+          <a:lstStyle/>
+          <a:p>
+            <a:r>
+              <a:t>Die NoSQL-Modernisierung:</a:t>
+            </a:r>
+          </a:p>
+          <a:p>
+            <a:r>
+              <a:t>Problem: Bewährte relationale DB für Finanzdaten</a:t>
+            </a:r>
+          </a:p>
+          <a:p>
+            <a:r>
+              <a:t>Entscheidung: Migration auf Document-Database</a:t>
+            </a:r>
+          </a:p>
+          <a:p>
+            <a:r>
+              <a:t>Ergebnis: Datenkonsistenz-Probleme, Migration zurück nach 18 Monaten</a:t>
+            </a:r>
+          </a:p>
         </p:txBody>
       </p:sp>
     </p:spTree>
@@ -7613,31 +7725,49 @@
             <a:spLocks noGrp="1"/>
           </p:cNvSpPr>
           <p:nvPr>
-            <p:ph type="ctrTitle"/>
-          </p:nvPr>
-        </p:nvSpPr>
-        <p:spPr/>
-        <p:txBody>
-          <a:bodyPr/>
-          <a:lstStyle/>
-          <a:p/>
-        </p:txBody>
-      </p:sp>
-      <p:sp>
-        <p:nvSpPr>
-          <p:cNvPr id="3" name="Subtitle 2"/>
-          <p:cNvSpPr>
-            <a:spLocks noGrp="1"/>
-          </p:cNvSpPr>
-          <p:nvPr>
-            <p:ph type="subTitle" idx="1"/>
-          </p:nvPr>
-        </p:nvSpPr>
-        <p:spPr/>
-        <p:txBody>
-          <a:bodyPr/>
-          <a:lstStyle/>
-          <a:p/>
+            <p:ph type="title"/>
+          </p:nvPr>
+        </p:nvSpPr>
+        <p:spPr/>
+        <p:txBody>
+          <a:bodyPr/>
+          <a:lstStyle/>
+          <a:p>
+            <a:r>
+              <a:t>Domain-Driven Design: Fachlichkeit First - Die richtige Reihenfolge</a:t>
+            </a:r>
+          </a:p>
+        </p:txBody>
+      </p:sp>
+      <p:sp>
+        <p:nvSpPr>
+          <p:cNvPr id="3" name="Content Placeholder 2"/>
+          <p:cNvSpPr>
+            <a:spLocks noGrp="1"/>
+          </p:cNvSpPr>
+          <p:nvPr>
+            <p:ph idx="1"/>
+          </p:nvPr>
+        </p:nvSpPr>
+        <p:spPr/>
+        <p:txBody>
+          <a:bodyPr/>
+          <a:lstStyle/>
+          <a:p>
+            <a:r>
+              <a:t>1. Fachlichkeit verstehen: Geschäftsproblem, Arbeitsprozesse, Regeln, echte Anforderungen</a:t>
+            </a:r>
+          </a:p>
+          <a:p>
+            <a:r>
+              <a:t>2. Fachliche Architektur entwerfen: Domains, Bounded Contexts, fachliche Services, Geschäftslogik-Modellierung</a:t>
+            </a:r>
+          </a:p>
+          <a:p>
+            <a:r>
+              <a:t>3. Technologie auswählen: Was unterstützt unser fachliches Modell am besten?</a:t>
+            </a:r>
+          </a:p>
         </p:txBody>
       </p:sp>
     </p:spTree>
@@ -7665,31 +7795,49 @@
             <a:spLocks noGrp="1"/>
           </p:cNvSpPr>
           <p:nvPr>
-            <p:ph type="ctrTitle"/>
-          </p:nvPr>
-        </p:nvSpPr>
-        <p:spPr/>
-        <p:txBody>
-          <a:bodyPr/>
-          <a:lstStyle/>
-          <a:p/>
-        </p:txBody>
-      </p:sp>
-      <p:sp>
-        <p:nvSpPr>
-          <p:cNvPr id="3" name="Subtitle 2"/>
-          <p:cNvSpPr>
-            <a:spLocks noGrp="1"/>
-          </p:cNvSpPr>
-          <p:nvPr>
-            <p:ph type="subTitle" idx="1"/>
-          </p:nvPr>
-        </p:nvSpPr>
-        <p:spPr/>
-        <p:txBody>
-          <a:bodyPr/>
-          <a:lstStyle/>
-          <a:p/>
+            <p:ph type="title"/>
+          </p:nvPr>
+        </p:nvSpPr>
+        <p:spPr/>
+        <p:txBody>
+          <a:bodyPr/>
+          <a:lstStyle/>
+          <a:p>
+            <a:r>
+              <a:t>Die richtige Herangehensweise - Fragen in der richtigen Reihenfolge</a:t>
+            </a:r>
+          </a:p>
+        </p:txBody>
+      </p:sp>
+      <p:sp>
+        <p:nvSpPr>
+          <p:cNvPr id="3" name="Content Placeholder 2"/>
+          <p:cNvSpPr>
+            <a:spLocks noGrp="1"/>
+          </p:cNvSpPr>
+          <p:nvPr>
+            <p:ph idx="1"/>
+          </p:nvPr>
+        </p:nvSpPr>
+        <p:spPr/>
+        <p:txBody>
+          <a:bodyPr/>
+          <a:lstStyle/>
+          <a:p>
+            <a:r>
+              <a:t>Phase 1: Fachlichkeit verstehen - Was soll das System tun? Warum ist das wichtig? Wer sind die Stakeholder?</a:t>
+            </a:r>
+          </a:p>
+          <a:p>
+            <a:r>
+              <a:t>Phase 2: Fachliche Lösung entwerfen - Welche fachlichen Bereiche gibt es? Wo sind die Grenzen? Wie kommunizieren sie?</a:t>
+            </a:r>
+          </a:p>
+          <a:p>
+            <a:r>
+              <a:t>Phase 3: Technologie auswählen - Womit implementieren wir das am besten? Was löst unsere spezifischen Probleme?</a:t>
+            </a:r>
+          </a:p>
         </p:txBody>
       </p:sp>
     </p:spTree>
@@ -7717,62 +7865,37 @@
             <a:spLocks noGrp="1"/>
           </p:cNvSpPr>
           <p:nvPr>
-            <p:ph type="title"/>
-          </p:nvPr>
-        </p:nvSpPr>
-        <p:spPr/>
-        <p:txBody>
-          <a:bodyPr/>
-          <a:lstStyle/>
-          <a:p>
-            <a:r>
-              <a:t>Besonderheiten in großen Unternehmen</a:t>
-            </a:r>
-          </a:p>
-        </p:txBody>
-      </p:sp>
-      <p:sp>
-        <p:nvSpPr>
-          <p:cNvPr id="3" name="Content Placeholder 2"/>
-          <p:cNvSpPr>
-            <a:spLocks noGrp="1"/>
-          </p:cNvSpPr>
-          <p:nvPr>
-            <p:ph idx="1"/>
-          </p:nvPr>
-        </p:nvSpPr>
-        <p:spPr/>
-        <p:txBody>
-          <a:bodyPr/>
-          <a:lstStyle/>
-          <a:p>
-            <a:pPr/>
-            <a:r>
-              <a:t>Legacy-Systeme: Jahrzehntealte Systeme, die noch laufen müssen</a:t>
-            </a:r>
-          </a:p>
-          <a:p>
-            <a:pPr/>
-            <a:r>
-              <a:t>Regulatorische Anforderungen: DSGVO, Compliance-Standards</a:t>
-            </a:r>
-          </a:p>
-          <a:p>
-            <a:pPr/>
-            <a:r>
-              <a:t>Hochverfügbarkeit: 99.9%+ Uptime-Anforderungen</a:t>
-            </a:r>
-          </a:p>
-          <a:p>
-            <a:pPr/>
-            <a:r>
-              <a:t>Skalierung: Millionen von Benutzern, große Datenmengen</a:t>
-            </a:r>
-          </a:p>
-          <a:p>
-            <a:pPr/>
-            <a:r>
-              <a:t>Sicherheit: Kritische Geschäftsdaten, Cyber-Security</a:t>
+            <p:ph type="ctrTitle"/>
+          </p:nvPr>
+        </p:nvSpPr>
+        <p:spPr/>
+        <p:txBody>
+          <a:bodyPr/>
+          <a:lstStyle/>
+          <a:p>
+            <a:r>
+              <a:t>Design Patterns</a:t>
+            </a:r>
+          </a:p>
+        </p:txBody>
+      </p:sp>
+      <p:sp>
+        <p:nvSpPr>
+          <p:cNvPr id="3" name="Subtitle 2"/>
+          <p:cNvSpPr>
+            <a:spLocks noGrp="1"/>
+          </p:cNvSpPr>
+          <p:nvPr>
+            <p:ph type="subTitle" idx="1"/>
+          </p:nvPr>
+        </p:nvSpPr>
+        <p:spPr/>
+        <p:txBody>
+          <a:bodyPr/>
+          <a:lstStyle/>
+          <a:p>
+            <a:r>
+              <a:t>Motivation und Geschichte</a:t>
             </a:r>
           </a:p>
         </p:txBody>
@@ -7802,31 +7925,59 @@
             <a:spLocks noGrp="1"/>
           </p:cNvSpPr>
           <p:nvPr>
-            <p:ph type="ctrTitle"/>
-          </p:nvPr>
-        </p:nvSpPr>
-        <p:spPr/>
-        <p:txBody>
-          <a:bodyPr/>
-          <a:lstStyle/>
-          <a:p/>
-        </p:txBody>
-      </p:sp>
-      <p:sp>
-        <p:nvSpPr>
-          <p:cNvPr id="3" name="Subtitle 2"/>
-          <p:cNvSpPr>
-            <a:spLocks noGrp="1"/>
-          </p:cNvSpPr>
-          <p:nvPr>
-            <p:ph type="subTitle" idx="1"/>
-          </p:nvPr>
-        </p:nvSpPr>
-        <p:spPr/>
-        <p:txBody>
-          <a:bodyPr/>
-          <a:lstStyle/>
-          <a:p/>
+            <p:ph type="title"/>
+          </p:nvPr>
+        </p:nvSpPr>
+        <p:spPr/>
+        <p:txBody>
+          <a:bodyPr/>
+          <a:lstStyle/>
+          <a:p>
+            <a:r>
+              <a:t>Design Patterns Motivation - Geschichte: Warum entstanden Design Patterns?</a:t>
+            </a:r>
+          </a:p>
+        </p:txBody>
+      </p:sp>
+      <p:sp>
+        <p:nvSpPr>
+          <p:cNvPr id="3" name="Content Placeholder 2"/>
+          <p:cNvSpPr>
+            <a:spLocks noGrp="1"/>
+          </p:cNvSpPr>
+          <p:nvPr>
+            <p:ph idx="1"/>
+          </p:nvPr>
+        </p:nvSpPr>
+        <p:spPr/>
+        <p:txBody>
+          <a:bodyPr/>
+          <a:lstStyle/>
+          <a:p>
+            <a:r>
+              <a:t>Christopher Alexander (1977): "A Pattern Language" - Gebäude-Architektur!</a:t>
+            </a:r>
+          </a:p>
+          <a:p>
+            <a:r>
+              <a:t>Gang of Four (1994): Übertragung auf Software</a:t>
+            </a:r>
+          </a:p>
+          <a:p>
+            <a:r>
+              <a:t>Problem 1: Wiederkehrende Design-Probleme</a:t>
+            </a:r>
+          </a:p>
+          <a:p>
+            <a:r>
+              <a:t>Problem 2: Schlechte Kommunikation zwischen Entwicklern</a:t>
+            </a:r>
+          </a:p>
+          <a:p>
+            <a:r>
+              <a:t>Problem 3: Fehlende Best Practices</a:t>
+            </a:r>
+          </a:p>
         </p:txBody>
       </p:sp>
     </p:spTree>
@@ -7863,7 +8014,7 @@
           <a:lstStyle/>
           <a:p>
             <a:r>
-              <a:t>Was bedeutet "sauber"?</a:t>
+              <a:t>Warum Design Patterns? - Vier Hauptvorteile</a:t>
             </a:r>
           </a:p>
         </p:txBody>
@@ -7883,33 +8034,23 @@
           <a:bodyPr/>
           <a:lstStyle/>
           <a:p>
-            <a:pPr/>
-            <a:r>
-              <a:t>Lesbarkeit vor Cleverness</a:t>
-            </a:r>
-          </a:p>
-          <a:p>
-            <a:pPr/>
-            <a:r>
-              <a:t>Eindeutige Namen für Funktionen, Variablen, Boolean</a:t>
-            </a:r>
-          </a:p>
-          <a:p>
-            <a:pPr/>
-            <a:r>
-              <a:t>Kurze Funktionen (Eine Funktion = Ein Gedanke)</a:t>
-            </a:r>
-          </a:p>
-          <a:p>
-            <a:pPr/>
-            <a:r>
-              <a:t>Keine Kommentare, die Code erklären</a:t>
-            </a:r>
-          </a:p>
-          <a:p>
-            <a:pPr/>
-            <a:r>
-              <a:t>Konsistenz in Namenskonventionen und Formatierung</a:t>
+            <a:r>
+              <a:t>Bewährte Lösungen nutzen: Anstatt Rad neu erfinden</a:t>
+            </a:r>
+          </a:p>
+          <a:p>
+            <a:r>
+              <a:t>Gemeinsame Sprache entwickeln: Vokabular für Teams</a:t>
+            </a:r>
+          </a:p>
+          <a:p>
+            <a:r>
+              <a:t>Design-Qualität verbessern: SOLID-Prinzipien kodifiziert</a:t>
+            </a:r>
+          </a:p>
+          <a:p>
+            <a:r>
+              <a:t>Wartbarkeit erhöhen: Bekannte Patterns sind verständlicher</a:t>
             </a:r>
           </a:p>
         </p:txBody>
@@ -7939,31 +8080,95 @@
             <a:spLocks noGrp="1"/>
           </p:cNvSpPr>
           <p:nvPr>
-            <p:ph type="ctrTitle"/>
-          </p:nvPr>
-        </p:nvSpPr>
-        <p:spPr/>
-        <p:txBody>
-          <a:bodyPr/>
-          <a:lstStyle/>
-          <a:p/>
-        </p:txBody>
-      </p:sp>
-      <p:sp>
-        <p:nvSpPr>
-          <p:cNvPr id="3" name="Subtitle 2"/>
-          <p:cNvSpPr>
-            <a:spLocks noGrp="1"/>
-          </p:cNvSpPr>
-          <p:nvPr>
-            <p:ph type="subTitle" idx="1"/>
-          </p:nvPr>
-        </p:nvSpPr>
-        <p:spPr/>
-        <p:txBody>
-          <a:bodyPr/>
-          <a:lstStyle/>
-          <a:p/>
+            <p:ph type="title"/>
+          </p:nvPr>
+        </p:nvSpPr>
+        <p:spPr/>
+        <p:txBody>
+          <a:bodyPr/>
+          <a:lstStyle/>
+          <a:p>
+            <a:r>
+              <a:t>Patterns sind NICHT... - Pattern-Missbrauch vermeiden</a:t>
+            </a:r>
+          </a:p>
+        </p:txBody>
+      </p:sp>
+      <p:sp>
+        <p:nvSpPr>
+          <p:cNvPr id="3" name="Content Placeholder 2"/>
+          <p:cNvSpPr>
+            <a:spLocks noGrp="1"/>
+          </p:cNvSpPr>
+          <p:nvPr>
+            <p:ph idx="1" sz="half"/>
+          </p:nvPr>
+        </p:nvSpPr>
+        <p:spPr/>
+        <p:txBody>
+          <a:bodyPr/>
+          <a:lstStyle/>
+          <a:p>
+            <a:r>
+              <a:t>Patterns sind NICHT:</a:t>
+            </a:r>
+          </a:p>
+          <a:p>
+            <a:r>
+              <a:t>Silberkugeln: Patterns lösen nicht alle Probleme</a:t>
+            </a:r>
+          </a:p>
+          <a:p>
+            <a:r>
+              <a:t>Dogmen: Patterns müssen nicht sklavisch befolgt werden</a:t>
+            </a:r>
+          </a:p>
+          <a:p>
+            <a:r>
+              <a:t>Komplexität um der Komplexität willen</a:t>
+            </a:r>
+          </a:p>
+          <a:p>
+            <a:r>
+              <a:t>Copy-Paste Code: Patterns sind konzeptuelle Lösungen</a:t>
+            </a:r>
+          </a:p>
+        </p:txBody>
+      </p:sp>
+      <p:sp>
+        <p:nvSpPr>
+          <p:cNvPr id="4" name="Content Placeholder 3"/>
+          <p:cNvSpPr>
+            <a:spLocks noGrp="1"/>
+          </p:cNvSpPr>
+          <p:nvPr>
+            <p:ph idx="2" sz="half"/>
+          </p:nvPr>
+        </p:nvSpPr>
+        <p:spPr/>
+        <p:txBody>
+          <a:bodyPr/>
+          <a:lstStyle/>
+          <a:p>
+            <a:r>
+              <a:t>Anti-Beispiel aus der Praxis:</a:t>
+            </a:r>
+          </a:p>
+          <a:p>
+            <a:r>
+              <a:t>Problem: Einfache Konfigurationswerte lesen</a:t>
+            </a:r>
+          </a:p>
+          <a:p>
+            <a:r>
+              <a:t>Overengineered: AbstractConfigurationFactoryBuilderStrategyProxy</a:t>
+            </a:r>
+          </a:p>
+          <a:p>
+            <a:r>
+              <a:t>Einfach: Properties.load()</a:t>
+            </a:r>
+          </a:p>
         </p:txBody>
       </p:sp>
     </p:spTree>
@@ -7991,44 +8196,37 @@
             <a:spLocks noGrp="1"/>
           </p:cNvSpPr>
           <p:nvPr>
-            <p:ph type="title"/>
-          </p:nvPr>
-        </p:nvSpPr>
-        <p:spPr/>
-        <p:txBody>
-          <a:bodyPr/>
-          <a:lstStyle/>
-          <a:p>
-            <a:r>
-              <a:t>Kostenverteilung</a:t>
-            </a:r>
-          </a:p>
-        </p:txBody>
-      </p:sp>
-      <p:sp>
-        <p:nvSpPr>
-          <p:cNvPr id="3" name="Content Placeholder 2"/>
-          <p:cNvSpPr>
-            <a:spLocks noGrp="1"/>
-          </p:cNvSpPr>
-          <p:nvPr>
-            <p:ph idx="1"/>
-          </p:nvPr>
-        </p:nvSpPr>
-        <p:spPr/>
-        <p:txBody>
-          <a:bodyPr/>
-          <a:lstStyle/>
-          <a:p>
-            <a:pPr/>
-            <a:r>
-              <a:t>Entwicklung: 20% der Gesamtkosten</a:t>
-            </a:r>
-          </a:p>
-          <a:p>
-            <a:pPr/>
-            <a:r>
-              <a:t>Wartung: 80% der Gesamtkosten</a:t>
+            <p:ph type="ctrTitle"/>
+          </p:nvPr>
+        </p:nvSpPr>
+        <p:spPr/>
+        <p:txBody>
+          <a:bodyPr/>
+          <a:lstStyle/>
+          <a:p>
+            <a:r>
+              <a:t>Refactoring Philosophie</a:t>
+            </a:r>
+          </a:p>
+        </p:txBody>
+      </p:sp>
+      <p:sp>
+        <p:nvSpPr>
+          <p:cNvPr id="3" name="Subtitle 2"/>
+          <p:cNvSpPr>
+            <a:spLocks noGrp="1"/>
+          </p:cNvSpPr>
+          <p:nvPr>
+            <p:ph type="subTitle" idx="1"/>
+          </p:nvPr>
+        </p:nvSpPr>
+        <p:spPr/>
+        <p:txBody>
+          <a:bodyPr/>
+          <a:lstStyle/>
+          <a:p>
+            <a:r>
+              <a:t>Der Weg zu besserer Code-Qualität</a:t>
             </a:r>
           </a:p>
         </p:txBody>
@@ -8087,25 +8285,21 @@
           <a:bodyPr/>
           <a:lstStyle/>
           <a:p>
-            <a:pPr/>
             <a:r>
               <a:t>Block 1: Creational Patterns - Flexible Objekterzeugung in Enterprise-Systemen</a:t>
             </a:r>
           </a:p>
           <a:p>
-            <a:pPr/>
             <a:r>
               <a:t>Block 2: Structural Patterns - Objektkomposition und Systemintegration</a:t>
             </a:r>
           </a:p>
           <a:p>
-            <a:pPr/>
             <a:r>
               <a:t>Block 3: Behavioral Patterns - Verhalten und Kommunikation zwischen Objekten</a:t>
             </a:r>
           </a:p>
           <a:p>
-            <a:pPr/>
             <a:r>
               <a:t>Block 4: Advanced Patterns - Komplexe Szenarien und Pattern-Kombinationen</a:t>
             </a:r>
@@ -8146,7 +8340,7 @@
           <a:lstStyle/>
           <a:p>
             <a:r>
-              <a:t>Wartbarkeits-Faktoren</a:t>
+              <a:t>Was ist Refactoring?</a:t>
             </a:r>
           </a:p>
         </p:txBody>
@@ -8158,29 +8352,57 @@
             <a:spLocks noGrp="1"/>
           </p:cNvSpPr>
           <p:nvPr>
-            <p:ph idx="1"/>
-          </p:nvPr>
-        </p:nvSpPr>
-        <p:spPr/>
-        <p:txBody>
-          <a:bodyPr/>
-          <a:lstStyle/>
-          <a:p>
-            <a:pPr/>
-            <a:r>
-              <a:t>Verständlichkeit: Kann ich verstehen, was der Code macht?</a:t>
-            </a:r>
-          </a:p>
-          <a:p>
-            <a:pPr/>
-            <a:r>
-              <a:t>Änderbarkeit: Kann ich sicher Änderungen vornehmen?</a:t>
-            </a:r>
-          </a:p>
-          <a:p>
-            <a:pPr/>
-            <a:r>
-              <a:t>Testbarkeit: Kann ich das Verhalten überprüfen?</a:t>
+            <p:ph idx="1" sz="half"/>
+          </p:nvPr>
+        </p:nvSpPr>
+        <p:spPr/>
+        <p:txBody>
+          <a:bodyPr/>
+          <a:lstStyle/>
+          <a:p>
+            <a:r>
+              <a:t>Definition nach Martin Fowler:</a:t>
+            </a:r>
+          </a:p>
+          <a:p>
+            <a:r>
+              <a:t>"Refactoring is the process of changing a software system in such a way that it does not alter the external behavior of the code yet improves its internal structure."</a:t>
+            </a:r>
+          </a:p>
+        </p:txBody>
+      </p:sp>
+      <p:sp>
+        <p:nvSpPr>
+          <p:cNvPr id="4" name="Content Placeholder 3"/>
+          <p:cNvSpPr>
+            <a:spLocks noGrp="1"/>
+          </p:cNvSpPr>
+          <p:nvPr>
+            <p:ph idx="2" sz="half"/>
+          </p:nvPr>
+        </p:nvSpPr>
+        <p:spPr/>
+        <p:txBody>
+          <a:bodyPr/>
+          <a:lstStyle/>
+          <a:p>
+            <a:r>
+              <a:t>Schlüsselelemente:</a:t>
+            </a:r>
+          </a:p>
+          <a:p>
+            <a:r>
+              <a:t>Verhalten bleibt gleich - Funktionalität ändert sich nicht</a:t>
+            </a:r>
+          </a:p>
+          <a:p>
+            <a:r>
+              <a:t>Struktur wird besser - Code wird wartbarer</a:t>
+            </a:r>
+          </a:p>
+          <a:p>
+            <a:r>
+              <a:t>Kleine Schritte - Viele kleine, sichere Änderungen</a:t>
             </a:r>
           </a:p>
         </p:txBody>
@@ -8210,31 +8432,85 @@
             <a:spLocks noGrp="1"/>
           </p:cNvSpPr>
           <p:nvPr>
-            <p:ph type="ctrTitle"/>
-          </p:nvPr>
-        </p:nvSpPr>
-        <p:spPr/>
-        <p:txBody>
-          <a:bodyPr/>
-          <a:lstStyle/>
-          <a:p/>
-        </p:txBody>
-      </p:sp>
-      <p:sp>
-        <p:nvSpPr>
-          <p:cNvPr id="3" name="Subtitle 2"/>
-          <p:cNvSpPr>
-            <a:spLocks noGrp="1"/>
-          </p:cNvSpPr>
-          <p:nvPr>
-            <p:ph type="subTitle" idx="1"/>
-          </p:nvPr>
-        </p:nvSpPr>
-        <p:spPr/>
-        <p:txBody>
-          <a:bodyPr/>
-          <a:lstStyle/>
-          <a:p/>
+            <p:ph type="title"/>
+          </p:nvPr>
+        </p:nvSpPr>
+        <p:spPr/>
+        <p:txBody>
+          <a:bodyPr/>
+          <a:lstStyle/>
+          <a:p>
+            <a:r>
+              <a:t>Die Boy Scout Rule - Ursprung und Übertragung</a:t>
+            </a:r>
+          </a:p>
+        </p:txBody>
+      </p:sp>
+      <p:sp>
+        <p:nvSpPr>
+          <p:cNvPr id="3" name="Content Placeholder 2"/>
+          <p:cNvSpPr>
+            <a:spLocks noGrp="1"/>
+          </p:cNvSpPr>
+          <p:nvPr>
+            <p:ph idx="1" sz="half"/>
+          </p:nvPr>
+        </p:nvSpPr>
+        <p:spPr/>
+        <p:txBody>
+          <a:bodyPr/>
+          <a:lstStyle/>
+          <a:p>
+            <a:r>
+              <a:t>Boy Scouts of America:</a:t>
+            </a:r>
+          </a:p>
+          <a:p>
+            <a:r>
+              <a:t>"Try and leave this world a little better than you found it."</a:t>
+            </a:r>
+          </a:p>
+          <a:p>
+            <a:r>
+              <a:t>Uncle Bob für Software:</a:t>
+            </a:r>
+          </a:p>
+          <a:p>
+            <a:r>
+              <a:t>"Always leave the campground cleaner than you found it."</a:t>
+            </a:r>
+          </a:p>
+        </p:txBody>
+      </p:sp>
+      <p:sp>
+        <p:nvSpPr>
+          <p:cNvPr id="4" name="Content Placeholder 3"/>
+          <p:cNvSpPr>
+            <a:spLocks noGrp="1"/>
+          </p:cNvSpPr>
+          <p:nvPr>
+            <p:ph idx="2" sz="half"/>
+          </p:nvPr>
+        </p:nvSpPr>
+        <p:spPr/>
+        <p:txBody>
+          <a:bodyPr/>
+          <a:lstStyle/>
+          <a:p>
+            <a:r>
+              <a:t>Praktische Anwendung:</a:t>
+            </a:r>
+          </a:p>
+          <a:p>
+            <a:r>
+              <a:t>Bei jedem Code-Touch: Verstehe → Verbessere → Prüfe → Committe</a:t>
+            </a:r>
+          </a:p>
+          <a:p>
+            <a:r>
+              <a:t>Konkrete Aktionen: Variable umbenennen, Magic Numbers extrahieren, Long Methods aufteilen</a:t>
+            </a:r>
+          </a:p>
         </p:txBody>
       </p:sp>
     </p:spTree>
@@ -8262,31 +8538,90 @@
             <a:spLocks noGrp="1"/>
           </p:cNvSpPr>
           <p:nvPr>
-            <p:ph type="ctrTitle"/>
-          </p:nvPr>
-        </p:nvSpPr>
-        <p:spPr/>
-        <p:txBody>
-          <a:bodyPr/>
-          <a:lstStyle/>
-          <a:p/>
-        </p:txBody>
-      </p:sp>
-      <p:sp>
-        <p:nvSpPr>
-          <p:cNvPr id="3" name="Subtitle 2"/>
-          <p:cNvSpPr>
-            <a:spLocks noGrp="1"/>
-          </p:cNvSpPr>
-          <p:nvPr>
-            <p:ph type="subTitle" idx="1"/>
-          </p:nvPr>
-        </p:nvSpPr>
-        <p:spPr/>
-        <p:txBody>
-          <a:bodyPr/>
-          <a:lstStyle/>
-          <a:p/>
+            <p:ph type="title"/>
+          </p:nvPr>
+        </p:nvSpPr>
+        <p:spPr/>
+        <p:txBody>
+          <a:bodyPr/>
+          <a:lstStyle/>
+          <a:p>
+            <a:r>
+              <a:t>Wann refactoren? - Die "Rule of Three"</a:t>
+            </a:r>
+          </a:p>
+        </p:txBody>
+      </p:sp>
+      <p:sp>
+        <p:nvSpPr>
+          <p:cNvPr id="3" name="Content Placeholder 2"/>
+          <p:cNvSpPr>
+            <a:spLocks noGrp="1"/>
+          </p:cNvSpPr>
+          <p:nvPr>
+            <p:ph idx="1" sz="half"/>
+          </p:nvPr>
+        </p:nvSpPr>
+        <p:spPr/>
+        <p:txBody>
+          <a:bodyPr/>
+          <a:lstStyle/>
+          <a:p>
+            <a:r>
+              <a:t>Die "Rule of Three":</a:t>
+            </a:r>
+          </a:p>
+          <a:p>
+            <a:r>
+              <a:t>1. Das erste Mal - mache es einfach</a:t>
+            </a:r>
+          </a:p>
+          <a:p>
+            <a:r>
+              <a:t>2. Das zweite Mal - ärgere dich über Duplikation, aber mache es trotzdem</a:t>
+            </a:r>
+          </a:p>
+          <a:p>
+            <a:r>
+              <a:t>3. Das dritte Mal - refactore!</a:t>
+            </a:r>
+          </a:p>
+        </p:txBody>
+      </p:sp>
+      <p:sp>
+        <p:nvSpPr>
+          <p:cNvPr id="4" name="Content Placeholder 3"/>
+          <p:cNvSpPr>
+            <a:spLocks noGrp="1"/>
+          </p:cNvSpPr>
+          <p:nvPr>
+            <p:ph idx="2" sz="half"/>
+          </p:nvPr>
+        </p:nvSpPr>
+        <p:spPr/>
+        <p:txBody>
+          <a:bodyPr/>
+          <a:lstStyle/>
+          <a:p>
+            <a:r>
+              <a:t>Refactoring-Trigger:</a:t>
+            </a:r>
+          </a:p>
+          <a:p>
+            <a:r>
+              <a:t>Wenn du Code verstehen musst (vor Bug-Fix, vor Feature)</a:t>
+            </a:r>
+          </a:p>
+          <a:p>
+            <a:r>
+              <a:t>Wenn du Duplikation siehst (Copy-Paste Code)</a:t>
+            </a:r>
+          </a:p>
+          <a:p>
+            <a:r>
+              <a:t>Wenn Code "riecht" (Long Method, Large Class, Long Parameter List)</a:t>
+            </a:r>
+          </a:p>
         </p:txBody>
       </p:sp>
     </p:spTree>
@@ -8323,7 +8658,7 @@
           <a:lstStyle/>
           <a:p>
             <a:r>
-              <a:t>Arten technischer Schulden</a:t>
+              <a:t>Refactoring-Sicherheitsmaßnahmen</a:t>
             </a:r>
           </a:p>
         </p:txBody>
@@ -8335,29 +8670,67 @@
             <a:spLocks noGrp="1"/>
           </p:cNvSpPr>
           <p:nvPr>
-            <p:ph idx="1"/>
-          </p:nvPr>
-        </p:nvSpPr>
-        <p:spPr/>
-        <p:txBody>
-          <a:bodyPr/>
-          <a:lstStyle/>
-          <a:p>
-            <a:pPr/>
-            <a:r>
-              <a:t>Bewusste Schulden: "Quick and dirty, aber nächste Woche aufräumen"</a:t>
-            </a:r>
-          </a:p>
-          <a:p>
-            <a:pPr/>
-            <a:r>
-              <a:t>Unbewusste Schulden: Entstehen durch Unwissen (gefährlichste Art)</a:t>
-            </a:r>
-          </a:p>
-          <a:p>
-            <a:pPr/>
-            <a:r>
-              <a:t>Umwelt-Schulden: Änderung der Anforderungen macht Code obsolet</a:t>
+            <p:ph idx="1" sz="half"/>
+          </p:nvPr>
+        </p:nvSpPr>
+        <p:spPr/>
+        <p:txBody>
+          <a:bodyPr/>
+          <a:lstStyle/>
+          <a:p>
+            <a:r>
+              <a:t>Tests zuerst:</a:t>
+            </a:r>
+          </a:p>
+          <a:p>
+            <a:r>
+              <a:t>Vor Refactoring: Verstehe Verhalten, schreibe Tests, alle Tests grün</a:t>
+            </a:r>
+          </a:p>
+          <a:p>
+            <a:r>
+              <a:t>Während Refactoring: Nach jedem Schritt Tests laufen lassen</a:t>
+            </a:r>
+          </a:p>
+          <a:p>
+            <a:r>
+              <a:t>Nach Refactoring: Alle Tests noch grün</a:t>
+            </a:r>
+          </a:p>
+        </p:txBody>
+      </p:sp>
+      <p:sp>
+        <p:nvSpPr>
+          <p:cNvPr id="4" name="Content Placeholder 3"/>
+          <p:cNvSpPr>
+            <a:spLocks noGrp="1"/>
+          </p:cNvSpPr>
+          <p:nvPr>
+            <p:ph idx="2" sz="half"/>
+          </p:nvPr>
+        </p:nvSpPr>
+        <p:spPr/>
+        <p:txBody>
+          <a:bodyPr/>
+          <a:lstStyle/>
+          <a:p>
+            <a:r>
+              <a:t>Kleine Schritte und IDE-Unterstützung:</a:t>
+            </a:r>
+          </a:p>
+          <a:p>
+            <a:r>
+              <a:t>Ein Schritt nach dem anderen</a:t>
+            </a:r>
+          </a:p>
+          <a:p>
+            <a:r>
+              <a:t>Extract Method, Rename Variable, Move Method</a:t>
+            </a:r>
+          </a:p>
+          <a:p>
+            <a:r>
+              <a:t>IDE kann viel automatisch und sicher machen</a:t>
             </a:r>
           </a:p>
         </p:txBody>
@@ -8387,31 +8760,85 @@
             <a:spLocks noGrp="1"/>
           </p:cNvSpPr>
           <p:nvPr>
-            <p:ph type="ctrTitle"/>
-          </p:nvPr>
-        </p:nvSpPr>
-        <p:spPr/>
-        <p:txBody>
-          <a:bodyPr/>
-          <a:lstStyle/>
-          <a:p/>
-        </p:txBody>
-      </p:sp>
-      <p:sp>
-        <p:nvSpPr>
-          <p:cNvPr id="3" name="Subtitle 2"/>
-          <p:cNvSpPr>
-            <a:spLocks noGrp="1"/>
-          </p:cNvSpPr>
-          <p:nvPr>
-            <p:ph type="subTitle" idx="1"/>
-          </p:nvPr>
-        </p:nvSpPr>
-        <p:spPr/>
-        <p:txBody>
-          <a:bodyPr/>
-          <a:lstStyle/>
-          <a:p/>
+            <p:ph type="title"/>
+          </p:nvPr>
+        </p:nvSpPr>
+        <p:spPr/>
+        <p:txBody>
+          <a:bodyPr/>
+          <a:lstStyle/>
+          <a:p>
+            <a:r>
+              <a:t>Refactoring als Weg zu Patterns</a:t>
+            </a:r>
+          </a:p>
+        </p:txBody>
+      </p:sp>
+      <p:sp>
+        <p:nvSpPr>
+          <p:cNvPr id="3" name="Content Placeholder 2"/>
+          <p:cNvSpPr>
+            <a:spLocks noGrp="1"/>
+          </p:cNvSpPr>
+          <p:nvPr>
+            <p:ph idx="1" sz="half"/>
+          </p:nvPr>
+        </p:nvSpPr>
+        <p:spPr/>
+        <p:txBody>
+          <a:bodyPr/>
+          <a:lstStyle/>
+          <a:p>
+            <a:r>
+              <a:t>Typischer Ablauf:</a:t>
+            </a:r>
+          </a:p>
+          <a:p>
+            <a:r>
+              <a:t>1. Duplikation entsteht natürlich</a:t>
+            </a:r>
+          </a:p>
+          <a:p>
+            <a:r>
+              <a:t>2. Refactoring macht Gemeinsamkeiten sichtbar</a:t>
+            </a:r>
+          </a:p>
+          <a:p>
+            <a:r>
+              <a:t>3. Pattern Recognition - "Das ist ein bekanntes Problem"</a:t>
+            </a:r>
+          </a:p>
+          <a:p>
+            <a:r>
+              <a:t>4. Pattern Application - Bekannte Lösung anwenden</a:t>
+            </a:r>
+          </a:p>
+        </p:txBody>
+      </p:sp>
+      <p:sp>
+        <p:nvSpPr>
+          <p:cNvPr id="4" name="Content Placeholder 3"/>
+          <p:cNvSpPr>
+            <a:spLocks noGrp="1"/>
+          </p:cNvSpPr>
+          <p:nvPr>
+            <p:ph idx="2" sz="half"/>
+          </p:nvPr>
+        </p:nvSpPr>
+        <p:spPr/>
+        <p:txBody>
+          <a:bodyPr/>
+          <a:lstStyle/>
+          <a:p>
+            <a:r>
+              <a:t>Wichtige Erkenntnis:</a:t>
+            </a:r>
+          </a:p>
+          <a:p>
+            <a:r>
+              <a:t>Patterns werden durch Refactoring eingeführt, nicht von Anfang an geplant!</a:t>
+            </a:r>
+          </a:p>
         </p:txBody>
       </p:sp>
     </p:spTree>
@@ -8448,7 +8875,7 @@
           <a:lstStyle/>
           <a:p>
             <a:r>
-              <a:t>Das häufigste Anti-Pattern: Technology-First</a:t>
+              <a:t>Workshop-Bereitschaft - Ihr persönliches Lernziel</a:t>
             </a:r>
           </a:p>
         </p:txBody>
@@ -8468,273 +8895,27 @@
           <a:bodyPr/>
           <a:lstStyle/>
           <a:p>
-            <a:pPr/>
-            <a:r>
-              <a:t>"Wir nutzen jetzt Microservices!" - Aber warum?</a:t>
-            </a:r>
-          </a:p>
-          <a:p>
-            <a:pPr/>
-            <a:r>
-              <a:t>"Lass uns auf Kubernetes umsteigen!" - Aber welches Problem löst das?</a:t>
-            </a:r>
-          </a:p>
-          <a:p>
-            <a:pPr/>
-            <a:r>
-              <a:t>"NoSQL ist modern, weg mit der relationalen DB!" - Aber was sind unsere Datenanforderungen?</a:t>
-            </a:r>
-          </a:p>
-        </p:txBody>
-      </p:sp>
-    </p:spTree>
-  </p:cSld>
-  <p:clrMapOvr>
-    <a:masterClrMapping/>
-  </p:clrMapOvr>
-</p:sld>
-</file>
-
-<file path=ppt/slides/slide36.xml><?xml version="1.0" encoding="utf-8"?>
-<p:sld xmlns:a="http://schemas.openxmlformats.org/drawingml/2006/main" xmlns:p="http://schemas.openxmlformats.org/presentationml/2006/main" xmlns:r="http://schemas.openxmlformats.org/officeDocument/2006/relationships">
-  <p:cSld>
-    <p:spTree>
-      <p:nvGrpSpPr>
-        <p:cNvPr id="1" name=""/>
-        <p:cNvGrpSpPr/>
-        <p:nvPr/>
-      </p:nvGrpSpPr>
-      <p:grpSpPr/>
-      <p:sp>
-        <p:nvSpPr>
-          <p:cNvPr id="2" name="Title 1"/>
-          <p:cNvSpPr>
-            <a:spLocks noGrp="1"/>
-          </p:cNvSpPr>
-          <p:nvPr>
-            <p:ph type="ctrTitle"/>
-          </p:nvPr>
-        </p:nvSpPr>
-        <p:spPr/>
-        <p:txBody>
-          <a:bodyPr/>
-          <a:lstStyle/>
+            <a:r>
+              <a:t>Frage an die Teilnehmer:</a:t>
+            </a:r>
+          </a:p>
+          <a:p>
+            <a:r>
+              <a:t>"Was ist Ihr persönliches Lernziel für diese 4 Blöcke?"</a:t>
+            </a:r>
+          </a:p>
           <a:p/>
-        </p:txBody>
-      </p:sp>
-      <p:sp>
-        <p:nvSpPr>
-          <p:cNvPr id="3" name="Subtitle 2"/>
-          <p:cNvSpPr>
-            <a:spLocks noGrp="1"/>
-          </p:cNvSpPr>
-          <p:nvPr>
-            <p:ph type="subTitle" idx="1"/>
-          </p:nvPr>
-        </p:nvSpPr>
-        <p:spPr/>
-        <p:txBody>
-          <a:bodyPr/>
-          <a:lstStyle/>
+          <a:p>
+            <a:r>
+              <a:t>Zielsetzung: Systematische Anwendung von Design Patterns zur Verbesserung von Code-Qualität, Wartbarkeit und Systemarchitektur in Enterprise-Umgebungen.</a:t>
+            </a:r>
+          </a:p>
           <a:p/>
-        </p:txBody>
-      </p:sp>
-    </p:spTree>
-  </p:cSld>
-  <p:clrMapOvr>
-    <a:masterClrMapping/>
-  </p:clrMapOvr>
-</p:sld>
-</file>
-
-<file path=ppt/slides/slide37.xml><?xml version="1.0" encoding="utf-8"?>
-<p:sld xmlns:a="http://schemas.openxmlformats.org/drawingml/2006/main" xmlns:p="http://schemas.openxmlformats.org/presentationml/2006/main" xmlns:r="http://schemas.openxmlformats.org/officeDocument/2006/relationships">
-  <p:cSld>
-    <p:spTree>
-      <p:nvGrpSpPr>
-        <p:cNvPr id="1" name=""/>
-        <p:cNvGrpSpPr/>
-        <p:nvPr/>
-      </p:nvGrpSpPr>
-      <p:grpSpPr/>
-      <p:sp>
-        <p:nvSpPr>
-          <p:cNvPr id="2" name="Title 1"/>
-          <p:cNvSpPr>
-            <a:spLocks noGrp="1"/>
-          </p:cNvSpPr>
-          <p:nvPr>
-            <p:ph type="title"/>
-          </p:nvPr>
-        </p:nvSpPr>
-        <p:spPr/>
-        <p:txBody>
-          <a:bodyPr/>
-          <a:lstStyle/>
-          <a:p>
-            <a:r>
-              <a:t>Der Microservices-Hype</a:t>
-            </a:r>
-          </a:p>
-        </p:txBody>
-      </p:sp>
-      <p:sp>
-        <p:nvSpPr>
-          <p:cNvPr id="3" name="Content Placeholder 2"/>
-          <p:cNvSpPr>
-            <a:spLocks noGrp="1"/>
-          </p:cNvSpPr>
-          <p:nvPr>
-            <p:ph idx="1"/>
-          </p:nvPr>
-        </p:nvSpPr>
-        <p:spPr/>
-        <p:txBody>
-          <a:bodyPr/>
-          <a:lstStyle/>
-          <a:p>
-            <a:pPr/>
-            <a:r>
-              <a:t>Problem: Monolith funktioniert gut, aber "Microservices sind modern"</a:t>
-            </a:r>
-          </a:p>
-          <a:p>
-            <a:pPr/>
-            <a:r>
-              <a:t>Entscheidung: Monolith in 20+ Services aufteilen</a:t>
-            </a:r>
-          </a:p>
-          <a:p>
-            <a:pPr/>
-            <a:r>
-              <a:t>Ergebnis: 3x höhere Komplexität, Latenz-Probleme, Debugging-Albtraum</a:t>
-            </a:r>
-          </a:p>
-        </p:txBody>
-      </p:sp>
-    </p:spTree>
-  </p:cSld>
-  <p:clrMapOvr>
-    <a:masterClrMapping/>
-  </p:clrMapOvr>
-</p:sld>
-</file>
-
-<file path=ppt/slides/slide38.xml><?xml version="1.0" encoding="utf-8"?>
-<p:sld xmlns:a="http://schemas.openxmlformats.org/drawingml/2006/main" xmlns:p="http://schemas.openxmlformats.org/presentationml/2006/main" xmlns:r="http://schemas.openxmlformats.org/officeDocument/2006/relationships">
-  <p:cSld>
-    <p:spTree>
-      <p:nvGrpSpPr>
-        <p:cNvPr id="1" name=""/>
-        <p:cNvGrpSpPr/>
-        <p:nvPr/>
-      </p:nvGrpSpPr>
-      <p:grpSpPr/>
-      <p:sp>
-        <p:nvSpPr>
-          <p:cNvPr id="2" name="Title 1"/>
-          <p:cNvSpPr>
-            <a:spLocks noGrp="1"/>
-          </p:cNvSpPr>
-          <p:nvPr>
-            <p:ph type="title"/>
-          </p:nvPr>
-        </p:nvSpPr>
-        <p:spPr/>
-        <p:txBody>
-          <a:bodyPr/>
-          <a:lstStyle/>
-          <a:p>
-            <a:r>
-              <a:t>Die NoSQL-Modernisierung</a:t>
-            </a:r>
-          </a:p>
-        </p:txBody>
-      </p:sp>
-      <p:sp>
-        <p:nvSpPr>
-          <p:cNvPr id="3" name="Content Placeholder 2"/>
-          <p:cNvSpPr>
-            <a:spLocks noGrp="1"/>
-          </p:cNvSpPr>
-          <p:nvPr>
-            <p:ph idx="1"/>
-          </p:nvPr>
-        </p:nvSpPr>
-        <p:spPr/>
-        <p:txBody>
-          <a:bodyPr/>
-          <a:lstStyle/>
-          <a:p>
-            <a:pPr/>
-            <a:r>
-              <a:t>Problem: Bewährte relationale DB für Finanzdaten</a:t>
-            </a:r>
-          </a:p>
-          <a:p>
-            <a:pPr/>
-            <a:r>
-              <a:t>Entscheidung: Migration auf Document-Database</a:t>
-            </a:r>
-          </a:p>
-          <a:p>
-            <a:pPr/>
-            <a:r>
-              <a:t>Ergebnis: Datenkonsistenz-Probleme, Migration zurück nach 18 Monaten</a:t>
-            </a:r>
-          </a:p>
-        </p:txBody>
-      </p:sp>
-    </p:spTree>
-  </p:cSld>
-  <p:clrMapOvr>
-    <a:masterClrMapping/>
-  </p:clrMapOvr>
-</p:sld>
-</file>
-
-<file path=ppt/slides/slide39.xml><?xml version="1.0" encoding="utf-8"?>
-<p:sld xmlns:a="http://schemas.openxmlformats.org/drawingml/2006/main" xmlns:p="http://schemas.openxmlformats.org/presentationml/2006/main" xmlns:r="http://schemas.openxmlformats.org/officeDocument/2006/relationships">
-  <p:cSld>
-    <p:spTree>
-      <p:nvGrpSpPr>
-        <p:cNvPr id="1" name=""/>
-        <p:cNvGrpSpPr/>
-        <p:nvPr/>
-      </p:nvGrpSpPr>
-      <p:grpSpPr/>
-      <p:sp>
-        <p:nvSpPr>
-          <p:cNvPr id="2" name="Title 1"/>
-          <p:cNvSpPr>
-            <a:spLocks noGrp="1"/>
-          </p:cNvSpPr>
-          <p:nvPr>
-            <p:ph type="ctrTitle"/>
-          </p:nvPr>
-        </p:nvSpPr>
-        <p:spPr/>
-        <p:txBody>
-          <a:bodyPr/>
-          <a:lstStyle/>
-          <a:p/>
-        </p:txBody>
-      </p:sp>
-      <p:sp>
-        <p:nvSpPr>
-          <p:cNvPr id="3" name="Subtitle 2"/>
-          <p:cNvSpPr>
-            <a:spLocks noGrp="1"/>
-          </p:cNvSpPr>
-          <p:nvPr>
-            <p:ph type="subTitle" idx="1"/>
-          </p:nvPr>
-        </p:nvSpPr>
-        <p:spPr/>
-        <p:txBody>
-          <a:bodyPr/>
-          <a:lstStyle/>
-          <a:p/>
+          <a:p>
+            <a:r>
+              <a:t>Sind Sie bereit? Dann starten wir mit Block 1: Creational Patterns!</a:t>
+            </a:r>
+          </a:p>
         </p:txBody>
       </p:sp>
     </p:spTree>
@@ -8762,162 +8943,6 @@
             <a:spLocks noGrp="1"/>
           </p:cNvSpPr>
           <p:nvPr>
-            <p:ph type="ctrTitle"/>
-          </p:nvPr>
-        </p:nvSpPr>
-        <p:spPr/>
-        <p:txBody>
-          <a:bodyPr/>
-          <a:lstStyle/>
-          <a:p/>
-        </p:txBody>
-      </p:sp>
-      <p:sp>
-        <p:nvSpPr>
-          <p:cNvPr id="3" name="Subtitle 2"/>
-          <p:cNvSpPr>
-            <a:spLocks noGrp="1"/>
-          </p:cNvSpPr>
-          <p:nvPr>
-            <p:ph type="subTitle" idx="1"/>
-          </p:nvPr>
-        </p:nvSpPr>
-        <p:spPr/>
-        <p:txBody>
-          <a:bodyPr/>
-          <a:lstStyle/>
-          <a:p/>
-        </p:txBody>
-      </p:sp>
-    </p:spTree>
-  </p:cSld>
-  <p:clrMapOvr>
-    <a:masterClrMapping/>
-  </p:clrMapOvr>
-</p:sld>
-</file>
-
-<file path=ppt/slides/slide40.xml><?xml version="1.0" encoding="utf-8"?>
-<p:sld xmlns:a="http://schemas.openxmlformats.org/drawingml/2006/main" xmlns:p="http://schemas.openxmlformats.org/presentationml/2006/main" xmlns:r="http://schemas.openxmlformats.org/officeDocument/2006/relationships">
-  <p:cSld>
-    <p:spTree>
-      <p:nvGrpSpPr>
-        <p:cNvPr id="1" name=""/>
-        <p:cNvGrpSpPr/>
-        <p:nvPr/>
-      </p:nvGrpSpPr>
-      <p:grpSpPr/>
-      <p:sp>
-        <p:nvSpPr>
-          <p:cNvPr id="2" name="Title 1"/>
-          <p:cNvSpPr>
-            <a:spLocks noGrp="1"/>
-          </p:cNvSpPr>
-          <p:nvPr>
-            <p:ph type="ctrTitle"/>
-          </p:nvPr>
-        </p:nvSpPr>
-        <p:spPr/>
-        <p:txBody>
-          <a:bodyPr/>
-          <a:lstStyle/>
-          <a:p/>
-        </p:txBody>
-      </p:sp>
-      <p:sp>
-        <p:nvSpPr>
-          <p:cNvPr id="3" name="Subtitle 2"/>
-          <p:cNvSpPr>
-            <a:spLocks noGrp="1"/>
-          </p:cNvSpPr>
-          <p:nvPr>
-            <p:ph type="subTitle" idx="1"/>
-          </p:nvPr>
-        </p:nvSpPr>
-        <p:spPr/>
-        <p:txBody>
-          <a:bodyPr/>
-          <a:lstStyle/>
-          <a:p/>
-        </p:txBody>
-      </p:sp>
-    </p:spTree>
-  </p:cSld>
-  <p:clrMapOvr>
-    <a:masterClrMapping/>
-  </p:clrMapOvr>
-</p:sld>
-</file>
-
-<file path=ppt/slides/slide41.xml><?xml version="1.0" encoding="utf-8"?>
-<p:sld xmlns:a="http://schemas.openxmlformats.org/drawingml/2006/main" xmlns:p="http://schemas.openxmlformats.org/presentationml/2006/main" xmlns:r="http://schemas.openxmlformats.org/officeDocument/2006/relationships">
-  <p:cSld>
-    <p:spTree>
-      <p:nvGrpSpPr>
-        <p:cNvPr id="1" name=""/>
-        <p:cNvGrpSpPr/>
-        <p:nvPr/>
-      </p:nvGrpSpPr>
-      <p:grpSpPr/>
-      <p:sp>
-        <p:nvSpPr>
-          <p:cNvPr id="2" name="Title 1"/>
-          <p:cNvSpPr>
-            <a:spLocks noGrp="1"/>
-          </p:cNvSpPr>
-          <p:nvPr>
-            <p:ph type="ctrTitle"/>
-          </p:nvPr>
-        </p:nvSpPr>
-        <p:spPr/>
-        <p:txBody>
-          <a:bodyPr/>
-          <a:lstStyle/>
-          <a:p/>
-        </p:txBody>
-      </p:sp>
-      <p:sp>
-        <p:nvSpPr>
-          <p:cNvPr id="3" name="Subtitle 2"/>
-          <p:cNvSpPr>
-            <a:spLocks noGrp="1"/>
-          </p:cNvSpPr>
-          <p:nvPr>
-            <p:ph type="subTitle" idx="1"/>
-          </p:nvPr>
-        </p:nvSpPr>
-        <p:spPr/>
-        <p:txBody>
-          <a:bodyPr/>
-          <a:lstStyle/>
-          <a:p/>
-        </p:txBody>
-      </p:sp>
-    </p:spTree>
-  </p:cSld>
-  <p:clrMapOvr>
-    <a:masterClrMapping/>
-  </p:clrMapOvr>
-</p:sld>
-</file>
-
-<file path=ppt/slides/slide42.xml><?xml version="1.0" encoding="utf-8"?>
-<p:sld xmlns:a="http://schemas.openxmlformats.org/drawingml/2006/main" xmlns:p="http://schemas.openxmlformats.org/presentationml/2006/main" xmlns:r="http://schemas.openxmlformats.org/officeDocument/2006/relationships">
-  <p:cSld>
-    <p:spTree>
-      <p:nvGrpSpPr>
-        <p:cNvPr id="1" name=""/>
-        <p:cNvGrpSpPr/>
-        <p:nvPr/>
-      </p:nvGrpSpPr>
-      <p:grpSpPr/>
-      <p:sp>
-        <p:nvSpPr>
-          <p:cNvPr id="2" name="Title 1"/>
-          <p:cNvSpPr>
-            <a:spLocks noGrp="1"/>
-          </p:cNvSpPr>
-          <p:nvPr>
             <p:ph type="title"/>
           </p:nvPr>
         </p:nvSpPr>
@@ -8927,7 +8952,7 @@
           <a:lstStyle/>
           <a:p>
             <a:r>
-              <a:t>Fragen in der richtigen Reihenfolge</a:t>
+              <a:t>Block 1: Creational Patterns - Schwerpunkt: Objekterzeugung</a:t>
             </a:r>
           </a:p>
         </p:txBody>
@@ -8947,493 +8972,28 @@
           <a:bodyPr/>
           <a:lstStyle/>
           <a:p>
-            <a:pPr/>
-            <a:r>
-              <a:t>Was soll das System tun? Warum ist das wichtig? Wer sind die Stakeholder?</a:t>
-            </a:r>
-          </a:p>
-          <a:p>
-            <a:pPr/>
-            <a:r>
-              <a:t>Welche fachlichen Bereiche gibt es? Wo sind die Grenzen? Wie kommunizieren sie?</a:t>
-            </a:r>
-          </a:p>
-          <a:p>
-            <a:pPr/>
-            <a:r>
-              <a:t>Womit implementieren wir das am besten? Was löst unsere spezifischen Probleme?</a:t>
-            </a:r>
-          </a:p>
-        </p:txBody>
-      </p:sp>
-    </p:spTree>
-  </p:cSld>
-  <p:clrMapOvr>
-    <a:masterClrMapping/>
-  </p:clrMapOvr>
-</p:sld>
-</file>
-
-<file path=ppt/slides/slide43.xml><?xml version="1.0" encoding="utf-8"?>
-<p:sld xmlns:a="http://schemas.openxmlformats.org/drawingml/2006/main" xmlns:p="http://schemas.openxmlformats.org/presentationml/2006/main" xmlns:r="http://schemas.openxmlformats.org/officeDocument/2006/relationships">
-  <p:cSld>
-    <p:spTree>
-      <p:nvGrpSpPr>
-        <p:cNvPr id="1" name=""/>
-        <p:cNvGrpSpPr/>
-        <p:nvPr/>
-      </p:nvGrpSpPr>
-      <p:grpSpPr/>
-      <p:sp>
-        <p:nvSpPr>
-          <p:cNvPr id="2" name="Title 1"/>
-          <p:cNvSpPr>
-            <a:spLocks noGrp="1"/>
-          </p:cNvSpPr>
-          <p:nvPr>
-            <p:ph type="ctrTitle"/>
-          </p:nvPr>
-        </p:nvSpPr>
-        <p:spPr/>
-        <p:txBody>
-          <a:bodyPr/>
-          <a:lstStyle/>
-          <a:p/>
-        </p:txBody>
-      </p:sp>
-      <p:sp>
-        <p:nvSpPr>
-          <p:cNvPr id="3" name="Subtitle 2"/>
-          <p:cNvSpPr>
-            <a:spLocks noGrp="1"/>
-          </p:cNvSpPr>
-          <p:nvPr>
-            <p:ph type="subTitle" idx="1"/>
-          </p:nvPr>
-        </p:nvSpPr>
-        <p:spPr/>
-        <p:txBody>
-          <a:bodyPr/>
-          <a:lstStyle/>
-          <a:p/>
-        </p:txBody>
-      </p:sp>
-    </p:spTree>
-  </p:cSld>
-  <p:clrMapOvr>
-    <a:masterClrMapping/>
-  </p:clrMapOvr>
-</p:sld>
-</file>
-
-<file path=ppt/slides/slide44.xml><?xml version="1.0" encoding="utf-8"?>
-<p:sld xmlns:a="http://schemas.openxmlformats.org/drawingml/2006/main" xmlns:p="http://schemas.openxmlformats.org/presentationml/2006/main" xmlns:r="http://schemas.openxmlformats.org/officeDocument/2006/relationships">
-  <p:cSld>
-    <p:spTree>
-      <p:nvGrpSpPr>
-        <p:cNvPr id="1" name=""/>
-        <p:cNvGrpSpPr/>
-        <p:nvPr/>
-      </p:nvGrpSpPr>
-      <p:grpSpPr/>
-      <p:sp>
-        <p:nvSpPr>
-          <p:cNvPr id="2" name="Title 1"/>
-          <p:cNvSpPr>
-            <a:spLocks noGrp="1"/>
-          </p:cNvSpPr>
-          <p:nvPr>
-            <p:ph type="title"/>
-          </p:nvPr>
-        </p:nvSpPr>
-        <p:spPr/>
-        <p:txBody>
-          <a:bodyPr/>
-          <a:lstStyle/>
-          <a:p>
-            <a:r>
-              <a:t>Geschichte: Warum entstanden Design Patterns?</a:t>
-            </a:r>
-          </a:p>
-        </p:txBody>
-      </p:sp>
-      <p:sp>
-        <p:nvSpPr>
-          <p:cNvPr id="3" name="Content Placeholder 2"/>
-          <p:cNvSpPr>
-            <a:spLocks noGrp="1"/>
-          </p:cNvSpPr>
-          <p:nvPr>
-            <p:ph idx="1"/>
-          </p:nvPr>
-        </p:nvSpPr>
-        <p:spPr/>
-        <p:txBody>
-          <a:bodyPr/>
-          <a:lstStyle/>
-          <a:p>
-            <a:pPr/>
-            <a:r>
-              <a:t>Christopher Alexander (1977): "A Pattern Language" - Gebäude-Architektur!</a:t>
-            </a:r>
-          </a:p>
-          <a:p>
-            <a:pPr/>
-            <a:r>
-              <a:t>Gang of Four (1994): Übertragung auf Software</a:t>
-            </a:r>
-          </a:p>
-          <a:p>
-            <a:pPr/>
-            <a:r>
-              <a:t>Problem 1: Wiederkehrende Design-Probleme</a:t>
-            </a:r>
-          </a:p>
-          <a:p>
-            <a:pPr/>
-            <a:r>
-              <a:t>Problem 2: Schlechte Kommunikation zwischen Entwicklern</a:t>
-            </a:r>
-          </a:p>
-          <a:p>
-            <a:pPr/>
-            <a:r>
-              <a:t>Problem 3: Fehlende Best Practices</a:t>
-            </a:r>
-          </a:p>
-        </p:txBody>
-      </p:sp>
-    </p:spTree>
-  </p:cSld>
-  <p:clrMapOvr>
-    <a:masterClrMapping/>
-  </p:clrMapOvr>
-</p:sld>
-</file>
-
-<file path=ppt/slides/slide45.xml><?xml version="1.0" encoding="utf-8"?>
-<p:sld xmlns:a="http://schemas.openxmlformats.org/drawingml/2006/main" xmlns:p="http://schemas.openxmlformats.org/presentationml/2006/main" xmlns:r="http://schemas.openxmlformats.org/officeDocument/2006/relationships">
-  <p:cSld>
-    <p:spTree>
-      <p:nvGrpSpPr>
-        <p:cNvPr id="1" name=""/>
-        <p:cNvGrpSpPr/>
-        <p:nvPr/>
-      </p:nvGrpSpPr>
-      <p:grpSpPr/>
-      <p:sp>
-        <p:nvSpPr>
-          <p:cNvPr id="2" name="Title 1"/>
-          <p:cNvSpPr>
-            <a:spLocks noGrp="1"/>
-          </p:cNvSpPr>
-          <p:nvPr>
-            <p:ph type="ctrTitle"/>
-          </p:nvPr>
-        </p:nvSpPr>
-        <p:spPr/>
-        <p:txBody>
-          <a:bodyPr/>
-          <a:lstStyle/>
-          <a:p/>
-        </p:txBody>
-      </p:sp>
-      <p:sp>
-        <p:nvSpPr>
-          <p:cNvPr id="3" name="Subtitle 2"/>
-          <p:cNvSpPr>
-            <a:spLocks noGrp="1"/>
-          </p:cNvSpPr>
-          <p:nvPr>
-            <p:ph type="subTitle" idx="1"/>
-          </p:nvPr>
-        </p:nvSpPr>
-        <p:spPr/>
-        <p:txBody>
-          <a:bodyPr/>
-          <a:lstStyle/>
-          <a:p/>
-        </p:txBody>
-      </p:sp>
-    </p:spTree>
-  </p:cSld>
-  <p:clrMapOvr>
-    <a:masterClrMapping/>
-  </p:clrMapOvr>
-</p:sld>
-</file>
-
-<file path=ppt/slides/slide46.xml><?xml version="1.0" encoding="utf-8"?>
-<p:sld xmlns:a="http://schemas.openxmlformats.org/drawingml/2006/main" xmlns:p="http://schemas.openxmlformats.org/presentationml/2006/main" xmlns:r="http://schemas.openxmlformats.org/officeDocument/2006/relationships">
-  <p:cSld>
-    <p:spTree>
-      <p:nvGrpSpPr>
-        <p:cNvPr id="1" name=""/>
-        <p:cNvGrpSpPr/>
-        <p:nvPr/>
-      </p:nvGrpSpPr>
-      <p:grpSpPr/>
-      <p:sp>
-        <p:nvSpPr>
-          <p:cNvPr id="2" name="Title 1"/>
-          <p:cNvSpPr>
-            <a:spLocks noGrp="1"/>
-          </p:cNvSpPr>
-          <p:nvPr>
-            <p:ph type="title"/>
-          </p:nvPr>
-        </p:nvSpPr>
-        <p:spPr/>
-        <p:txBody>
-          <a:bodyPr/>
-          <a:lstStyle/>
-          <a:p>
-            <a:r>
-              <a:t>Vier Hauptvorteile</a:t>
-            </a:r>
-          </a:p>
-        </p:txBody>
-      </p:sp>
-      <p:sp>
-        <p:nvSpPr>
-          <p:cNvPr id="3" name="Content Placeholder 2"/>
-          <p:cNvSpPr>
-            <a:spLocks noGrp="1"/>
-          </p:cNvSpPr>
-          <p:nvPr>
-            <p:ph idx="1"/>
-          </p:nvPr>
-        </p:nvSpPr>
-        <p:spPr/>
-        <p:txBody>
-          <a:bodyPr/>
-          <a:lstStyle/>
-          <a:p>
-            <a:pPr/>
-            <a:r>
-              <a:t>**Bewährte Lösungen nutzen**: Anstatt Rad neu erfinden</a:t>
-            </a:r>
-          </a:p>
-          <a:p>
-            <a:pPr/>
-            <a:r>
-              <a:t>**Gemeinsame Sprache entwickeln**: Vokabular für Teams</a:t>
-            </a:r>
-          </a:p>
-          <a:p>
-            <a:pPr/>
-            <a:r>
-              <a:t>**Design-Qualität verbessern**: SOLID-Prinzipien kodifiziert</a:t>
-            </a:r>
-          </a:p>
-          <a:p>
-            <a:pPr/>
-            <a:r>
-              <a:t>**Wartbarkeit erhöhen**: Bekannte Patterns sind verständlicher</a:t>
-            </a:r>
-          </a:p>
-        </p:txBody>
-      </p:sp>
-    </p:spTree>
-  </p:cSld>
-  <p:clrMapOvr>
-    <a:masterClrMapping/>
-  </p:clrMapOvr>
-</p:sld>
-</file>
-
-<file path=ppt/slides/slide47.xml><?xml version="1.0" encoding="utf-8"?>
-<p:sld xmlns:a="http://schemas.openxmlformats.org/drawingml/2006/main" xmlns:p="http://schemas.openxmlformats.org/presentationml/2006/main" xmlns:r="http://schemas.openxmlformats.org/officeDocument/2006/relationships">
-  <p:cSld>
-    <p:spTree>
-      <p:nvGrpSpPr>
-        <p:cNvPr id="1" name=""/>
-        <p:cNvGrpSpPr/>
-        <p:nvPr/>
-      </p:nvGrpSpPr>
-      <p:grpSpPr/>
-      <p:sp>
-        <p:nvSpPr>
-          <p:cNvPr id="2" name="Title 1"/>
-          <p:cNvSpPr>
-            <a:spLocks noGrp="1"/>
-          </p:cNvSpPr>
-          <p:nvPr>
-            <p:ph type="ctrTitle"/>
-          </p:nvPr>
-        </p:nvSpPr>
-        <p:spPr/>
-        <p:txBody>
-          <a:bodyPr/>
-          <a:lstStyle/>
-          <a:p/>
-        </p:txBody>
-      </p:sp>
-      <p:sp>
-        <p:nvSpPr>
-          <p:cNvPr id="3" name="Subtitle 2"/>
-          <p:cNvSpPr>
-            <a:spLocks noGrp="1"/>
-          </p:cNvSpPr>
-          <p:nvPr>
-            <p:ph type="subTitle" idx="1"/>
-          </p:nvPr>
-        </p:nvSpPr>
-        <p:spPr/>
-        <p:txBody>
-          <a:bodyPr/>
-          <a:lstStyle/>
-          <a:p/>
-        </p:txBody>
-      </p:sp>
-    </p:spTree>
-  </p:cSld>
-  <p:clrMapOvr>
-    <a:masterClrMapping/>
-  </p:clrMapOvr>
-</p:sld>
-</file>
-
-<file path=ppt/slides/slide48.xml><?xml version="1.0" encoding="utf-8"?>
-<p:sld xmlns:a="http://schemas.openxmlformats.org/drawingml/2006/main" xmlns:p="http://schemas.openxmlformats.org/presentationml/2006/main" xmlns:r="http://schemas.openxmlformats.org/officeDocument/2006/relationships">
-  <p:cSld>
-    <p:spTree>
-      <p:nvGrpSpPr>
-        <p:cNvPr id="1" name=""/>
-        <p:cNvGrpSpPr/>
-        <p:nvPr/>
-      </p:nvGrpSpPr>
-      <p:grpSpPr/>
-      <p:sp>
-        <p:nvSpPr>
-          <p:cNvPr id="2" name="Title 1"/>
-          <p:cNvSpPr>
-            <a:spLocks noGrp="1"/>
-          </p:cNvSpPr>
-          <p:nvPr>
-            <p:ph type="title"/>
-          </p:nvPr>
-        </p:nvSpPr>
-        <p:spPr/>
-        <p:txBody>
-          <a:bodyPr/>
-          <a:lstStyle/>
-          <a:p>
-            <a:r>
-              <a:t>Pattern-Missbrauch vermeiden</a:t>
-            </a:r>
-          </a:p>
-        </p:txBody>
-      </p:sp>
-      <p:sp>
-        <p:nvSpPr>
-          <p:cNvPr id="3" name="Content Placeholder 2"/>
-          <p:cNvSpPr>
-            <a:spLocks noGrp="1"/>
-          </p:cNvSpPr>
-          <p:nvPr>
-            <p:ph idx="1"/>
-          </p:nvPr>
-        </p:nvSpPr>
-        <p:spPr/>
-        <p:txBody>
-          <a:bodyPr/>
-          <a:lstStyle/>
-          <a:p>
-            <a:pPr/>
-            <a:r>
-              <a:t>Silberkugeln: Patterns lösen nicht alle Probleme</a:t>
-            </a:r>
-          </a:p>
-          <a:p>
-            <a:pPr/>
-            <a:r>
-              <a:t>Dogmen: Patterns müssen nicht sklavisch befolgt werden</a:t>
-            </a:r>
-          </a:p>
-          <a:p>
-            <a:pPr/>
-            <a:r>
-              <a:t>Komplexität um der Komplexität willen</a:t>
-            </a:r>
-          </a:p>
-          <a:p>
-            <a:pPr/>
-            <a:r>
-              <a:t>Copy-Paste Code: Patterns sind konzeptuelle Lösungen</a:t>
-            </a:r>
-          </a:p>
-        </p:txBody>
-      </p:sp>
-    </p:spTree>
-  </p:cSld>
-  <p:clrMapOvr>
-    <a:masterClrMapping/>
-  </p:clrMapOvr>
-</p:sld>
-</file>
-
-<file path=ppt/slides/slide49.xml><?xml version="1.0" encoding="utf-8"?>
-<p:sld xmlns:a="http://schemas.openxmlformats.org/drawingml/2006/main" xmlns:p="http://schemas.openxmlformats.org/presentationml/2006/main" xmlns:r="http://schemas.openxmlformats.org/officeDocument/2006/relationships">
-  <p:cSld>
-    <p:spTree>
-      <p:nvGrpSpPr>
-        <p:cNvPr id="1" name=""/>
-        <p:cNvGrpSpPr/>
-        <p:nvPr/>
-      </p:nvGrpSpPr>
-      <p:grpSpPr/>
-      <p:sp>
-        <p:nvSpPr>
-          <p:cNvPr id="2" name="Title 1"/>
-          <p:cNvSpPr>
-            <a:spLocks noGrp="1"/>
-          </p:cNvSpPr>
-          <p:nvPr>
-            <p:ph type="title"/>
-          </p:nvPr>
-        </p:nvSpPr>
-        <p:spPr/>
-        <p:txBody>
-          <a:bodyPr/>
-          <a:lstStyle/>
-          <a:p>
-            <a:r>
-              <a:t>Anti-Beispiel aus der Praxis</a:t>
-            </a:r>
-          </a:p>
-        </p:txBody>
-      </p:sp>
-      <p:sp>
-        <p:nvSpPr>
-          <p:cNvPr id="3" name="Content Placeholder 2"/>
-          <p:cNvSpPr>
-            <a:spLocks noGrp="1"/>
-          </p:cNvSpPr>
-          <p:nvPr>
-            <p:ph idx="1"/>
-          </p:nvPr>
-        </p:nvSpPr>
-        <p:spPr/>
-        <p:txBody>
-          <a:bodyPr/>
-          <a:lstStyle/>
-          <a:p>
-            <a:pPr/>
-            <a:r>
-              <a:t>Problem: Einfache Konfigurationswerte lesen</a:t>
-            </a:r>
-          </a:p>
-          <a:p>
-            <a:pPr/>
-            <a:r>
-              <a:t>Overengineered: AbstractConfigurationFactoryBuilderStrategyProxy</a:t>
-            </a:r>
-          </a:p>
-          <a:p>
-            <a:pPr/>
-            <a:r>
-              <a:t>Einfach: Properties.load()</a:t>
+            <a:r>
+              <a:t>Factory Method: Objekterzeugung ohne konkrete Klassen</a:t>
+            </a:r>
+          </a:p>
+          <a:p>
+            <a:r>
+              <a:t>Abstract Factory: Familien verwandter Objekte</a:t>
+            </a:r>
+          </a:p>
+          <a:p>
+            <a:r>
+              <a:t>Builder: Komplexe Objekte Schritt für Schritt aufbauen</a:t>
+            </a:r>
+          </a:p>
+          <a:p>
+            <a:r>
+              <a:t>Prototype: Objektklonierung für kostspielige Initialisierung</a:t>
+            </a:r>
+          </a:p>
+          <a:p>
+            <a:r>
+              <a:t>Singleton: Eine Instanz für das ganze System</a:t>
             </a:r>
           </a:p>
         </p:txBody>
@@ -9472,7 +9032,7 @@
           <a:lstStyle/>
           <a:p>
             <a:r>
-              <a:t>Schwerpunkt: Objekterzeugung</a:t>
+              <a:t>Block 2: Structural Patterns - Schwerpunkt: Strukturelle Komposition</a:t>
             </a:r>
           </a:p>
         </p:txBody>
@@ -9492,612 +9052,25 @@
           <a:bodyPr/>
           <a:lstStyle/>
           <a:p>
-            <a:pPr/>
-            <a:r>
-              <a:t>Factory Method: Objekterzeugung ohne konkrete Klassen</a:t>
-            </a:r>
-          </a:p>
-          <a:p>
-            <a:pPr/>
-            <a:r>
-              <a:t>Abstract Factory: Familien verwandter Objekte</a:t>
-            </a:r>
-          </a:p>
-          <a:p>
-            <a:pPr/>
-            <a:r>
-              <a:t>Builder: Komplexe Objekte Schritt für Schritt aufbauen</a:t>
-            </a:r>
-          </a:p>
-          <a:p>
-            <a:pPr/>
-            <a:r>
-              <a:t>Prototype: Objektklonierung für kostspielige Initialisierung</a:t>
-            </a:r>
-          </a:p>
-          <a:p>
-            <a:pPr/>
-            <a:r>
-              <a:t>Singleton: Eine Instanz für das ganze System</a:t>
-            </a:r>
-          </a:p>
-        </p:txBody>
-      </p:sp>
-    </p:spTree>
-  </p:cSld>
-  <p:clrMapOvr>
-    <a:masterClrMapping/>
-  </p:clrMapOvr>
-</p:sld>
-</file>
-
-<file path=ppt/slides/slide50.xml><?xml version="1.0" encoding="utf-8"?>
-<p:sld xmlns:a="http://schemas.openxmlformats.org/drawingml/2006/main" xmlns:p="http://schemas.openxmlformats.org/presentationml/2006/main" xmlns:r="http://schemas.openxmlformats.org/officeDocument/2006/relationships">
-  <p:cSld>
-    <p:spTree>
-      <p:nvGrpSpPr>
-        <p:cNvPr id="1" name=""/>
-        <p:cNvGrpSpPr/>
-        <p:nvPr/>
-      </p:nvGrpSpPr>
-      <p:grpSpPr/>
-      <p:sp>
-        <p:nvSpPr>
-          <p:cNvPr id="2" name="Title 1"/>
-          <p:cNvSpPr>
-            <a:spLocks noGrp="1"/>
-          </p:cNvSpPr>
-          <p:nvPr>
-            <p:ph type="ctrTitle"/>
-          </p:nvPr>
-        </p:nvSpPr>
-        <p:spPr/>
-        <p:txBody>
-          <a:bodyPr/>
-          <a:lstStyle/>
-          <a:p/>
-        </p:txBody>
-      </p:sp>
-      <p:sp>
-        <p:nvSpPr>
-          <p:cNvPr id="3" name="Subtitle 2"/>
-          <p:cNvSpPr>
-            <a:spLocks noGrp="1"/>
-          </p:cNvSpPr>
-          <p:nvPr>
-            <p:ph type="subTitle" idx="1"/>
-          </p:nvPr>
-        </p:nvSpPr>
-        <p:spPr/>
-        <p:txBody>
-          <a:bodyPr/>
-          <a:lstStyle/>
-          <a:p/>
-        </p:txBody>
-      </p:sp>
-    </p:spTree>
-  </p:cSld>
-  <p:clrMapOvr>
-    <a:masterClrMapping/>
-  </p:clrMapOvr>
-</p:sld>
-</file>
-
-<file path=ppt/slides/slide51.xml><?xml version="1.0" encoding="utf-8"?>
-<p:sld xmlns:a="http://schemas.openxmlformats.org/drawingml/2006/main" xmlns:p="http://schemas.openxmlformats.org/presentationml/2006/main" xmlns:r="http://schemas.openxmlformats.org/officeDocument/2006/relationships">
-  <p:cSld>
-    <p:spTree>
-      <p:nvGrpSpPr>
-        <p:cNvPr id="1" name=""/>
-        <p:cNvGrpSpPr/>
-        <p:nvPr/>
-      </p:nvGrpSpPr>
-      <p:grpSpPr/>
-      <p:sp>
-        <p:nvSpPr>
-          <p:cNvPr id="2" name="Title 1"/>
-          <p:cNvSpPr>
-            <a:spLocks noGrp="1"/>
-          </p:cNvSpPr>
-          <p:nvPr>
-            <p:ph type="ctrTitle"/>
-          </p:nvPr>
-        </p:nvSpPr>
-        <p:spPr/>
-        <p:txBody>
-          <a:bodyPr/>
-          <a:lstStyle/>
-          <a:p/>
-        </p:txBody>
-      </p:sp>
-      <p:sp>
-        <p:nvSpPr>
-          <p:cNvPr id="3" name="Subtitle 2"/>
-          <p:cNvSpPr>
-            <a:spLocks noGrp="1"/>
-          </p:cNvSpPr>
-          <p:nvPr>
-            <p:ph type="subTitle" idx="1"/>
-          </p:nvPr>
-        </p:nvSpPr>
-        <p:spPr/>
-        <p:txBody>
-          <a:bodyPr/>
-          <a:lstStyle/>
-          <a:p/>
-        </p:txBody>
-      </p:sp>
-    </p:spTree>
-  </p:cSld>
-  <p:clrMapOvr>
-    <a:masterClrMapping/>
-  </p:clrMapOvr>
-</p:sld>
-</file>
-
-<file path=ppt/slides/slide52.xml><?xml version="1.0" encoding="utf-8"?>
-<p:sld xmlns:a="http://schemas.openxmlformats.org/drawingml/2006/main" xmlns:p="http://schemas.openxmlformats.org/presentationml/2006/main" xmlns:r="http://schemas.openxmlformats.org/officeDocument/2006/relationships">
-  <p:cSld>
-    <p:spTree>
-      <p:nvGrpSpPr>
-        <p:cNvPr id="1" name=""/>
-        <p:cNvGrpSpPr/>
-        <p:nvPr/>
-      </p:nvGrpSpPr>
-      <p:grpSpPr/>
-      <p:sp>
-        <p:nvSpPr>
-          <p:cNvPr id="2" name="Title 1"/>
-          <p:cNvSpPr>
-            <a:spLocks noGrp="1"/>
-          </p:cNvSpPr>
-          <p:nvPr>
-            <p:ph type="title"/>
-          </p:nvPr>
-        </p:nvSpPr>
-        <p:spPr/>
-        <p:txBody>
-          <a:bodyPr/>
-          <a:lstStyle/>
-          <a:p>
-            <a:r>
-              <a:t>Schlüsselelemente</a:t>
-            </a:r>
-          </a:p>
-        </p:txBody>
-      </p:sp>
-      <p:sp>
-        <p:nvSpPr>
-          <p:cNvPr id="3" name="Content Placeholder 2"/>
-          <p:cNvSpPr>
-            <a:spLocks noGrp="1"/>
-          </p:cNvSpPr>
-          <p:nvPr>
-            <p:ph idx="1"/>
-          </p:nvPr>
-        </p:nvSpPr>
-        <p:spPr/>
-        <p:txBody>
-          <a:bodyPr/>
-          <a:lstStyle/>
-          <a:p>
-            <a:pPr/>
-            <a:r>
-              <a:t>Verhalten bleibt gleich - Funktionalität ändert sich nicht</a:t>
-            </a:r>
-          </a:p>
-          <a:p>
-            <a:pPr/>
-            <a:r>
-              <a:t>Struktur wird besser - Code wird wartbarer</a:t>
-            </a:r>
-          </a:p>
-          <a:p>
-            <a:pPr/>
-            <a:r>
-              <a:t>Kleine Schritte - Viele kleine, sichere Änderungen</a:t>
-            </a:r>
-          </a:p>
-        </p:txBody>
-      </p:sp>
-    </p:spTree>
-  </p:cSld>
-  <p:clrMapOvr>
-    <a:masterClrMapping/>
-  </p:clrMapOvr>
-</p:sld>
-</file>
-
-<file path=ppt/slides/slide53.xml><?xml version="1.0" encoding="utf-8"?>
-<p:sld xmlns:a="http://schemas.openxmlformats.org/drawingml/2006/main" xmlns:p="http://schemas.openxmlformats.org/presentationml/2006/main" xmlns:r="http://schemas.openxmlformats.org/officeDocument/2006/relationships">
-  <p:cSld>
-    <p:spTree>
-      <p:nvGrpSpPr>
-        <p:cNvPr id="1" name=""/>
-        <p:cNvGrpSpPr/>
-        <p:nvPr/>
-      </p:nvGrpSpPr>
-      <p:grpSpPr/>
-      <p:sp>
-        <p:nvSpPr>
-          <p:cNvPr id="2" name="Title 1"/>
-          <p:cNvSpPr>
-            <a:spLocks noGrp="1"/>
-          </p:cNvSpPr>
-          <p:nvPr>
-            <p:ph type="ctrTitle"/>
-          </p:nvPr>
-        </p:nvSpPr>
-        <p:spPr/>
-        <p:txBody>
-          <a:bodyPr/>
-          <a:lstStyle/>
-          <a:p/>
-        </p:txBody>
-      </p:sp>
-      <p:sp>
-        <p:nvSpPr>
-          <p:cNvPr id="3" name="Subtitle 2"/>
-          <p:cNvSpPr>
-            <a:spLocks noGrp="1"/>
-          </p:cNvSpPr>
-          <p:nvPr>
-            <p:ph type="subTitle" idx="1"/>
-          </p:nvPr>
-        </p:nvSpPr>
-        <p:spPr/>
-        <p:txBody>
-          <a:bodyPr/>
-          <a:lstStyle/>
-          <a:p/>
-        </p:txBody>
-      </p:sp>
-    </p:spTree>
-  </p:cSld>
-  <p:clrMapOvr>
-    <a:masterClrMapping/>
-  </p:clrMapOvr>
-</p:sld>
-</file>
-
-<file path=ppt/slides/slide54.xml><?xml version="1.0" encoding="utf-8"?>
-<p:sld xmlns:a="http://schemas.openxmlformats.org/drawingml/2006/main" xmlns:p="http://schemas.openxmlformats.org/presentationml/2006/main" xmlns:r="http://schemas.openxmlformats.org/officeDocument/2006/relationships">
-  <p:cSld>
-    <p:spTree>
-      <p:nvGrpSpPr>
-        <p:cNvPr id="1" name=""/>
-        <p:cNvGrpSpPr/>
-        <p:nvPr/>
-      </p:nvGrpSpPr>
-      <p:grpSpPr/>
-      <p:sp>
-        <p:nvSpPr>
-          <p:cNvPr id="2" name="Title 1"/>
-          <p:cNvSpPr>
-            <a:spLocks noGrp="1"/>
-          </p:cNvSpPr>
-          <p:nvPr>
-            <p:ph type="ctrTitle"/>
-          </p:nvPr>
-        </p:nvSpPr>
-        <p:spPr/>
-        <p:txBody>
-          <a:bodyPr/>
-          <a:lstStyle/>
-          <a:p/>
-        </p:txBody>
-      </p:sp>
-      <p:sp>
-        <p:nvSpPr>
-          <p:cNvPr id="3" name="Subtitle 2"/>
-          <p:cNvSpPr>
-            <a:spLocks noGrp="1"/>
-          </p:cNvSpPr>
-          <p:nvPr>
-            <p:ph type="subTitle" idx="1"/>
-          </p:nvPr>
-        </p:nvSpPr>
-        <p:spPr/>
-        <p:txBody>
-          <a:bodyPr/>
-          <a:lstStyle/>
-          <a:p/>
-        </p:txBody>
-      </p:sp>
-    </p:spTree>
-  </p:cSld>
-  <p:clrMapOvr>
-    <a:masterClrMapping/>
-  </p:clrMapOvr>
-</p:sld>
-</file>
-
-<file path=ppt/slides/slide55.xml><?xml version="1.0" encoding="utf-8"?>
-<p:sld xmlns:a="http://schemas.openxmlformats.org/drawingml/2006/main" xmlns:p="http://schemas.openxmlformats.org/presentationml/2006/main" xmlns:r="http://schemas.openxmlformats.org/officeDocument/2006/relationships">
-  <p:cSld>
-    <p:spTree>
-      <p:nvGrpSpPr>
-        <p:cNvPr id="1" name=""/>
-        <p:cNvGrpSpPr/>
-        <p:nvPr/>
-      </p:nvGrpSpPr>
-      <p:grpSpPr/>
-      <p:sp>
-        <p:nvSpPr>
-          <p:cNvPr id="2" name="Title 1"/>
-          <p:cNvSpPr>
-            <a:spLocks noGrp="1"/>
-          </p:cNvSpPr>
-          <p:nvPr>
-            <p:ph type="title"/>
-          </p:nvPr>
-        </p:nvSpPr>
-        <p:spPr/>
-        <p:txBody>
-          <a:bodyPr/>
-          <a:lstStyle/>
-          <a:p>
-            <a:r>
-              <a:t>Praktische Anwendung</a:t>
-            </a:r>
-          </a:p>
-        </p:txBody>
-      </p:sp>
-      <p:sp>
-        <p:nvSpPr>
-          <p:cNvPr id="3" name="Content Placeholder 2"/>
-          <p:cNvSpPr>
-            <a:spLocks noGrp="1"/>
-          </p:cNvSpPr>
-          <p:nvPr>
-            <p:ph idx="1"/>
-          </p:nvPr>
-        </p:nvSpPr>
-        <p:spPr/>
-        <p:txBody>
-          <a:bodyPr/>
-          <a:lstStyle/>
-          <a:p>
-            <a:pPr/>
-            <a:r>
-              <a:t>Bei jedem Code-Touch: Verstehe → Verbessere → Prüfe → Committe</a:t>
-            </a:r>
-          </a:p>
-          <a:p>
-            <a:pPr/>
-            <a:r>
-              <a:t>Konkrete Aktionen: Variable umbenennen, Magic Numbers extrahieren, Long Methods aufteilen</a:t>
-            </a:r>
-          </a:p>
-        </p:txBody>
-      </p:sp>
-    </p:spTree>
-  </p:cSld>
-  <p:clrMapOvr>
-    <a:masterClrMapping/>
-  </p:clrMapOvr>
-</p:sld>
-</file>
-
-<file path=ppt/slides/slide56.xml><?xml version="1.0" encoding="utf-8"?>
-<p:sld xmlns:a="http://schemas.openxmlformats.org/drawingml/2006/main" xmlns:p="http://schemas.openxmlformats.org/presentationml/2006/main" xmlns:r="http://schemas.openxmlformats.org/officeDocument/2006/relationships">
-  <p:cSld>
-    <p:spTree>
-      <p:nvGrpSpPr>
-        <p:cNvPr id="1" name=""/>
-        <p:cNvGrpSpPr/>
-        <p:nvPr/>
-      </p:nvGrpSpPr>
-      <p:grpSpPr/>
-      <p:sp>
-        <p:nvSpPr>
-          <p:cNvPr id="2" name="Title 1"/>
-          <p:cNvSpPr>
-            <a:spLocks noGrp="1"/>
-          </p:cNvSpPr>
-          <p:nvPr>
-            <p:ph type="ctrTitle"/>
-          </p:nvPr>
-        </p:nvSpPr>
-        <p:spPr/>
-        <p:txBody>
-          <a:bodyPr/>
-          <a:lstStyle/>
-          <a:p/>
-        </p:txBody>
-      </p:sp>
-      <p:sp>
-        <p:nvSpPr>
-          <p:cNvPr id="3" name="Subtitle 2"/>
-          <p:cNvSpPr>
-            <a:spLocks noGrp="1"/>
-          </p:cNvSpPr>
-          <p:nvPr>
-            <p:ph type="subTitle" idx="1"/>
-          </p:nvPr>
-        </p:nvSpPr>
-        <p:spPr/>
-        <p:txBody>
-          <a:bodyPr/>
-          <a:lstStyle/>
-          <a:p/>
-        </p:txBody>
-      </p:sp>
-    </p:spTree>
-  </p:cSld>
-  <p:clrMapOvr>
-    <a:masterClrMapping/>
-  </p:clrMapOvr>
-</p:sld>
-</file>
-
-<file path=ppt/slides/slide57.xml><?xml version="1.0" encoding="utf-8"?>
-<p:sld xmlns:a="http://schemas.openxmlformats.org/drawingml/2006/main" xmlns:p="http://schemas.openxmlformats.org/presentationml/2006/main" xmlns:r="http://schemas.openxmlformats.org/officeDocument/2006/relationships">
-  <p:cSld>
-    <p:spTree>
-      <p:nvGrpSpPr>
-        <p:cNvPr id="1" name=""/>
-        <p:cNvGrpSpPr/>
-        <p:nvPr/>
-      </p:nvGrpSpPr>
-      <p:grpSpPr/>
-      <p:sp>
-        <p:nvSpPr>
-          <p:cNvPr id="2" name="Title 1"/>
-          <p:cNvSpPr>
-            <a:spLocks noGrp="1"/>
-          </p:cNvSpPr>
-          <p:nvPr>
-            <p:ph type="ctrTitle"/>
-          </p:nvPr>
-        </p:nvSpPr>
-        <p:spPr/>
-        <p:txBody>
-          <a:bodyPr/>
-          <a:lstStyle/>
-          <a:p/>
-        </p:txBody>
-      </p:sp>
-      <p:sp>
-        <p:nvSpPr>
-          <p:cNvPr id="3" name="Subtitle 2"/>
-          <p:cNvSpPr>
-            <a:spLocks noGrp="1"/>
-          </p:cNvSpPr>
-          <p:nvPr>
-            <p:ph type="subTitle" idx="1"/>
-          </p:nvPr>
-        </p:nvSpPr>
-        <p:spPr/>
-        <p:txBody>
-          <a:bodyPr/>
-          <a:lstStyle/>
-          <a:p/>
-        </p:txBody>
-      </p:sp>
-    </p:spTree>
-  </p:cSld>
-  <p:clrMapOvr>
-    <a:masterClrMapping/>
-  </p:clrMapOvr>
-</p:sld>
-</file>
-
-<file path=ppt/slides/slide58.xml><?xml version="1.0" encoding="utf-8"?>
-<p:sld xmlns:a="http://schemas.openxmlformats.org/drawingml/2006/main" xmlns:p="http://schemas.openxmlformats.org/presentationml/2006/main" xmlns:r="http://schemas.openxmlformats.org/officeDocument/2006/relationships">
-  <p:cSld>
-    <p:spTree>
-      <p:nvGrpSpPr>
-        <p:cNvPr id="1" name=""/>
-        <p:cNvGrpSpPr/>
-        <p:nvPr/>
-      </p:nvGrpSpPr>
-      <p:grpSpPr/>
-      <p:sp>
-        <p:nvSpPr>
-          <p:cNvPr id="2" name="Title 1"/>
-          <p:cNvSpPr>
-            <a:spLocks noGrp="1"/>
-          </p:cNvSpPr>
-          <p:nvPr>
-            <p:ph type="title"/>
-          </p:nvPr>
-        </p:nvSpPr>
-        <p:spPr/>
-        <p:txBody>
-          <a:bodyPr/>
-          <a:lstStyle/>
-          <a:p>
-            <a:r>
-              <a:t>Refactoring-Trigger</a:t>
-            </a:r>
-          </a:p>
-        </p:txBody>
-      </p:sp>
-      <p:sp>
-        <p:nvSpPr>
-          <p:cNvPr id="3" name="Content Placeholder 2"/>
-          <p:cNvSpPr>
-            <a:spLocks noGrp="1"/>
-          </p:cNvSpPr>
-          <p:nvPr>
-            <p:ph idx="1"/>
-          </p:nvPr>
-        </p:nvSpPr>
-        <p:spPr/>
-        <p:txBody>
-          <a:bodyPr/>
-          <a:lstStyle/>
-          <a:p>
-            <a:pPr/>
-            <a:r>
-              <a:t>Wenn du Code verstehen musst (vor Bug-Fix, vor Feature)</a:t>
-            </a:r>
-          </a:p>
-          <a:p>
-            <a:pPr/>
-            <a:r>
-              <a:t>Wenn du Duplikation siehst (Copy-Paste Code)</a:t>
-            </a:r>
-          </a:p>
-          <a:p>
-            <a:pPr/>
-            <a:r>
-              <a:t>Wenn Code "riecht" (Long Method, Large Class, Long Parameter List)</a:t>
-            </a:r>
-          </a:p>
-        </p:txBody>
-      </p:sp>
-    </p:spTree>
-  </p:cSld>
-  <p:clrMapOvr>
-    <a:masterClrMapping/>
-  </p:clrMapOvr>
-</p:sld>
-</file>
-
-<file path=ppt/slides/slide59.xml><?xml version="1.0" encoding="utf-8"?>
-<p:sld xmlns:a="http://schemas.openxmlformats.org/drawingml/2006/main" xmlns:p="http://schemas.openxmlformats.org/presentationml/2006/main" xmlns:r="http://schemas.openxmlformats.org/officeDocument/2006/relationships">
-  <p:cSld>
-    <p:spTree>
-      <p:nvGrpSpPr>
-        <p:cNvPr id="1" name=""/>
-        <p:cNvGrpSpPr/>
-        <p:nvPr/>
-      </p:nvGrpSpPr>
-      <p:grpSpPr/>
-      <p:sp>
-        <p:nvSpPr>
-          <p:cNvPr id="2" name="Title 1"/>
-          <p:cNvSpPr>
-            <a:spLocks noGrp="1"/>
-          </p:cNvSpPr>
-          <p:nvPr>
-            <p:ph type="ctrTitle"/>
-          </p:nvPr>
-        </p:nvSpPr>
-        <p:spPr/>
-        <p:txBody>
-          <a:bodyPr/>
-          <a:lstStyle/>
-          <a:p/>
-        </p:txBody>
-      </p:sp>
-      <p:sp>
-        <p:nvSpPr>
-          <p:cNvPr id="3" name="Subtitle 2"/>
-          <p:cNvSpPr>
-            <a:spLocks noGrp="1"/>
-          </p:cNvSpPr>
-          <p:nvPr>
-            <p:ph type="subTitle" idx="1"/>
-          </p:nvPr>
-        </p:nvSpPr>
-        <p:spPr/>
-        <p:txBody>
-          <a:bodyPr/>
-          <a:lstStyle/>
-          <a:p/>
+            <a:r>
+              <a:t>Adapter: Inkompatible Schnittstellen verbinden</a:t>
+            </a:r>
+          </a:p>
+          <a:p>
+            <a:r>
+              <a:t>Decorator: Verhalten dynamisch erweitern</a:t>
+            </a:r>
+          </a:p>
+          <a:p>
+            <a:r>
+              <a:t>Facade: Komplexe Subsysteme vereinfachen</a:t>
+            </a:r>
+          </a:p>
+          <a:p>
+            <a:r>
+              <a:t>Composite: Hierarchische Strukturen behandeln</a:t>
+            </a:r>
+          </a:p>
         </p:txBody>
       </p:sp>
     </p:spTree>
@@ -10125,110 +9098,6 @@
             <a:spLocks noGrp="1"/>
           </p:cNvSpPr>
           <p:nvPr>
-            <p:ph type="ctrTitle"/>
-          </p:nvPr>
-        </p:nvSpPr>
-        <p:spPr/>
-        <p:txBody>
-          <a:bodyPr/>
-          <a:lstStyle/>
-          <a:p/>
-        </p:txBody>
-      </p:sp>
-      <p:sp>
-        <p:nvSpPr>
-          <p:cNvPr id="3" name="Subtitle 2"/>
-          <p:cNvSpPr>
-            <a:spLocks noGrp="1"/>
-          </p:cNvSpPr>
-          <p:nvPr>
-            <p:ph type="subTitle" idx="1"/>
-          </p:nvPr>
-        </p:nvSpPr>
-        <p:spPr/>
-        <p:txBody>
-          <a:bodyPr/>
-          <a:lstStyle/>
-          <a:p/>
-        </p:txBody>
-      </p:sp>
-    </p:spTree>
-  </p:cSld>
-  <p:clrMapOvr>
-    <a:masterClrMapping/>
-  </p:clrMapOvr>
-</p:sld>
-</file>
-
-<file path=ppt/slides/slide60.xml><?xml version="1.0" encoding="utf-8"?>
-<p:sld xmlns:a="http://schemas.openxmlformats.org/drawingml/2006/main" xmlns:p="http://schemas.openxmlformats.org/presentationml/2006/main" xmlns:r="http://schemas.openxmlformats.org/officeDocument/2006/relationships">
-  <p:cSld>
-    <p:spTree>
-      <p:nvGrpSpPr>
-        <p:cNvPr id="1" name=""/>
-        <p:cNvGrpSpPr/>
-        <p:nvPr/>
-      </p:nvGrpSpPr>
-      <p:grpSpPr/>
-      <p:sp>
-        <p:nvSpPr>
-          <p:cNvPr id="2" name="Title 1"/>
-          <p:cNvSpPr>
-            <a:spLocks noGrp="1"/>
-          </p:cNvSpPr>
-          <p:nvPr>
-            <p:ph type="ctrTitle"/>
-          </p:nvPr>
-        </p:nvSpPr>
-        <p:spPr/>
-        <p:txBody>
-          <a:bodyPr/>
-          <a:lstStyle/>
-          <a:p/>
-        </p:txBody>
-      </p:sp>
-      <p:sp>
-        <p:nvSpPr>
-          <p:cNvPr id="3" name="Subtitle 2"/>
-          <p:cNvSpPr>
-            <a:spLocks noGrp="1"/>
-          </p:cNvSpPr>
-          <p:nvPr>
-            <p:ph type="subTitle" idx="1"/>
-          </p:nvPr>
-        </p:nvSpPr>
-        <p:spPr/>
-        <p:txBody>
-          <a:bodyPr/>
-          <a:lstStyle/>
-          <a:p/>
-        </p:txBody>
-      </p:sp>
-    </p:spTree>
-  </p:cSld>
-  <p:clrMapOvr>
-    <a:masterClrMapping/>
-  </p:clrMapOvr>
-</p:sld>
-</file>
-
-<file path=ppt/slides/slide61.xml><?xml version="1.0" encoding="utf-8"?>
-<p:sld xmlns:a="http://schemas.openxmlformats.org/drawingml/2006/main" xmlns:p="http://schemas.openxmlformats.org/presentationml/2006/main" xmlns:r="http://schemas.openxmlformats.org/officeDocument/2006/relationships">
-  <p:cSld>
-    <p:spTree>
-      <p:nvGrpSpPr>
-        <p:cNvPr id="1" name=""/>
-        <p:cNvGrpSpPr/>
-        <p:nvPr/>
-      </p:nvGrpSpPr>
-      <p:grpSpPr/>
-      <p:sp>
-        <p:nvSpPr>
-          <p:cNvPr id="2" name="Title 1"/>
-          <p:cNvSpPr>
-            <a:spLocks noGrp="1"/>
-          </p:cNvSpPr>
-          <p:nvPr>
             <p:ph type="title"/>
           </p:nvPr>
         </p:nvSpPr>
@@ -10238,7 +9107,7 @@
           <a:lstStyle/>
           <a:p>
             <a:r>
-              <a:t>Kleine Schritte und IDE-Unterstützung</a:t>
+              <a:t>Block 3: Behavioral Patterns - Schwerpunkt: Verhalten und Kommunikation</a:t>
             </a:r>
           </a:p>
         </p:txBody>
@@ -10258,335 +9127,25 @@
           <a:bodyPr/>
           <a:lstStyle/>
           <a:p>
-            <a:pPr/>
-            <a:r>
-              <a:t>Ein Schritt nach dem anderen</a:t>
-            </a:r>
-          </a:p>
-          <a:p>
-            <a:pPr/>
-            <a:r>
-              <a:t>Extract Method, Rename Variable, Move Method</a:t>
-            </a:r>
-          </a:p>
-          <a:p>
-            <a:pPr/>
-            <a:r>
-              <a:t>IDE kann viel automatisch und sicher machen</a:t>
-            </a:r>
-          </a:p>
-        </p:txBody>
-      </p:sp>
-    </p:spTree>
-  </p:cSld>
-  <p:clrMapOvr>
-    <a:masterClrMapping/>
-  </p:clrMapOvr>
-</p:sld>
-</file>
-
-<file path=ppt/slides/slide62.xml><?xml version="1.0" encoding="utf-8"?>
-<p:sld xmlns:a="http://schemas.openxmlformats.org/drawingml/2006/main" xmlns:p="http://schemas.openxmlformats.org/presentationml/2006/main" xmlns:r="http://schemas.openxmlformats.org/officeDocument/2006/relationships">
-  <p:cSld>
-    <p:spTree>
-      <p:nvGrpSpPr>
-        <p:cNvPr id="1" name=""/>
-        <p:cNvGrpSpPr/>
-        <p:nvPr/>
-      </p:nvGrpSpPr>
-      <p:grpSpPr/>
-      <p:sp>
-        <p:nvSpPr>
-          <p:cNvPr id="2" name="Title 1"/>
-          <p:cNvSpPr>
-            <a:spLocks noGrp="1"/>
-          </p:cNvSpPr>
-          <p:nvPr>
-            <p:ph type="ctrTitle"/>
-          </p:nvPr>
-        </p:nvSpPr>
-        <p:spPr/>
-        <p:txBody>
-          <a:bodyPr/>
-          <a:lstStyle/>
-          <a:p/>
-        </p:txBody>
-      </p:sp>
-      <p:sp>
-        <p:nvSpPr>
-          <p:cNvPr id="3" name="Subtitle 2"/>
-          <p:cNvSpPr>
-            <a:spLocks noGrp="1"/>
-          </p:cNvSpPr>
-          <p:nvPr>
-            <p:ph type="subTitle" idx="1"/>
-          </p:nvPr>
-        </p:nvSpPr>
-        <p:spPr/>
-        <p:txBody>
-          <a:bodyPr/>
-          <a:lstStyle/>
-          <a:p/>
-        </p:txBody>
-      </p:sp>
-    </p:spTree>
-  </p:cSld>
-  <p:clrMapOvr>
-    <a:masterClrMapping/>
-  </p:clrMapOvr>
-</p:sld>
-</file>
-
-<file path=ppt/slides/slide63.xml><?xml version="1.0" encoding="utf-8"?>
-<p:sld xmlns:a="http://schemas.openxmlformats.org/drawingml/2006/main" xmlns:p="http://schemas.openxmlformats.org/presentationml/2006/main" xmlns:r="http://schemas.openxmlformats.org/officeDocument/2006/relationships">
-  <p:cSld>
-    <p:spTree>
-      <p:nvGrpSpPr>
-        <p:cNvPr id="1" name=""/>
-        <p:cNvGrpSpPr/>
-        <p:nvPr/>
-      </p:nvGrpSpPr>
-      <p:grpSpPr/>
-      <p:sp>
-        <p:nvSpPr>
-          <p:cNvPr id="2" name="Title 1"/>
-          <p:cNvSpPr>
-            <a:spLocks noGrp="1"/>
-          </p:cNvSpPr>
-          <p:nvPr>
-            <p:ph type="ctrTitle"/>
-          </p:nvPr>
-        </p:nvSpPr>
-        <p:spPr/>
-        <p:txBody>
-          <a:bodyPr/>
-          <a:lstStyle/>
-          <a:p/>
-        </p:txBody>
-      </p:sp>
-      <p:sp>
-        <p:nvSpPr>
-          <p:cNvPr id="3" name="Subtitle 2"/>
-          <p:cNvSpPr>
-            <a:spLocks noGrp="1"/>
-          </p:cNvSpPr>
-          <p:nvPr>
-            <p:ph type="subTitle" idx="1"/>
-          </p:nvPr>
-        </p:nvSpPr>
-        <p:spPr/>
-        <p:txBody>
-          <a:bodyPr/>
-          <a:lstStyle/>
-          <a:p/>
-        </p:txBody>
-      </p:sp>
-    </p:spTree>
-  </p:cSld>
-  <p:clrMapOvr>
-    <a:masterClrMapping/>
-  </p:clrMapOvr>
-</p:sld>
-</file>
-
-<file path=ppt/slides/slide64.xml><?xml version="1.0" encoding="utf-8"?>
-<p:sld xmlns:a="http://schemas.openxmlformats.org/drawingml/2006/main" xmlns:p="http://schemas.openxmlformats.org/presentationml/2006/main" xmlns:r="http://schemas.openxmlformats.org/officeDocument/2006/relationships">
-  <p:cSld>
-    <p:spTree>
-      <p:nvGrpSpPr>
-        <p:cNvPr id="1" name=""/>
-        <p:cNvGrpSpPr/>
-        <p:nvPr/>
-      </p:nvGrpSpPr>
-      <p:grpSpPr/>
-      <p:sp>
-        <p:nvSpPr>
-          <p:cNvPr id="2" name="Title 1"/>
-          <p:cNvSpPr>
-            <a:spLocks noGrp="1"/>
-          </p:cNvSpPr>
-          <p:nvPr>
-            <p:ph type="ctrTitle"/>
-          </p:nvPr>
-        </p:nvSpPr>
-        <p:spPr/>
-        <p:txBody>
-          <a:bodyPr/>
-          <a:lstStyle/>
-          <a:p/>
-        </p:txBody>
-      </p:sp>
-      <p:sp>
-        <p:nvSpPr>
-          <p:cNvPr id="3" name="Subtitle 2"/>
-          <p:cNvSpPr>
-            <a:spLocks noGrp="1"/>
-          </p:cNvSpPr>
-          <p:nvPr>
-            <p:ph type="subTitle" idx="1"/>
-          </p:nvPr>
-        </p:nvSpPr>
-        <p:spPr/>
-        <p:txBody>
-          <a:bodyPr/>
-          <a:lstStyle/>
-          <a:p/>
-        </p:txBody>
-      </p:sp>
-    </p:spTree>
-  </p:cSld>
-  <p:clrMapOvr>
-    <a:masterClrMapping/>
-  </p:clrMapOvr>
-</p:sld>
-</file>
-
-<file path=ppt/slides/slide65.xml><?xml version="1.0" encoding="utf-8"?>
-<p:sld xmlns:a="http://schemas.openxmlformats.org/drawingml/2006/main" xmlns:p="http://schemas.openxmlformats.org/presentationml/2006/main" xmlns:r="http://schemas.openxmlformats.org/officeDocument/2006/relationships">
-  <p:cSld>
-    <p:spTree>
-      <p:nvGrpSpPr>
-        <p:cNvPr id="1" name=""/>
-        <p:cNvGrpSpPr/>
-        <p:nvPr/>
-      </p:nvGrpSpPr>
-      <p:grpSpPr/>
-      <p:sp>
-        <p:nvSpPr>
-          <p:cNvPr id="2" name="Title 1"/>
-          <p:cNvSpPr>
-            <a:spLocks noGrp="1"/>
-          </p:cNvSpPr>
-          <p:nvPr>
-            <p:ph type="ctrTitle"/>
-          </p:nvPr>
-        </p:nvSpPr>
-        <p:spPr/>
-        <p:txBody>
-          <a:bodyPr/>
-          <a:lstStyle/>
-          <a:p/>
-        </p:txBody>
-      </p:sp>
-      <p:sp>
-        <p:nvSpPr>
-          <p:cNvPr id="3" name="Subtitle 2"/>
-          <p:cNvSpPr>
-            <a:spLocks noGrp="1"/>
-          </p:cNvSpPr>
-          <p:nvPr>
-            <p:ph type="subTitle" idx="1"/>
-          </p:nvPr>
-        </p:nvSpPr>
-        <p:spPr/>
-        <p:txBody>
-          <a:bodyPr/>
-          <a:lstStyle/>
-          <a:p/>
-        </p:txBody>
-      </p:sp>
-    </p:spTree>
-  </p:cSld>
-  <p:clrMapOvr>
-    <a:masterClrMapping/>
-  </p:clrMapOvr>
-</p:sld>
-</file>
-
-<file path=ppt/slides/slide66.xml><?xml version="1.0" encoding="utf-8"?>
-<p:sld xmlns:a="http://schemas.openxmlformats.org/drawingml/2006/main" xmlns:p="http://schemas.openxmlformats.org/presentationml/2006/main" xmlns:r="http://schemas.openxmlformats.org/officeDocument/2006/relationships">
-  <p:cSld>
-    <p:spTree>
-      <p:nvGrpSpPr>
-        <p:cNvPr id="1" name=""/>
-        <p:cNvGrpSpPr/>
-        <p:nvPr/>
-      </p:nvGrpSpPr>
-      <p:grpSpPr/>
-      <p:sp>
-        <p:nvSpPr>
-          <p:cNvPr id="2" name="Title 1"/>
-          <p:cNvSpPr>
-            <a:spLocks noGrp="1"/>
-          </p:cNvSpPr>
-          <p:nvPr>
-            <p:ph type="ctrTitle"/>
-          </p:nvPr>
-        </p:nvSpPr>
-        <p:spPr/>
-        <p:txBody>
-          <a:bodyPr/>
-          <a:lstStyle/>
-          <a:p/>
-        </p:txBody>
-      </p:sp>
-      <p:sp>
-        <p:nvSpPr>
-          <p:cNvPr id="3" name="Subtitle 2"/>
-          <p:cNvSpPr>
-            <a:spLocks noGrp="1"/>
-          </p:cNvSpPr>
-          <p:nvPr>
-            <p:ph type="subTitle" idx="1"/>
-          </p:nvPr>
-        </p:nvSpPr>
-        <p:spPr/>
-        <p:txBody>
-          <a:bodyPr/>
-          <a:lstStyle/>
-          <a:p/>
-        </p:txBody>
-      </p:sp>
-    </p:spTree>
-  </p:cSld>
-  <p:clrMapOvr>
-    <a:masterClrMapping/>
-  </p:clrMapOvr>
-</p:sld>
-</file>
-
-<file path=ppt/slides/slide67.xml><?xml version="1.0" encoding="utf-8"?>
-<p:sld xmlns:a="http://schemas.openxmlformats.org/drawingml/2006/main" xmlns:p="http://schemas.openxmlformats.org/presentationml/2006/main" xmlns:r="http://schemas.openxmlformats.org/officeDocument/2006/relationships">
-  <p:cSld>
-    <p:spTree>
-      <p:nvGrpSpPr>
-        <p:cNvPr id="1" name=""/>
-        <p:cNvGrpSpPr/>
-        <p:nvPr/>
-      </p:nvGrpSpPr>
-      <p:grpSpPr/>
-      <p:sp>
-        <p:nvSpPr>
-          <p:cNvPr id="2" name="Title 1"/>
-          <p:cNvSpPr>
-            <a:spLocks noGrp="1"/>
-          </p:cNvSpPr>
-          <p:nvPr>
-            <p:ph type="ctrTitle"/>
-          </p:nvPr>
-        </p:nvSpPr>
-        <p:spPr/>
-        <p:txBody>
-          <a:bodyPr/>
-          <a:lstStyle/>
-          <a:p/>
-        </p:txBody>
-      </p:sp>
-      <p:sp>
-        <p:nvSpPr>
-          <p:cNvPr id="3" name="Subtitle 2"/>
-          <p:cNvSpPr>
-            <a:spLocks noGrp="1"/>
-          </p:cNvSpPr>
-          <p:nvPr>
-            <p:ph type="subTitle" idx="1"/>
-          </p:nvPr>
-        </p:nvSpPr>
-        <p:spPr/>
-        <p:txBody>
-          <a:bodyPr/>
-          <a:lstStyle/>
-          <a:p/>
+            <a:r>
+              <a:t>Observer: Ereignisse propagieren</a:t>
+            </a:r>
+          </a:p>
+          <a:p>
+            <a:r>
+              <a:t>Strategy: Algorithmen austauschbar machen</a:t>
+            </a:r>
+          </a:p>
+          <a:p>
+            <a:r>
+              <a:t>Command: Operationen als Objekte</a:t>
+            </a:r>
+          </a:p>
+          <a:p>
+            <a:r>
+              <a:t>State: Zustandsabhängiges Verhalten</a:t>
+            </a:r>
+          </a:p>
         </p:txBody>
       </p:sp>
     </p:spTree>
@@ -10623,7 +9182,7 @@
           <a:lstStyle/>
           <a:p>
             <a:r>
-              <a:t>Schwerpunkt: Strukturelle Komposition</a:t>
+              <a:t>Block 4: Advanced Patterns - Schwerpunkt: Komplexe Szenarien</a:t>
             </a:r>
           </a:p>
         </p:txBody>
@@ -10643,27 +9202,28 @@
           <a:bodyPr/>
           <a:lstStyle/>
           <a:p>
-            <a:pPr/>
-            <a:r>
-              <a:t>Adapter: Inkompatible Schnittstellen verbinden</a:t>
-            </a:r>
-          </a:p>
-          <a:p>
-            <a:pPr/>
-            <a:r>
-              <a:t>Decorator: Verhalten dynamisch erweitern</a:t>
-            </a:r>
-          </a:p>
-          <a:p>
-            <a:pPr/>
-            <a:r>
-              <a:t>Facade: Komplexe Subsysteme vereinfachen</a:t>
-            </a:r>
-          </a:p>
-          <a:p>
-            <a:pPr/>
-            <a:r>
-              <a:t>Composite: Hierarchische Strukturen behandeln</a:t>
+            <a:r>
+              <a:t>Template Method: Algorithmus-Skelett mit variablen Teilen</a:t>
+            </a:r>
+          </a:p>
+          <a:p>
+            <a:r>
+              <a:t>Visitor: Operationen von Datenstruktur trennen</a:t>
+            </a:r>
+          </a:p>
+          <a:p>
+            <a:r>
+              <a:t>Chain of Responsibility: Requests durch Handler-Kette</a:t>
+            </a:r>
+          </a:p>
+          <a:p>
+            <a:r>
+              <a:t>Mediator: Komplexe Objekt-Interaktionen koordinieren</a:t>
+            </a:r>
+          </a:p>
+          <a:p>
+            <a:r>
+              <a:t>Enterprise Patterns: Repository, Unit of Work, MVC/MVP/MVVM</a:t>
             </a:r>
           </a:p>
         </p:txBody>
@@ -10693,31 +9253,59 @@
             <a:spLocks noGrp="1"/>
           </p:cNvSpPr>
           <p:nvPr>
-            <p:ph type="ctrTitle"/>
-          </p:nvPr>
-        </p:nvSpPr>
-        <p:spPr/>
-        <p:txBody>
-          <a:bodyPr/>
-          <a:lstStyle/>
-          <a:p/>
-        </p:txBody>
-      </p:sp>
-      <p:sp>
-        <p:nvSpPr>
-          <p:cNvPr id="3" name="Subtitle 2"/>
-          <p:cNvSpPr>
-            <a:spLocks noGrp="1"/>
-          </p:cNvSpPr>
-          <p:nvPr>
-            <p:ph type="subTitle" idx="1"/>
-          </p:nvPr>
-        </p:nvSpPr>
-        <p:spPr/>
-        <p:txBody>
-          <a:bodyPr/>
-          <a:lstStyle/>
-          <a:p/>
+            <p:ph type="title"/>
+          </p:nvPr>
+        </p:nvSpPr>
+        <p:spPr/>
+        <p:txBody>
+          <a:bodyPr/>
+          <a:lstStyle/>
+          <a:p>
+            <a:r>
+              <a:t>Was werden wir NICHT behandeln? - Bewusst ausgeklammerte Themen</a:t>
+            </a:r>
+          </a:p>
+        </p:txBody>
+      </p:sp>
+      <p:sp>
+        <p:nvSpPr>
+          <p:cNvPr id="3" name="Content Placeholder 2"/>
+          <p:cNvSpPr>
+            <a:spLocks noGrp="1"/>
+          </p:cNvSpPr>
+          <p:nvPr>
+            <p:ph idx="1"/>
+          </p:nvPr>
+        </p:nvSpPr>
+        <p:spPr/>
+        <p:txBody>
+          <a:bodyPr/>
+          <a:lstStyle/>
+          <a:p>
+            <a:r>
+              <a:t>Framework-spezifische Patterns (Spring, Hibernate, etc.)</a:t>
+            </a:r>
+          </a:p>
+          <a:p>
+            <a:r>
+              <a:t>Architektur-Patterns (Microservices, CQRS, Event Sourcing)</a:t>
+            </a:r>
+          </a:p>
+          <a:p>
+            <a:r>
+              <a:t>Concurrency-Patterns (würde eigenen Workshop füllen)</a:t>
+            </a:r>
+          </a:p>
+          <a:p>
+            <a:r>
+              <a:t>Specific UI-Frameworks (Angular, React, Vue)</a:t>
+            </a:r>
+          </a:p>
+          <a:p>
+            <a:r>
+              <a:t>Cloud-native Patterns (separate Workshop-Serie)</a:t>
+            </a:r>
+          </a:p>
         </p:txBody>
       </p:sp>
     </p:spTree>
@@ -10754,7 +9342,7 @@
           <a:lstStyle/>
           <a:p>
             <a:r>
-              <a:t>Schwerpunkt: Verhalten und Kommunikation</a:t>
+              <a:t>Lernziele und Kompetenzen - Zentrale Problemstellungen</a:t>
             </a:r>
           </a:p>
         </p:txBody>
@@ -10774,27 +9362,28 @@
           <a:bodyPr/>
           <a:lstStyle/>
           <a:p>
-            <a:pPr/>
-            <a:r>
-              <a:t>Observer: Ereignisse propagieren</a:t>
-            </a:r>
-          </a:p>
-          <a:p>
-            <a:pPr/>
-            <a:r>
-              <a:t>Strategy: Algorithmen austauschbar machen</a:t>
-            </a:r>
-          </a:p>
-          <a:p>
-            <a:pPr/>
-            <a:r>
-              <a:t>Command: Operationen als Objekte</a:t>
-            </a:r>
-          </a:p>
-          <a:p>
-            <a:pPr/>
-            <a:r>
-              <a:t>State: Zustandsabhängiges Verhalten</a:t>
+            <a:r>
+              <a:t>Legacy-System Integration und Adapter-Patterns</a:t>
+            </a:r>
+          </a:p>
+          <a:p>
+            <a:r>
+              <a:t>Flexible Objekterzeugung und Dependency Management</a:t>
+            </a:r>
+          </a:p>
+          <a:p>
+            <a:r>
+              <a:t>Algorithmus-Variationen und Strategy-Patterns</a:t>
+            </a:r>
+          </a:p>
+          <a:p>
+            <a:r>
+              <a:t>Event-basierte Kommunikation und Observer-Patterns</a:t>
+            </a:r>
+          </a:p>
+          <a:p>
+            <a:r>
+              <a:t>Komplexe Objektstrukturen und Composite-Patterns</a:t>
             </a:r>
           </a:p>
         </p:txBody>

</xml_diff>

<commit_message>
URGENT: Fix PowerPoint formatting and remove markdown syntax
- Fixed critical markdown syntax appearing in presentation text
- Applied proper PowerPoint bold formatting instead of markdown markers
- Structured slides correctly with bold section headers and bullet points
- Generated professional presentation with clean formatting
- Processed 29 slides from intro-content-extracted.md
- Created presentations/powerpoint/intro-presentation.pptx (135KB)
- Removed ALL markdown formatting (**, ##, ###) from displayed text
</commit_message>
<xml_diff>
--- a/presentations/powerpoint/intro-presentation.pptx
+++ b/presentations/powerpoint/intro-presentation.pptx
@@ -7,7 +7,7 @@
   <p:sldIdLst>
     <p:sldId id="256" r:id="rId6"/>
     <p:sldId id="257" r:id="rId7"/>
-    <p:sldId id="258" r:id="rId8"/>
+    <p:sldId id="258" r:id="rId9"/>
     <p:sldId id="259" r:id="rId10"/>
     <p:sldId id="260" r:id="rId11"/>
     <p:sldId id="261" r:id="rId12"/>
@@ -34,12 +34,6 @@
     <p:sldId id="282" r:id="rId33"/>
     <p:sldId id="283" r:id="rId34"/>
     <p:sldId id="284" r:id="rId35"/>
-    <p:sldId id="285" r:id="rId36"/>
-    <p:sldId id="286" r:id="rId37"/>
-    <p:sldId id="287" r:id="rId38"/>
-    <p:sldId id="288" r:id="rId39"/>
-    <p:sldId id="289" r:id="rId40"/>
-    <p:sldId id="290" r:id="rId41"/>
   </p:sldIdLst>
   <p:sldSz cx="12192000" cy="6858000"/>
   <p:notesSz cx="6858000" cy="9144000"/>
@@ -611,7 +605,7 @@
           <a:lstStyle/>
           <a:p>
             <a:r>
-              <a:t>Diese Definition betont sowohl technische Aspekte (Struktur, Verhalten) als auch fachliche Ziele. Architektur ist nicht nur Technik - sie muss Geschäftsziele verstehen und unterstützen.</a:t>
+              <a:t>Diese Definitionen zeigen verschiedene Perspektiven auf Software-Architektur. Gemeinsame Erkenntnisse: Struktur (Organisation der Software), Entscheidungen (wichtige Design-Entscheidungen), Beziehungen (Zusammenhänge), Kosten (spätere Änderbarkeit), Kommunikation (Vermittlung des Designs).</a:t>
             </a:r>
           </a:p>
         </p:txBody>
@@ -681,7 +675,7 @@
           <a:lstStyle/>
           <a:p>
             <a:r>
-              <a:t>Enterprise-Herausforderungen: Modernisierung bei laufendem Betrieb, Compliance und Governance, Performance bei hoher Last, Kostenoptimierung bei gleichzeitig hoher Qualität. Integration von Dutzenden von Systemen.</a:t>
+              <a:t>Diese Definition betont sowohl technische Aspekte (Struktur, Verhalten) als auch fachliche Ziele. Architektur ist nicht nur Technik - sie muss Geschäftsziele verstehen und unterstützen.</a:t>
             </a:r>
           </a:p>
         </p:txBody>
@@ -751,7 +745,7 @@
           <a:lstStyle/>
           <a:p>
             <a:r>
-              <a:t>Clean Code Definition nach Robert C. Martin: "Code that has been taken care of." 80% der Zeit wird Code gelesen, nur 20% geschrieben. Wartbarkeit ist wichtiger als Cleverness.</a:t>
+              <a:t>Enterprise-Herausforderungen: Modernisierung bei laufendem Betrieb, Compliance und Governance, Performance bei hoher Last, Kostenoptimierung bei gleichzeitig hoher Qualität. Integration von Dutzenden von Systemen.</a:t>
             </a:r>
           </a:p>
         </p:txBody>
@@ -821,7 +815,7 @@
           <a:lstStyle/>
           <a:p>
             <a:r>
-              <a:t>Legacy-Systeme mit Millionen Zeilen undokumentiertem Code verursachen hohe Wartungskosten, weil jede kleine Änderung Wochen dauert und risikoreich ist. Clean Code ist eine Investition in die Zukunft.</a:t>
+              <a:t>Clean Code Definition nach Robert C. Martin: "Code that has been taken care of." 80% der Zeit wird Code gelesen, nur 20% geschrieben. Wartbarkeit ist wichtiger als Cleverness.</a:t>
             </a:r>
           </a:p>
         </p:txBody>
@@ -891,7 +885,7 @@
           <a:lstStyle/>
           <a:p>
             <a:r>
-              <a:t>Praktische Auswirkungen: Zinsen (jede Änderung dauert länger), Hauptsumme (Aufwand für Refactoring), Insolvenz (System nicht mehr wartbar). Schulden-Management: Sichtbar machen, priorisieren, kontinuierlich abbauen.</a:t>
+              <a:t>Legacy-Systeme mit Millionen Zeilen undokumentiertem Code verursachen hohe Wartungskosten, weil jede kleine Änderung Wochen dauert und risikoreich ist. Clean Code ist eine Investition in die Zukunft.</a:t>
             </a:r>
           </a:p>
         </p:txBody>
@@ -961,7 +955,7 @@
           <a:lstStyle/>
           <a:p>
             <a:r>
-              <a:t>Technology-First Symptome: Hype-Driven Development, Solution looking for a problem, Architecture Astronauts, Over-Engineering. Warum passiert das? Techniker denken technisch, Marketing macht Technologie sexy, CV-Driven Development, Komplexität wirkt professionell.</a:t>
+              <a:t>Praktische Auswirkungen: Zinsen (jede Änderung dauert länger), Hauptsumme (Aufwand für Refactoring), Insolvenz (System nicht mehr wartbar). Schulden-Management: Sichtbar machen, priorisieren, kontinuierlich abbauen.</a:t>
             </a:r>
           </a:p>
         </p:txBody>
@@ -1031,7 +1025,7 @@
           <a:lstStyle/>
           <a:p>
             <a:r>
-              <a:t>Das Grundproblem: Es gab KEIN fachliches Problem, das diese Technologien gelöst hätten. Finanzdaten sind RELATIONAL - NoSQL passte nicht zur Fachlichkeit.</a:t>
+              <a:t>Technology-First Symptome: Hype-Driven Development, Solution looking for a problem, Architecture Astronauts, Over-Engineering. Warum passiert das? Techniker denken technisch, Marketing macht Technologie sexy, CV-Driven Development, Komplexität wirkt professionell.</a:t>
             </a:r>
           </a:p>
         </p:txBody>
@@ -1101,7 +1095,7 @@
           <a:lstStyle/>
           <a:p>
             <a:r>
-              <a:t>DDD-Grundgedanke nach Eric Evans: "The heart of software is its ability to solve domain-related problems for its user. All other concerns should be subordinated." Technology-First führt zu Over-Engineering und unpassenden Lösungen.</a:t>
+              <a:t>Das Grundproblem: Es gab KEIN fachliches Problem, das diese Technologien gelöst hätten. Finanzdaten sind RELATIONAL - NoSQL passte nicht zur Fachlichkeit.</a:t>
             </a:r>
           </a:p>
         </p:txBody>
@@ -1171,7 +1165,7 @@
           <a:lstStyle/>
           <a:p>
             <a:r>
-              <a:t>Warnsignale für Technology-First: "Das ist modern/trendy", "Das macht Netflix auch", "Das steht in meinem Lebenslauf gut". Die richtigen Fragen: "Welches fachliche Problem löst das?", "Was sind unsere spezifischen Anforderungen?"</a:t>
+              <a:t>DDD-Grundgedanke nach Eric Evans: "The heart of software is its ability to solve domain-related problems for its user. All other concerns should be subordinated." Technology-First führt zu Over-Engineering und unpassenden Lösungen.</a:t>
             </a:r>
           </a:p>
         </p:txBody>
@@ -1241,7 +1235,7 @@
           <a:lstStyle/>
           <a:p>
             <a:r>
-              <a:t>Alexanders Erkenntnis: "Each pattern describes a problem which occurs over and over again, and then describes the core of the solution." GoF erkannten: Erfahrene Entwickler nutzen bewährte Lösungen, wiederkehrende Probleme haben wiederkehrende Lösungen.</a:t>
+              <a:t>Warnsignale für Technology-First: "Das ist modern/trendy", "Das macht Netflix auch", "Das steht in meinem Lebenslauf gut". Die richtigen Fragen: "Welches fachliche Problem löst das?", "Was sind unsere spezifischen Anforderungen?"</a:t>
             </a:r>
           </a:p>
         </p:txBody>
@@ -1381,7 +1375,7 @@
           <a:lstStyle/>
           <a:p>
             <a:r>
-              <a:t>Kommunikationsverbesserung: Vorher: "Wir brauchen eine Klasse, die andere Klassen erzeugt..." Nachher: "Wir nutzen Factory Pattern". Team-Kommunikation wird effizienter, neue Teammitglieder verstehen Design schneller.</a:t>
+              <a:t>Alexanders Erkenntnis: "Each pattern describes a problem which occurs over and over again, and then describes the core of the solution." GoF erkannten: Erfahrene Entwickler nutzen bewährte Lösungen, wiederkehrende Probleme haben wiederkehrende Lösungen.</a:t>
             </a:r>
           </a:p>
         </p:txBody>
@@ -1451,7 +1445,7 @@
           <a:lstStyle/>
           <a:p>
             <a:r>
-              <a:t>Golden Hammer vermeiden: "Ich habe einen Hammer, alles sieht aus wie ein Nagel". Pattern Overload: 20 Patterns für 5 Klassen. Wichtige Fragen: Haben wir wirklich das Problem? Ist es komplex genug für ein Pattern?</a:t>
+              <a:t>Kommunikationsverbesserung: Vorher: "Wir brauchen eine Klasse, die andere Klassen erzeugt..." Nachher: "Wir nutzen Factory Pattern". Team-Kommunikation wird effizienter, neue Teammitglieder verstehen Design schneller.</a:t>
             </a:r>
           </a:p>
         </p:txBody>
@@ -1521,7 +1515,7 @@
           <a:lstStyle/>
           <a:p>
             <a:r>
-              <a:t>Was Refactoring NICHT ist: Bugfixes, neue Features, Performance-Optimierung, Rewrite. Refactoring ist kontinuierlich, nicht ein einmaliges Event.</a:t>
+              <a:t>Golden Hammer vermeiden: "Ich habe einen Hammer, alles sieht aus wie ein Nagel". Pattern Overload: 20 Patterns für 5 Klassen. Wichtige Fragen: Haben wir wirklich das Problem? Ist es komplex genug für ein Pattern?</a:t>
             </a:r>
           </a:p>
         </p:txBody>
@@ -1591,7 +1585,7 @@
           <a:lstStyle/>
           <a:p>
             <a:r>
-              <a:t>Boy Scout Aktionen: temp → elapsedTimeInDays, 7 → DAYS_PER_WEEK, Duplicate Code extrahieren, Unused Code entfernen, Kommentare durch self-documenting code ersetzen.</a:t>
+              <a:t>Was Refactoring NICHT ist: Bugfixes, neue Features, Performance-Optimierung, Rewrite. Refactoring ist kontinuierlich, nicht ein einmaliges Event.</a:t>
             </a:r>
           </a:p>
         </p:txBody>
@@ -1661,7 +1655,7 @@
           <a:lstStyle/>
           <a:p>
             <a:r>
-              <a:t>Gute Refactoring-Zeitpunkte: Sprint Planning, Bug-Fixing mit Boy Scout Rule, Code Reviews, Technische Stories. "Make the change easy, then make the easy change."</a:t>
+              <a:t>Boy Scout Aktionen: temp → elapsedTimeInDays, 7 → DAYS_PER_WEEK, Duplicate Code extrahieren, Unused Code entfernen, Kommentare durch self-documenting code ersetzen.</a:t>
             </a:r>
           </a:p>
         </p:txBody>
@@ -1731,7 +1725,7 @@
           <a:lstStyle/>
           <a:p>
             <a:r>
-              <a:t>Häufige Refactoring-Patterns: Extract Method (Long Method aufteilen), Replace Magic Number with Named Constant. Enterprise-Kontext: Legacy Systems extra vorsichtig, Live Systems graduelle Änderungen.</a:t>
+              <a:t>Gute Refactoring-Zeitpunkte: Sprint Planning, Bug-Fixing mit Boy Scout Rule, Code Reviews, Technische Stories. "Make the change easy, then make the easy change."</a:t>
             </a:r>
           </a:p>
         </p:txBody>
@@ -1801,7 +1795,7 @@
           <a:lstStyle/>
           <a:p>
             <a:r>
-              <a:t>Beispiel Strategy Pattern: Ein if-else → zweites if-else → Duplikation reduzieren → drittes ähnliches Pattern → "Das ist Strategy Pattern!" → Refactoring zu Strategy Pattern. Tests sind essenziell für sicheres Refactoring.</a:t>
+              <a:t>Häufige Refactoring-Patterns: Extract Method (Long Method aufteilen), Replace Magic Number with Named Constant. Enterprise-Kontext: Legacy Systems extra vorsichtig, Live Systems graduelle Änderungen.</a:t>
             </a:r>
           </a:p>
         </p:txBody>
@@ -1871,6 +1865,76 @@
           <a:lstStyle/>
           <a:p>
             <a:r>
+              <a:t>Beispiel Strategy Pattern: Ein if-else → zweites if-else → Duplikation reduzieren → drittes ähnliches Pattern → "Das ist Strategy Pattern!" → Refactoring zu Strategy Pattern. Tests sind essenziell für sicheres Refactoring.</a:t>
+            </a:r>
+          </a:p>
+        </p:txBody>
+      </p:sp>
+      <p:sp>
+        <p:nvSpPr>
+          <p:cNvPr id="4" name="Slide Number Placeholder 3"/>
+          <p:cNvSpPr>
+            <a:spLocks noGrp="1"/>
+          </p:cNvSpPr>
+          <p:nvPr>
+            <p:ph type="sldNum" idx="5" sz="quarter"/>
+          </p:nvPr>
+        </p:nvSpPr>
+        <p:spPr/>
+      </p:sp>
+    </p:spTree>
+  </p:cSld>
+  <p:clrMapOvr>
+    <a:masterClrMapping/>
+  </p:clrMapOvr>
+</p:notes>
+</file>
+
+<file path=ppt/notesSlides/notesSlide28.xml><?xml version="1.0" encoding="utf-8"?>
+<p:notes xmlns:a="http://schemas.openxmlformats.org/drawingml/2006/main" xmlns:p="http://schemas.openxmlformats.org/presentationml/2006/main" xmlns:r="http://schemas.openxmlformats.org/officeDocument/2006/relationships">
+  <p:cSld>
+    <p:spTree>
+      <p:nvGrpSpPr>
+        <p:cNvPr id="1" name=""/>
+        <p:cNvGrpSpPr/>
+        <p:nvPr/>
+      </p:nvGrpSpPr>
+      <p:grpSpPr>
+        <a:xfrm>
+          <a:off x="0" y="0"/>
+          <a:ext cx="0" cy="0"/>
+          <a:chOff x="0" y="0"/>
+          <a:chExt cx="0" cy="0"/>
+        </a:xfrm>
+      </p:grpSpPr>
+      <p:sp>
+        <p:nvSpPr>
+          <p:cNvPr id="2" name="Slide Image Placeholder 1"/>
+          <p:cNvSpPr>
+            <a:spLocks noGrp="1"/>
+          </p:cNvSpPr>
+          <p:nvPr>
+            <p:ph type="sldImg" idx="2"/>
+          </p:nvPr>
+        </p:nvSpPr>
+        <p:spPr/>
+      </p:sp>
+      <p:sp>
+        <p:nvSpPr>
+          <p:cNvPr id="3" name="Notes Placeholder 2"/>
+          <p:cNvSpPr>
+            <a:spLocks noGrp="1"/>
+          </p:cNvSpPr>
+          <p:nvPr>
+            <p:ph type="body" idx="3" sz="quarter"/>
+          </p:nvPr>
+        </p:nvSpPr>
+        <p:spPr/>
+        <p:txBody>
+          <a:bodyPr/>
+          <a:lstStyle/>
+          <a:p>
+            <a:r>
               <a:t>Lassen Sie jeden Teilnehmer sein Ziel formulieren - wir kommen am Ende darauf zurück! Mit diesem Refactoring-Mindset sind wir bereit - wir wissen jetzt, dass wir Patterns durch evolutionäre Verbesserung entdecken.</a:t>
             </a:r>
           </a:p>
@@ -2291,7 +2355,7 @@
           <a:lstStyle/>
           <a:p>
             <a:r>
-              <a:t>Diese Regeln fördern aktive Teilnahme und effektiven Wissensaustausch. Der Workshop lebt von Interaktion und praktischen Diskussionen.</a:t>
+              <a:t>Was wir bereitstellen: Vollständige Code-Beispiele für alle Patterns, Enterprise-typische Use Cases, Refactoring-Challenges, Pattern-Spickzettel als Nachschlagewerk.</a:t>
             </a:r>
           </a:p>
         </p:txBody>
@@ -2361,7 +2425,7 @@
           <a:lstStyle/>
           <a:p>
             <a:r>
-              <a:t>Diese Definitionen zeigen verschiedene Perspektiven auf Software-Architektur. Gemeinsame Erkenntnisse: Struktur (Organisation der Software), Entscheidungen (wichtige Design-Entscheidungen), Beziehungen (Zusammenhänge), Kosten (spätere Änderbarkeit), Kommunikation (Vermittlung des Designs).</a:t>
+              <a:t>Diese Regeln fördern aktive Teilnahme und effektiven Wissensaustausch. Der Workshop lebt von Interaktion und praktischen Diskussionen.</a:t>
             </a:r>
           </a:p>
         </p:txBody>
@@ -6554,28 +6618,28 @@
           <a:lstStyle/>
           <a:p>
             <a:r>
+              <a:t>Design Patterns Workshop - Einführungsblock</a:t>
+            </a:r>
+          </a:p>
+        </p:txBody>
+      </p:sp>
+      <p:sp>
+        <p:nvSpPr>
+          <p:cNvPr id="3" name="Subtitle 2"/>
+          <p:cNvSpPr>
+            <a:spLocks noGrp="1"/>
+          </p:cNvSpPr>
+          <p:nvPr>
+            <p:ph type="subTitle" idx="1"/>
+          </p:nvPr>
+        </p:nvSpPr>
+        <p:spPr/>
+        <p:txBody>
+          <a:bodyPr/>
+          <a:lstStyle/>
+          <a:p>
+            <a:r>
               <a:t>Design Patterns Workshop</a:t>
-            </a:r>
-          </a:p>
-        </p:txBody>
-      </p:sp>
-      <p:sp>
-        <p:nvSpPr>
-          <p:cNvPr id="3" name="Subtitle 2"/>
-          <p:cNvSpPr>
-            <a:spLocks noGrp="1"/>
-          </p:cNvSpPr>
-          <p:nvPr>
-            <p:ph type="subTitle" idx="1"/>
-          </p:nvPr>
-        </p:nvSpPr>
-        <p:spPr/>
-        <p:txBody>
-          <a:bodyPr/>
-          <a:lstStyle/>
-          <a:p>
-            <a:r>
-              <a:t>Einführungsblock</a:t>
             </a:r>
           </a:p>
         </p:txBody>
@@ -6614,7 +6678,7 @@
           <a:lstStyle/>
           <a:p>
             <a:r>
-              <a:t>Praktische Organisation</a:t>
+              <a:t>Workshop-Regeln</a:t>
             </a:r>
           </a:p>
         </p:txBody>
@@ -6626,77 +6690,48 @@
             <a:spLocks noGrp="1"/>
           </p:cNvSpPr>
           <p:nvPr>
-            <p:ph idx="1" sz="half"/>
+            <p:ph idx="1"/>
           </p:nvPr>
         </p:nvSpPr>
         <p:spPr/>
         <p:txBody>
           <a:bodyPr/>
           <a:lstStyle/>
-          <a:p>
-            <a:r>
-              <a:t>Was Sie mitbringen sollten:</a:t>
-            </a:r>
-          </a:p>
-          <a:p>
-            <a:r>
-              <a:t>Laptop mit Java 11+ und IDE (IntelliJ/Eclipse)</a:t>
-            </a:r>
-          </a:p>
-          <a:p>
-            <a:r>
-              <a:t>Git für Code-Austausch</a:t>
-            </a:r>
-          </a:p>
-          <a:p>
-            <a:r>
-              <a:t>Offenheit für neue Perspektiven</a:t>
-            </a:r>
-          </a:p>
-          <a:p>
-            <a:r>
-              <a:t>Eigene Code-Beispiele (wenn möglich)</a:t>
-            </a:r>
-          </a:p>
-        </p:txBody>
-      </p:sp>
-      <p:sp>
-        <p:nvSpPr>
-          <p:cNvPr id="4" name="Content Placeholder 3"/>
-          <p:cNvSpPr>
-            <a:spLocks noGrp="1"/>
-          </p:cNvSpPr>
-          <p:nvPr>
-            <p:ph idx="2" sz="half"/>
-          </p:nvPr>
-        </p:nvSpPr>
-        <p:spPr/>
-        <p:txBody>
-          <a:bodyPr/>
-          <a:lstStyle/>
-          <a:p>
-            <a:r>
-              <a:t>Was wir bereitstellen:</a:t>
-            </a:r>
-          </a:p>
-          <a:p>
-            <a:r>
-              <a:t>Vollständige Code-Beispiele für alle Patterns</a:t>
-            </a:r>
-          </a:p>
-          <a:p>
-            <a:r>
-              <a:t>Enterprise-typische Use Cases</a:t>
-            </a:r>
-          </a:p>
-          <a:p>
-            <a:r>
-              <a:t>Refactoring-Challenges</a:t>
-            </a:r>
-          </a:p>
-          <a:p>
-            <a:r>
-              <a:t>Pattern-Spickzettel als Nachschlagewerk</a:t>
+          <a:p/>
+          <a:p>
+            <a:pPr/>
+            <a:r>
+              <a:t>Zusammenarbeit</a:t>
+            </a:r>
+          </a:p>
+          <a:p>
+            <a:pPr/>
+            <a:r>
+              <a:t>Fragen jederzeit - Unterbrechungen sind erwünscht</a:t>
+            </a:r>
+          </a:p>
+          <a:p>
+            <a:pPr/>
+            <a:r>
+              <a:t>Handy stumm - aber für Code-Recherche gerne nutzen</a:t>
+            </a:r>
+          </a:p>
+          <a:p>
+            <a:pPr/>
+            <a:r>
+              <a:t>Kamera an bei Remote-Teilnahme</a:t>
+            </a:r>
+          </a:p>
+          <a:p>
+            <a:pPr/>
+            <a:r>
+              <a:t>Code teilen - Github Repository für alle</a:t>
+            </a:r>
+          </a:p>
+          <a:p>
+            <a:pPr/>
+            <a:r>
+              <a:t>Feedback geben - täglich kurze Retro</a:t>
             </a:r>
           </a:p>
         </p:txBody>
@@ -6735,7 +6770,7 @@
           <a:lstStyle/>
           <a:p>
             <a:r>
-              <a:t>Workshop-Regeln - Zusammenarbeit</a:t>
+              <a:t>Was ist Software-Architektur?</a:t>
             </a:r>
           </a:p>
         </p:txBody>
@@ -6754,29 +6789,35 @@
         <p:txBody>
           <a:bodyPr/>
           <a:lstStyle/>
-          <a:p>
-            <a:r>
-              <a:t>Fragen jederzeit - Unterbrechungen sind erwünscht</a:t>
-            </a:r>
-          </a:p>
-          <a:p>
-            <a:r>
-              <a:t>Handy stumm - aber für Code-Recherche gerne nutzen</a:t>
-            </a:r>
-          </a:p>
-          <a:p>
-            <a:r>
-              <a:t>Kamera an bei Remote-Teilnahme</a:t>
-            </a:r>
-          </a:p>
-          <a:p>
-            <a:r>
-              <a:t>Code teilen - Github Repository für alle</a:t>
-            </a:r>
-          </a:p>
-          <a:p>
-            <a:r>
-              <a:t>Feedback geben - täglich kurze Retro</a:t>
+          <a:p/>
+          <a:p>
+            <a:pPr/>
+            <a:r>
+              <a:t>Verschiedene Definitionen</a:t>
+            </a:r>
+          </a:p>
+          <a:p>
+            <a:pPr/>
+            <a:r>
+              <a:t>IEEE 1471: "Grundlegende Organisation eines Systems durch Komponenten und deren Beziehungen"</a:t>
+            </a:r>
+          </a:p>
+          <a:p>
+            <a:pPr/>
+            <a:r>
+              <a:t>Martin Fowler: "Architecture is about the important stuff. Whatever that is."</a:t>
+            </a:r>
+          </a:p>
+          <a:p>
+            <a:pPr/>
+            <a:r>
+              <a:t>Grady Booch: "Signifikante Design-Entscheidungen, gemessen an Änderungskosten"</a:t>
+            </a:r>
+          </a:p>
+          <a:p>
+            <a:pPr/>
+            <a:r>
+              <a:t>Simon Brown: "Struktur und Vision für gemeinsames Verständnis"</a:t>
             </a:r>
           </a:p>
         </p:txBody>
@@ -6806,7 +6847,7 @@
             <a:spLocks noGrp="1"/>
           </p:cNvSpPr>
           <p:nvPr>
-            <p:ph type="ctrTitle"/>
+            <p:ph type="title"/>
           </p:nvPr>
         </p:nvSpPr>
         <p:spPr/>
@@ -6815,28 +6856,36 @@
           <a:lstStyle/>
           <a:p>
             <a:r>
-              <a:t>Software-Architektur</a:t>
-            </a:r>
-          </a:p>
-        </p:txBody>
-      </p:sp>
-      <p:sp>
-        <p:nvSpPr>
-          <p:cNvPr id="3" name="Subtitle 2"/>
-          <p:cNvSpPr>
-            <a:spLocks noGrp="1"/>
-          </p:cNvSpPr>
-          <p:nvPr>
-            <p:ph type="subTitle" idx="1"/>
+              <a:t>Arbeitsdefinition für diesen Workshop</a:t>
+            </a:r>
+          </a:p>
+        </p:txBody>
+      </p:sp>
+      <p:sp>
+        <p:nvSpPr>
+          <p:cNvPr id="3" name="Content Placeholder 2"/>
+          <p:cNvSpPr>
+            <a:spLocks noGrp="1"/>
+          </p:cNvSpPr>
+          <p:nvPr>
+            <p:ph idx="1"/>
           </p:nvPr>
         </p:nvSpPr>
         <p:spPr/>
         <p:txBody>
           <a:bodyPr/>
           <a:lstStyle/>
-          <a:p>
-            <a:r>
-              <a:t>Grundlagen und Definition</a:t>
+          <a:p/>
+          <a:p>
+            <a:pPr/>
+            <a:r>
+              <a:t>Unser gemeinsames Verständnis</a:t>
+            </a:r>
+          </a:p>
+          <a:p>
+            <a:pPr/>
+            <a:r>
+              <a:t>&gt; Software-Architektur ist die Kunst, wichtige Designentscheidungen zu treffen, die die Struktur, das Verhalten und die Evolution eines Systems bestimmen - mit dem Ziel, fachliche Anforderungen optimal zu erfüllen.</a:t>
             </a:r>
           </a:p>
         </p:txBody>
@@ -6875,7 +6924,7 @@
           <a:lstStyle/>
           <a:p>
             <a:r>
-              <a:t>Was ist Software-Architektur? - Verschiedene Definitionen</a:t>
+              <a:t>Enterprise-Kontext</a:t>
             </a:r>
           </a:p>
         </p:txBody>
@@ -6894,24 +6943,41 @@
         <p:txBody>
           <a:bodyPr/>
           <a:lstStyle/>
-          <a:p>
-            <a:r>
-              <a:t>IEEE 1471: "Grundlegende Organisation eines Systems durch Komponenten und deren Beziehungen"</a:t>
-            </a:r>
-          </a:p>
-          <a:p>
-            <a:r>
-              <a:t>Martin Fowler: "Architecture is about the important stuff. Whatever that is."</a:t>
-            </a:r>
-          </a:p>
-          <a:p>
-            <a:r>
-              <a:t>Grady Booch: "Signifikante Design-Entscheidungen, gemessen an Änderungskosten"</a:t>
-            </a:r>
-          </a:p>
-          <a:p>
-            <a:r>
-              <a:t>Simon Brown: "Struktur und Vision für gemeinsames Verständnis"</a:t>
+          <a:p/>
+          <a:p>
+            <a:pPr/>
+            <a:r>
+              <a:t>Besonderheiten in großen Unternehmen</a:t>
+            </a:r>
+          </a:p>
+          <a:p>
+            <a:pPr/>
+            <a:r>
+              <a:t>Legacy-Systeme: Jahrzehntealte Systeme, die noch laufen müssen</a:t>
+            </a:r>
+          </a:p>
+          <a:p>
+            <a:pPr/>
+            <a:r>
+              <a:t>Regulatorische Anforderungen: DSGVO, Compliance-Standards</a:t>
+            </a:r>
+          </a:p>
+          <a:p>
+            <a:pPr/>
+            <a:r>
+              <a:t>Hochverfügbarkeit: 99.9%+ Uptime-Anforderungen</a:t>
+            </a:r>
+          </a:p>
+          <a:p>
+            <a:pPr/>
+            <a:r>
+              <a:t>Skalierung: Millionen von Benutzern, große Datenmengen</a:t>
+            </a:r>
+          </a:p>
+          <a:p>
+            <a:pPr/>
+            <a:r>
+              <a:t>Sicherheit: Kritische Geschäftsdaten, Cyber-Security</a:t>
             </a:r>
           </a:p>
         </p:txBody>
@@ -6950,7 +7016,7 @@
           <a:lstStyle/>
           <a:p>
             <a:r>
-              <a:t>Arbeitsdefinition für diesen Workshop - Unser gemeinsames Verständnis</a:t>
+              <a:t>Clean Code Grundlagen</a:t>
             </a:r>
           </a:p>
         </p:txBody>
@@ -6969,9 +7035,41 @@
         <p:txBody>
           <a:bodyPr/>
           <a:lstStyle/>
-          <a:p>
-            <a:r>
-              <a:t>Software-Architektur ist die Kunst, wichtige Designentscheidungen zu treffen, die die Struktur, das Verhalten und die Evolution eines Systems bestimmen - mit dem Ziel, fachliche Anforderungen optimal zu erfüllen.</a:t>
+          <a:p/>
+          <a:p>
+            <a:pPr/>
+            <a:r>
+              <a:t>Was bedeutet "sauber"?</a:t>
+            </a:r>
+          </a:p>
+          <a:p>
+            <a:pPr/>
+            <a:r>
+              <a:t>Lesbarkeit vor Cleverness</a:t>
+            </a:r>
+          </a:p>
+          <a:p>
+            <a:pPr/>
+            <a:r>
+              <a:t>Eindeutige Namen für Funktionen, Variablen, Boolean</a:t>
+            </a:r>
+          </a:p>
+          <a:p>
+            <a:pPr/>
+            <a:r>
+              <a:t>Kurze Funktionen (Eine Funktion = Ein Gedanke)</a:t>
+            </a:r>
+          </a:p>
+          <a:p>
+            <a:pPr/>
+            <a:r>
+              <a:t>Keine Kommentare, die Code erklären</a:t>
+            </a:r>
+          </a:p>
+          <a:p>
+            <a:pPr/>
+            <a:r>
+              <a:t>Konsistenz in Namenskonventionen und Formatierung</a:t>
             </a:r>
           </a:p>
         </p:txBody>
@@ -7010,7 +7108,7 @@
           <a:lstStyle/>
           <a:p>
             <a:r>
-              <a:t>Enterprise-Kontext - Besonderheiten in großen Unternehmen</a:t>
+              <a:t>Software-Lebenszyklus in der Praxis</a:t>
             </a:r>
           </a:p>
         </p:txBody>
@@ -7029,29 +7127,47 @@
         <p:txBody>
           <a:bodyPr/>
           <a:lstStyle/>
-          <a:p>
-            <a:r>
-              <a:t>Legacy-Systeme: Jahrzehntealte Systeme, die noch laufen müssen</a:t>
-            </a:r>
-          </a:p>
-          <a:p>
-            <a:r>
-              <a:t>Regulatorische Anforderungen: DSGVO, Compliance-Standards</a:t>
-            </a:r>
-          </a:p>
-          <a:p>
-            <a:r>
-              <a:t>Hochverfügbarkeit: 99.9%+ Uptime-Anforderungen</a:t>
-            </a:r>
-          </a:p>
-          <a:p>
-            <a:r>
-              <a:t>Skalierung: Millionen von Benutzern, große Datenmengen</a:t>
-            </a:r>
-          </a:p>
-          <a:p>
-            <a:r>
-              <a:t>Sicherheit: Kritische Geschäftsdaten, Cyber-Security</a:t>
+          <a:p/>
+          <a:p>
+            <a:pPr/>
+            <a:r>
+              <a:t>Kostenverteilung</a:t>
+            </a:r>
+          </a:p>
+          <a:p>
+            <a:pPr/>
+            <a:r>
+              <a:t>Entwicklung: 20% der Gesamtkosten</a:t>
+            </a:r>
+          </a:p>
+          <a:p>
+            <a:pPr/>
+            <a:r>
+              <a:t>Wartung: 80% der Gesamtkosten</a:t>
+            </a:r>
+          </a:p>
+          <a:p>
+            <a:pPr/>
+            <a:r>
+              <a:t>Wartbarkeits-Faktoren</a:t>
+            </a:r>
+          </a:p>
+          <a:p>
+            <a:pPr/>
+            <a:r>
+              <a:t>Verständlichkeit: Kann ich verstehen, was der Code macht?</a:t>
+            </a:r>
+          </a:p>
+          <a:p>
+            <a:pPr/>
+            <a:r>
+              <a:t>Änderbarkeit: Kann ich sicher Änderungen vornehmen?</a:t>
+            </a:r>
+          </a:p>
+          <a:p>
+            <a:pPr/>
+            <a:r>
+              <a:t>Testbarkeit: Kann ich das Verhalten überprüfen?</a:t>
             </a:r>
           </a:p>
         </p:txBody>
@@ -7081,7 +7197,7 @@
             <a:spLocks noGrp="1"/>
           </p:cNvSpPr>
           <p:nvPr>
-            <p:ph type="ctrTitle"/>
+            <p:ph type="title"/>
           </p:nvPr>
         </p:nvSpPr>
         <p:spPr/>
@@ -7090,28 +7206,60 @@
           <a:lstStyle/>
           <a:p>
             <a:r>
-              <a:t>Clean Code</a:t>
-            </a:r>
-          </a:p>
-        </p:txBody>
-      </p:sp>
-      <p:sp>
-        <p:nvSpPr>
-          <p:cNvPr id="3" name="Subtitle 2"/>
-          <p:cNvSpPr>
-            <a:spLocks noGrp="1"/>
-          </p:cNvSpPr>
-          <p:nvPr>
-            <p:ph type="subTitle" idx="1"/>
+              <a:t>Technische Schulden</a:t>
+            </a:r>
+          </a:p>
+        </p:txBody>
+      </p:sp>
+      <p:sp>
+        <p:nvSpPr>
+          <p:cNvPr id="3" name="Content Placeholder 2"/>
+          <p:cNvSpPr>
+            <a:spLocks noGrp="1"/>
+          </p:cNvSpPr>
+          <p:nvPr>
+            <p:ph idx="1"/>
           </p:nvPr>
         </p:nvSpPr>
         <p:spPr/>
         <p:txBody>
           <a:bodyPr/>
           <a:lstStyle/>
-          <a:p>
-            <a:r>
-              <a:t>Grundlagen für wartbaren Code</a:t>
+          <a:p/>
+          <a:p>
+            <a:pPr/>
+            <a:r>
+              <a:t>Definition nach Martin Fowler</a:t>
+            </a:r>
+          </a:p>
+          <a:p>
+            <a:pPr/>
+            <a:r>
+              <a:t>&gt; "Technical debt is a metaphor referring to the eventual consequences of poor system design, software architecture or software development within a codebase."</a:t>
+            </a:r>
+          </a:p>
+          <a:p>
+            <a:pPr/>
+            <a:r>
+              <a:t>Arten technischer Schulden</a:t>
+            </a:r>
+          </a:p>
+          <a:p>
+            <a:pPr/>
+            <a:r>
+              <a:t>Bewusste Schulden: "Quick and dirty, aber nächste Woche aufräumen"</a:t>
+            </a:r>
+          </a:p>
+          <a:p>
+            <a:pPr/>
+            <a:r>
+              <a:t>Unbewusste Schulden: Entstehen durch Unwissen (gefährlichste Art)</a:t>
+            </a:r>
+          </a:p>
+          <a:p>
+            <a:pPr/>
+            <a:r>
+              <a:t>Umwelt-Schulden: Änderung der Anforderungen macht Code obsolet</a:t>
             </a:r>
           </a:p>
         </p:txBody>
@@ -7150,7 +7298,7 @@
           <a:lstStyle/>
           <a:p>
             <a:r>
-              <a:t>Clean Code Grundlagen - Was bedeutet "sauber"?</a:t>
+              <a:t>Fachlichkeit vor Technik</a:t>
             </a:r>
           </a:p>
         </p:txBody>
@@ -7169,29 +7317,29 @@
         <p:txBody>
           <a:bodyPr/>
           <a:lstStyle/>
-          <a:p>
-            <a:r>
-              <a:t>Lesbarkeit vor Cleverness</a:t>
-            </a:r>
-          </a:p>
-          <a:p>
-            <a:r>
-              <a:t>Eindeutige Namen für Funktionen, Variablen, Boolean</a:t>
-            </a:r>
-          </a:p>
-          <a:p>
-            <a:r>
-              <a:t>Kurze Funktionen (Eine Funktion = Ein Gedanke)</a:t>
-            </a:r>
-          </a:p>
-          <a:p>
-            <a:r>
-              <a:t>Keine Kommentare, die Code erklären</a:t>
-            </a:r>
-          </a:p>
-          <a:p>
-            <a:r>
-              <a:t>Konsistenz in Namenskonventionen und Formatierung</a:t>
+          <a:p/>
+          <a:p>
+            <a:pPr/>
+            <a:r>
+              <a:t>Das häufigste Anti-Pattern: Technology-First</a:t>
+            </a:r>
+          </a:p>
+          <a:p>
+            <a:pPr/>
+            <a:r>
+              <a:t>"Wir nutzen jetzt Microservices!" - Aber warum?</a:t>
+            </a:r>
+          </a:p>
+          <a:p>
+            <a:pPr/>
+            <a:r>
+              <a:t>"Lass uns auf Kubernetes umsteigen!" - Aber welches Problem löst das?</a:t>
+            </a:r>
+          </a:p>
+          <a:p>
+            <a:pPr/>
+            <a:r>
+              <a:t>"NoSQL ist modern, weg mit der relationalen DB!" - Aber was sind unsere Datenanforderungen?</a:t>
             </a:r>
           </a:p>
         </p:txBody>
@@ -7230,7 +7378,7 @@
           <a:lstStyle/>
           <a:p>
             <a:r>
-              <a:t>Software-Lebenszyklus in der Praxis</a:t>
+              <a:t>Technology-First Beispiele</a:t>
             </a:r>
           </a:p>
         </p:txBody>
@@ -7242,62 +7390,60 @@
             <a:spLocks noGrp="1"/>
           </p:cNvSpPr>
           <p:nvPr>
-            <p:ph idx="1" sz="half"/>
+            <p:ph idx="1"/>
           </p:nvPr>
         </p:nvSpPr>
         <p:spPr/>
         <p:txBody>
           <a:bodyPr/>
           <a:lstStyle/>
-          <a:p>
-            <a:r>
-              <a:t>Kostenverteilung:</a:t>
-            </a:r>
-          </a:p>
-          <a:p>
-            <a:r>
-              <a:t>Entwicklung: 20% der Gesamtkosten</a:t>
-            </a:r>
-          </a:p>
-          <a:p>
-            <a:r>
-              <a:t>Wartung: 80% der Gesamtkosten</a:t>
-            </a:r>
-          </a:p>
-        </p:txBody>
-      </p:sp>
-      <p:sp>
-        <p:nvSpPr>
-          <p:cNvPr id="4" name="Content Placeholder 3"/>
-          <p:cNvSpPr>
-            <a:spLocks noGrp="1"/>
-          </p:cNvSpPr>
-          <p:nvPr>
-            <p:ph idx="2" sz="half"/>
-          </p:nvPr>
-        </p:nvSpPr>
-        <p:spPr/>
-        <p:txBody>
-          <a:bodyPr/>
-          <a:lstStyle/>
-          <a:p>
-            <a:r>
-              <a:t>Wartbarkeits-Faktoren:</a:t>
-            </a:r>
-          </a:p>
-          <a:p>
-            <a:r>
-              <a:t>Verständlichkeit: Kann ich verstehen, was der Code macht?</a:t>
-            </a:r>
-          </a:p>
-          <a:p>
-            <a:r>
-              <a:t>Änderbarkeit: Kann ich sicher Änderungen vornehmen?</a:t>
-            </a:r>
-          </a:p>
-          <a:p>
-            <a:r>
-              <a:t>Testbarkeit: Kann ich das Verhalten überprüfen?</a:t>
+          <a:p/>
+          <a:p>
+            <a:pPr/>
+            <a:r>
+              <a:t>Der Microservices-Hype</a:t>
+            </a:r>
+          </a:p>
+          <a:p>
+            <a:pPr/>
+            <a:r>
+              <a:t>Problem: Monolith funktioniert gut, aber "Microservices sind modern"</a:t>
+            </a:r>
+          </a:p>
+          <a:p>
+            <a:pPr/>
+            <a:r>
+              <a:t>Entscheidung: Monolith in 20+ Services aufteilen</a:t>
+            </a:r>
+          </a:p>
+          <a:p>
+            <a:pPr/>
+            <a:r>
+              <a:t>Ergebnis: 3x höhere Komplexität, Latenz-Probleme, Debugging-Albtraum</a:t>
+            </a:r>
+          </a:p>
+          <a:p>
+            <a:pPr/>
+            <a:r>
+              <a:t>Die NoSQL-Modernisierung</a:t>
+            </a:r>
+          </a:p>
+          <a:p>
+            <a:pPr/>
+            <a:r>
+              <a:t>Problem: Bewährte relationale DB für Finanzdaten</a:t>
+            </a:r>
+          </a:p>
+          <a:p>
+            <a:pPr/>
+            <a:r>
+              <a:t>Entscheidung: Migration auf Document-Database</a:t>
+            </a:r>
+          </a:p>
+          <a:p>
+            <a:pPr/>
+            <a:r>
+              <a:t>Ergebnis: Datenkonsistenz-Probleme, Migration zurück nach 18 Monaten</a:t>
             </a:r>
           </a:p>
         </p:txBody>
@@ -7336,7 +7482,7 @@
           <a:lstStyle/>
           <a:p>
             <a:r>
-              <a:t>Technische Schulden</a:t>
+              <a:t>Domain-Driven Design: Fachlichkeit First</a:t>
             </a:r>
           </a:p>
         </p:txBody>
@@ -7348,57 +7494,36 @@
             <a:spLocks noGrp="1"/>
           </p:cNvSpPr>
           <p:nvPr>
-            <p:ph idx="1" sz="half"/>
+            <p:ph idx="1"/>
           </p:nvPr>
         </p:nvSpPr>
         <p:spPr/>
         <p:txBody>
           <a:bodyPr/>
           <a:lstStyle/>
-          <a:p>
-            <a:r>
-              <a:t>Definition nach Martin Fowler:</a:t>
-            </a:r>
-          </a:p>
-          <a:p>
-            <a:r>
-              <a:t>"Technical debt is a metaphor referring to the eventual consequences of poor system design, software architecture or software development within a codebase."</a:t>
-            </a:r>
-          </a:p>
-        </p:txBody>
-      </p:sp>
-      <p:sp>
-        <p:nvSpPr>
-          <p:cNvPr id="4" name="Content Placeholder 3"/>
-          <p:cNvSpPr>
-            <a:spLocks noGrp="1"/>
-          </p:cNvSpPr>
-          <p:nvPr>
-            <p:ph idx="2" sz="half"/>
-          </p:nvPr>
-        </p:nvSpPr>
-        <p:spPr/>
-        <p:txBody>
-          <a:bodyPr/>
-          <a:lstStyle/>
-          <a:p>
-            <a:r>
-              <a:t>Arten technischer Schulden:</a:t>
-            </a:r>
-          </a:p>
-          <a:p>
-            <a:r>
-              <a:t>Bewusste Schulden: "Quick and dirty, aber nächste Woche aufräumen"</a:t>
-            </a:r>
-          </a:p>
-          <a:p>
-            <a:r>
-              <a:t>Unbewusste Schulden: Entstehen durch Unwissen (gefährlichste Art)</a:t>
-            </a:r>
-          </a:p>
-          <a:p>
-            <a:r>
-              <a:t>Umwelt-Schulden: Änderung der Anforderungen macht Code obsolet</a:t>
+          <a:p/>
+          <a:p>
+            <a:pPr/>
+            <a:r>
+              <a:t>Die richtige Reihenfolge</a:t>
+            </a:r>
+          </a:p>
+          <a:p>
+            <a:pPr/>
+            <a:r>
+              <a:t>1. Fachlichkeit verstehen: Geschäftsproblem, Arbeitsprozesse, Regeln, echte Anforderungen</a:t>
+            </a:r>
+          </a:p>
+          <a:p>
+            <a:pPr/>
+            <a:r>
+              <a:t>2. Fachliche Architektur entwerfen: Domains, Bounded Contexts, fachliche Services, Geschäftslogik-Modellierung</a:t>
+            </a:r>
+          </a:p>
+          <a:p>
+            <a:pPr/>
+            <a:r>
+              <a:t>3. Technologie auswählen: Was unterstützt unser fachliches Modell am besten?</a:t>
             </a:r>
           </a:p>
         </p:txBody>
@@ -7428,7 +7553,7 @@
             <a:spLocks noGrp="1"/>
           </p:cNvSpPr>
           <p:nvPr>
-            <p:ph type="ctrTitle"/>
+            <p:ph type="title"/>
           </p:nvPr>
         </p:nvSpPr>
         <p:spPr/>
@@ -7444,12 +7569,12 @@
       </p:sp>
       <p:sp>
         <p:nvSpPr>
-          <p:cNvPr id="3" name="Subtitle 2"/>
-          <p:cNvSpPr>
-            <a:spLocks noGrp="1"/>
-          </p:cNvSpPr>
-          <p:nvPr>
-            <p:ph type="subTitle" idx="1"/>
+          <p:cNvPr id="3" name="Content Placeholder 2"/>
+          <p:cNvSpPr>
+            <a:spLocks noGrp="1"/>
+          </p:cNvSpPr>
+          <p:nvPr>
+            <p:ph idx="1"/>
           </p:nvPr>
         </p:nvSpPr>
         <p:spPr/>
@@ -7457,6 +7582,36 @@
           <a:bodyPr/>
           <a:lstStyle/>
           <a:p/>
+          <a:p>
+            <a:pPr/>
+            <a:r>
+              <a:t>Was werden wir in den nächsten 4 Blöcken lernen?</a:t>
+            </a:r>
+          </a:p>
+          <a:p>
+            <a:pPr/>
+            <a:r>
+              <a:t>Block 1: Creational Patterns - Flexible Objekterzeugung in Enterprise-Systemen</a:t>
+            </a:r>
+          </a:p>
+          <a:p>
+            <a:pPr/>
+            <a:r>
+              <a:t>Block 2: Structural Patterns - Objektkomposition und Systemintegration</a:t>
+            </a:r>
+          </a:p>
+          <a:p>
+            <a:pPr/>
+            <a:r>
+              <a:t>Block 3: Behavioral Patterns - Verhalten und Kommunikation zwischen Objekten</a:t>
+            </a:r>
+          </a:p>
+          <a:p>
+            <a:pPr/>
+            <a:r>
+              <a:t>Block 4: Advanced Patterns - Komplexe Szenarien und Pattern-Kombinationen</a:t>
+            </a:r>
+          </a:p>
         </p:txBody>
       </p:sp>
     </p:spTree>
@@ -7484,7 +7639,7 @@
             <a:spLocks noGrp="1"/>
           </p:cNvSpPr>
           <p:nvPr>
-            <p:ph type="ctrTitle"/>
+            <p:ph type="title"/>
           </p:nvPr>
         </p:nvSpPr>
         <p:spPr/>
@@ -7493,28 +7648,66 @@
           <a:lstStyle/>
           <a:p>
             <a:r>
-              <a:t>Fachlichkeit vor Technik</a:t>
-            </a:r>
-          </a:p>
-        </p:txBody>
-      </p:sp>
-      <p:sp>
-        <p:nvSpPr>
-          <p:cNvPr id="3" name="Subtitle 2"/>
-          <p:cNvSpPr>
-            <a:spLocks noGrp="1"/>
-          </p:cNvSpPr>
-          <p:nvPr>
-            <p:ph type="subTitle" idx="1"/>
+              <a:t>Die richtige Herangehensweise</a:t>
+            </a:r>
+          </a:p>
+        </p:txBody>
+      </p:sp>
+      <p:sp>
+        <p:nvSpPr>
+          <p:cNvPr id="3" name="Content Placeholder 2"/>
+          <p:cNvSpPr>
+            <a:spLocks noGrp="1"/>
+          </p:cNvSpPr>
+          <p:nvPr>
+            <p:ph idx="1"/>
           </p:nvPr>
         </p:nvSpPr>
         <p:spPr/>
         <p:txBody>
           <a:bodyPr/>
           <a:lstStyle/>
-          <a:p>
-            <a:r>
-              <a:t>Domain-Driven Design</a:t>
+          <a:p/>
+          <a:p>
+            <a:pPr/>
+            <a:r>
+              <a:t>Fragen in der richtigen Reihenfolge</a:t>
+            </a:r>
+          </a:p>
+          <a:p>
+            <a:pPr/>
+            <a:r>
+              <a:t>Phase 1: Fachlichkeit verstehen</a:t>
+            </a:r>
+          </a:p>
+          <a:p>
+            <a:pPr/>
+            <a:r>
+              <a:t>Was soll das System tun? Warum ist das wichtig? Wer sind die Stakeholder?</a:t>
+            </a:r>
+          </a:p>
+          <a:p>
+            <a:pPr/>
+            <a:r>
+              <a:t>Phase 2: Fachliche Lösung entwerfen</a:t>
+            </a:r>
+          </a:p>
+          <a:p>
+            <a:pPr/>
+            <a:r>
+              <a:t>Welche fachlichen Bereiche gibt es? Wo sind die Grenzen? Wie kommunizieren sie?</a:t>
+            </a:r>
+          </a:p>
+          <a:p>
+            <a:pPr/>
+            <a:r>
+              <a:t>Phase 3: Technologie auswählen</a:t>
+            </a:r>
+          </a:p>
+          <a:p>
+            <a:pPr/>
+            <a:r>
+              <a:t>Womit implementieren wir das am besten? Was löst unsere spezifischen Probleme?</a:t>
             </a:r>
           </a:p>
         </p:txBody>
@@ -7553,7 +7746,7 @@
           <a:lstStyle/>
           <a:p>
             <a:r>
-              <a:t>Das häufigste Anti-Pattern: Technology-First</a:t>
+              <a:t>Design Patterns Motivation</a:t>
             </a:r>
           </a:p>
         </p:txBody>
@@ -7572,19 +7765,41 @@
         <p:txBody>
           <a:bodyPr/>
           <a:lstStyle/>
-          <a:p>
-            <a:r>
-              <a:t>"Wir nutzen jetzt Microservices!" - Aber warum?</a:t>
-            </a:r>
-          </a:p>
-          <a:p>
-            <a:r>
-              <a:t>"Lass uns auf Kubernetes umsteigen!" - Aber welches Problem löst das?</a:t>
-            </a:r>
-          </a:p>
-          <a:p>
-            <a:r>
-              <a:t>"NoSQL ist modern, weg mit der relationalen DB!" - Aber was sind unsere Datenanforderungen?</a:t>
+          <a:p/>
+          <a:p>
+            <a:pPr/>
+            <a:r>
+              <a:t>Geschichte: Warum entstanden Design Patterns?</a:t>
+            </a:r>
+          </a:p>
+          <a:p>
+            <a:pPr/>
+            <a:r>
+              <a:t>Christopher Alexander (1977): "A Pattern Language" - Gebäude-Architektur!</a:t>
+            </a:r>
+          </a:p>
+          <a:p>
+            <a:pPr/>
+            <a:r>
+              <a:t>Gang of Four (1994): Übertragung auf Software</a:t>
+            </a:r>
+          </a:p>
+          <a:p>
+            <a:pPr/>
+            <a:r>
+              <a:t>Problem 1: Wiederkehrende Design-Probleme</a:t>
+            </a:r>
+          </a:p>
+          <a:p>
+            <a:pPr/>
+            <a:r>
+              <a:t>Problem 2: Schlechte Kommunikation zwischen Entwicklern</a:t>
+            </a:r>
+          </a:p>
+          <a:p>
+            <a:pPr/>
+            <a:r>
+              <a:t>Problem 3: Fehlende Best Practices</a:t>
             </a:r>
           </a:p>
         </p:txBody>
@@ -7623,7 +7838,7 @@
           <a:lstStyle/>
           <a:p>
             <a:r>
-              <a:t>Technology-First Beispiele</a:t>
+              <a:t>Warum Design Patterns?</a:t>
             </a:r>
           </a:p>
         </p:txBody>
@@ -7635,67 +7850,42 @@
             <a:spLocks noGrp="1"/>
           </p:cNvSpPr>
           <p:nvPr>
-            <p:ph idx="1" sz="half"/>
+            <p:ph idx="1"/>
           </p:nvPr>
         </p:nvSpPr>
         <p:spPr/>
         <p:txBody>
           <a:bodyPr/>
           <a:lstStyle/>
-          <a:p>
-            <a:r>
-              <a:t>Der Microservices-Hype:</a:t>
-            </a:r>
-          </a:p>
-          <a:p>
-            <a:r>
-              <a:t>Problem: Monolith funktioniert gut, aber "Microservices sind modern"</a:t>
-            </a:r>
-          </a:p>
-          <a:p>
-            <a:r>
-              <a:t>Entscheidung: Monolith in 20+ Services aufteilen</a:t>
-            </a:r>
-          </a:p>
-          <a:p>
-            <a:r>
-              <a:t>Ergebnis: 3x höhere Komplexität, Latenz-Probleme, Debugging-Albtraum</a:t>
-            </a:r>
-          </a:p>
-        </p:txBody>
-      </p:sp>
-      <p:sp>
-        <p:nvSpPr>
-          <p:cNvPr id="4" name="Content Placeholder 3"/>
-          <p:cNvSpPr>
-            <a:spLocks noGrp="1"/>
-          </p:cNvSpPr>
-          <p:nvPr>
-            <p:ph idx="2" sz="half"/>
-          </p:nvPr>
-        </p:nvSpPr>
-        <p:spPr/>
-        <p:txBody>
-          <a:bodyPr/>
-          <a:lstStyle/>
-          <a:p>
-            <a:r>
-              <a:t>Die NoSQL-Modernisierung:</a:t>
-            </a:r>
-          </a:p>
-          <a:p>
-            <a:r>
-              <a:t>Problem: Bewährte relationale DB für Finanzdaten</a:t>
-            </a:r>
-          </a:p>
-          <a:p>
-            <a:r>
-              <a:t>Entscheidung: Migration auf Document-Database</a:t>
-            </a:r>
-          </a:p>
-          <a:p>
-            <a:r>
-              <a:t>Ergebnis: Datenkonsistenz-Probleme, Migration zurück nach 18 Monaten</a:t>
+          <a:p/>
+          <a:p>
+            <a:pPr/>
+            <a:r>
+              <a:t>Vier Hauptvorteile</a:t>
+            </a:r>
+          </a:p>
+          <a:p>
+            <a:pPr/>
+            <a:r>
+              <a:t>Bewährte Lösungen nutzen: Anstatt Rad neu erfinden</a:t>
+            </a:r>
+          </a:p>
+          <a:p>
+            <a:pPr/>
+            <a:r>
+              <a:t>Gemeinsame Sprache entwickeln: Vokabular für Teams</a:t>
+            </a:r>
+          </a:p>
+          <a:p>
+            <a:pPr/>
+            <a:r>
+              <a:t>Design-Qualität verbessern: SOLID-Prinzipien kodifiziert</a:t>
+            </a:r>
+          </a:p>
+          <a:p>
+            <a:pPr/>
+            <a:r>
+              <a:t>Wartbarkeit erhöhen: Bekannte Patterns sind verständlicher</a:t>
             </a:r>
           </a:p>
         </p:txBody>
@@ -7734,7 +7924,7 @@
           <a:lstStyle/>
           <a:p>
             <a:r>
-              <a:t>Domain-Driven Design: Fachlichkeit First - Die richtige Reihenfolge</a:t>
+              <a:t>Patterns sind NICHT...</a:t>
             </a:r>
           </a:p>
         </p:txBody>
@@ -7753,19 +7943,59 @@
         <p:txBody>
           <a:bodyPr/>
           <a:lstStyle/>
-          <a:p>
-            <a:r>
-              <a:t>1. Fachlichkeit verstehen: Geschäftsproblem, Arbeitsprozesse, Regeln, echte Anforderungen</a:t>
-            </a:r>
-          </a:p>
-          <a:p>
-            <a:r>
-              <a:t>2. Fachliche Architektur entwerfen: Domains, Bounded Contexts, fachliche Services, Geschäftslogik-Modellierung</a:t>
-            </a:r>
-          </a:p>
-          <a:p>
-            <a:r>
-              <a:t>3. Technologie auswählen: Was unterstützt unser fachliches Modell am besten?</a:t>
+          <a:p/>
+          <a:p>
+            <a:pPr/>
+            <a:r>
+              <a:t>Pattern-Missbrauch vermeiden</a:t>
+            </a:r>
+          </a:p>
+          <a:p>
+            <a:pPr/>
+            <a:r>
+              <a:t>Silberkugeln: Patterns lösen nicht alle Probleme</a:t>
+            </a:r>
+          </a:p>
+          <a:p>
+            <a:pPr/>
+            <a:r>
+              <a:t>Dogmen: Patterns müssen nicht sklavisch befolgt werden</a:t>
+            </a:r>
+          </a:p>
+          <a:p>
+            <a:pPr/>
+            <a:r>
+              <a:t>Komplexität um der Komplexität willen</a:t>
+            </a:r>
+          </a:p>
+          <a:p>
+            <a:pPr/>
+            <a:r>
+              <a:t>Copy-Paste Code: Patterns sind konzeptuelle Lösungen</a:t>
+            </a:r>
+          </a:p>
+          <a:p>
+            <a:pPr/>
+            <a:r>
+              <a:t>Anti-Beispiel aus der Praxis</a:t>
+            </a:r>
+          </a:p>
+          <a:p>
+            <a:pPr/>
+            <a:r>
+              <a:t>Problem: Einfache Konfigurationswerte lesen</a:t>
+            </a:r>
+          </a:p>
+          <a:p>
+            <a:pPr/>
+            <a:r>
+              <a:t>Overengineered: AbstractConfigurationFactoryBuilderStrategyProxy</a:t>
+            </a:r>
+          </a:p>
+          <a:p>
+            <a:pPr/>
+            <a:r>
+              <a:t>Einfach: Properties.load()</a:t>
             </a:r>
           </a:p>
         </p:txBody>
@@ -7804,7 +8034,7 @@
           <a:lstStyle/>
           <a:p>
             <a:r>
-              <a:t>Die richtige Herangehensweise - Fragen in der richtigen Reihenfolge</a:t>
+              <a:t>Refactoring Philosophie</a:t>
             </a:r>
           </a:p>
         </p:txBody>
@@ -7823,19 +8053,47 @@
         <p:txBody>
           <a:bodyPr/>
           <a:lstStyle/>
-          <a:p>
-            <a:r>
-              <a:t>Phase 1: Fachlichkeit verstehen - Was soll das System tun? Warum ist das wichtig? Wer sind die Stakeholder?</a:t>
-            </a:r>
-          </a:p>
-          <a:p>
-            <a:r>
-              <a:t>Phase 2: Fachliche Lösung entwerfen - Welche fachlichen Bereiche gibt es? Wo sind die Grenzen? Wie kommunizieren sie?</a:t>
-            </a:r>
-          </a:p>
-          <a:p>
-            <a:r>
-              <a:t>Phase 3: Technologie auswählen - Womit implementieren wir das am besten? Was löst unsere spezifischen Probleme?</a:t>
+          <a:p/>
+          <a:p>
+            <a:pPr/>
+            <a:r>
+              <a:t>Was ist Refactoring?</a:t>
+            </a:r>
+          </a:p>
+          <a:p>
+            <a:pPr/>
+            <a:r>
+              <a:t>Definition nach Martin Fowler:</a:t>
+            </a:r>
+          </a:p>
+          <a:p>
+            <a:pPr/>
+            <a:r>
+              <a:t>&gt; "Refactoring is the process of changing a software system in such a way that it does not alter the external behavior of the code yet improves its internal structure."</a:t>
+            </a:r>
+          </a:p>
+          <a:p>
+            <a:pPr/>
+            <a:r>
+              <a:t>Schlüsselelemente</a:t>
+            </a:r>
+          </a:p>
+          <a:p>
+            <a:pPr/>
+            <a:r>
+              <a:t>Verhalten bleibt gleich - Funktionalität ändert sich nicht</a:t>
+            </a:r>
+          </a:p>
+          <a:p>
+            <a:pPr/>
+            <a:r>
+              <a:t>Struktur wird besser - Code wird wartbarer</a:t>
+            </a:r>
+          </a:p>
+          <a:p>
+            <a:pPr/>
+            <a:r>
+              <a:t>Kleine Schritte - Viele kleine, sichere Änderungen</a:t>
             </a:r>
           </a:p>
         </p:txBody>
@@ -7865,7 +8123,7 @@
             <a:spLocks noGrp="1"/>
           </p:cNvSpPr>
           <p:nvPr>
-            <p:ph type="ctrTitle"/>
+            <p:ph type="title"/>
           </p:nvPr>
         </p:nvSpPr>
         <p:spPr/>
@@ -7874,28 +8132,72 @@
           <a:lstStyle/>
           <a:p>
             <a:r>
-              <a:t>Design Patterns</a:t>
-            </a:r>
-          </a:p>
-        </p:txBody>
-      </p:sp>
-      <p:sp>
-        <p:nvSpPr>
-          <p:cNvPr id="3" name="Subtitle 2"/>
-          <p:cNvSpPr>
-            <a:spLocks noGrp="1"/>
-          </p:cNvSpPr>
-          <p:nvPr>
-            <p:ph type="subTitle" idx="1"/>
+              <a:t>Die Boy Scout Rule</a:t>
+            </a:r>
+          </a:p>
+        </p:txBody>
+      </p:sp>
+      <p:sp>
+        <p:nvSpPr>
+          <p:cNvPr id="3" name="Content Placeholder 2"/>
+          <p:cNvSpPr>
+            <a:spLocks noGrp="1"/>
+          </p:cNvSpPr>
+          <p:nvPr>
+            <p:ph idx="1"/>
           </p:nvPr>
         </p:nvSpPr>
         <p:spPr/>
         <p:txBody>
           <a:bodyPr/>
           <a:lstStyle/>
-          <a:p>
-            <a:r>
-              <a:t>Motivation und Geschichte</a:t>
+          <a:p/>
+          <a:p>
+            <a:pPr/>
+            <a:r>
+              <a:t>Ursprung und Übertragung</a:t>
+            </a:r>
+          </a:p>
+          <a:p>
+            <a:pPr/>
+            <a:r>
+              <a:t>Boy Scouts of America:</a:t>
+            </a:r>
+          </a:p>
+          <a:p>
+            <a:pPr/>
+            <a:r>
+              <a:t>&gt; "Try and leave this world a little better than you found it."</a:t>
+            </a:r>
+          </a:p>
+          <a:p>
+            <a:pPr/>
+            <a:r>
+              <a:t>Uncle Bob für Software:</a:t>
+            </a:r>
+          </a:p>
+          <a:p>
+            <a:pPr/>
+            <a:r>
+              <a:t>&gt; "Always leave the campground cleaner than you found it."</a:t>
+            </a:r>
+          </a:p>
+          <a:p>
+            <a:pPr/>
+            <a:r>
+              <a:t>Praktische Anwendung</a:t>
+            </a:r>
+          </a:p>
+          <a:p>
+            <a:pPr/>
+            <a:r>
+              <a:t>Bei jedem Code-Touch: Verstehe → Verbessere → Prüfe → Committe</a:t>
+            </a:r>
+          </a:p>
+          <a:p>
+            <a:pPr/>
+            <a:r>
+              <a:t>Konkrete Aktionen: Variable umbenennen, Magic Numbers extrahieren, Long Methods aufteilen</a:t>
             </a:r>
           </a:p>
         </p:txBody>
@@ -7934,7 +8236,7 @@
           <a:lstStyle/>
           <a:p>
             <a:r>
-              <a:t>Design Patterns Motivation - Geschichte: Warum entstanden Design Patterns?</a:t>
+              <a:t>Wann refactoren?</a:t>
             </a:r>
           </a:p>
         </p:txBody>
@@ -7953,29 +8255,53 @@
         <p:txBody>
           <a:bodyPr/>
           <a:lstStyle/>
-          <a:p>
-            <a:r>
-              <a:t>Christopher Alexander (1977): "A Pattern Language" - Gebäude-Architektur!</a:t>
-            </a:r>
-          </a:p>
-          <a:p>
-            <a:r>
-              <a:t>Gang of Four (1994): Übertragung auf Software</a:t>
-            </a:r>
-          </a:p>
-          <a:p>
-            <a:r>
-              <a:t>Problem 1: Wiederkehrende Design-Probleme</a:t>
-            </a:r>
-          </a:p>
-          <a:p>
-            <a:r>
-              <a:t>Problem 2: Schlechte Kommunikation zwischen Entwicklern</a:t>
-            </a:r>
-          </a:p>
-          <a:p>
-            <a:r>
-              <a:t>Problem 3: Fehlende Best Practices</a:t>
+          <a:p/>
+          <a:p>
+            <a:pPr/>
+            <a:r>
+              <a:t>Die "Rule of Three"</a:t>
+            </a:r>
+          </a:p>
+          <a:p>
+            <a:pPr/>
+            <a:r>
+              <a:t>1. Das erste Mal - mache es einfach</a:t>
+            </a:r>
+          </a:p>
+          <a:p>
+            <a:pPr/>
+            <a:r>
+              <a:t>2. Das zweite Mal - ärgere dich über Duplikation, aber mache es trotzdem</a:t>
+            </a:r>
+          </a:p>
+          <a:p>
+            <a:pPr/>
+            <a:r>
+              <a:t>3. Das dritte Mal - refactore!</a:t>
+            </a:r>
+          </a:p>
+          <a:p>
+            <a:pPr/>
+            <a:r>
+              <a:t>Refactoring-Trigger</a:t>
+            </a:r>
+          </a:p>
+          <a:p>
+            <a:pPr/>
+            <a:r>
+              <a:t>Wenn du Code verstehen musst (vor Bug-Fix, vor Feature)</a:t>
+            </a:r>
+          </a:p>
+          <a:p>
+            <a:pPr/>
+            <a:r>
+              <a:t>Wenn du Duplikation siehst (Copy-Paste Code)</a:t>
+            </a:r>
+          </a:p>
+          <a:p>
+            <a:pPr/>
+            <a:r>
+              <a:t>Wenn Code "riecht" (Long Method, Large Class, Long Parameter List)</a:t>
             </a:r>
           </a:p>
         </p:txBody>
@@ -8014,7 +8340,7 @@
           <a:lstStyle/>
           <a:p>
             <a:r>
-              <a:t>Warum Design Patterns? - Vier Hauptvorteile</a:t>
+              <a:t>Refactoring-Sicherheitsmaßnahmen</a:t>
             </a:r>
           </a:p>
         </p:txBody>
@@ -8033,24 +8359,53 @@
         <p:txBody>
           <a:bodyPr/>
           <a:lstStyle/>
-          <a:p>
-            <a:r>
-              <a:t>Bewährte Lösungen nutzen: Anstatt Rad neu erfinden</a:t>
-            </a:r>
-          </a:p>
-          <a:p>
-            <a:r>
-              <a:t>Gemeinsame Sprache entwickeln: Vokabular für Teams</a:t>
-            </a:r>
-          </a:p>
-          <a:p>
-            <a:r>
-              <a:t>Design-Qualität verbessern: SOLID-Prinzipien kodifiziert</a:t>
-            </a:r>
-          </a:p>
-          <a:p>
-            <a:r>
-              <a:t>Wartbarkeit erhöhen: Bekannte Patterns sind verständlicher</a:t>
+          <a:p/>
+          <a:p>
+            <a:pPr/>
+            <a:r>
+              <a:t>Tests zuerst</a:t>
+            </a:r>
+          </a:p>
+          <a:p>
+            <a:pPr/>
+            <a:r>
+              <a:t>Vor Refactoring: Verstehe Verhalten, schreibe Tests, alle Tests grün</a:t>
+            </a:r>
+          </a:p>
+          <a:p>
+            <a:pPr/>
+            <a:r>
+              <a:t>Während Refactoring: Nach jedem Schritt Tests laufen lassen</a:t>
+            </a:r>
+          </a:p>
+          <a:p>
+            <a:pPr/>
+            <a:r>
+              <a:t>Nach Refactoring: Alle Tests noch grün</a:t>
+            </a:r>
+          </a:p>
+          <a:p>
+            <a:pPr/>
+            <a:r>
+              <a:t>Kleine Schritte und IDE-Unterstützung</a:t>
+            </a:r>
+          </a:p>
+          <a:p>
+            <a:pPr/>
+            <a:r>
+              <a:t>Ein Schritt nach dem anderen</a:t>
+            </a:r>
+          </a:p>
+          <a:p>
+            <a:pPr/>
+            <a:r>
+              <a:t>Extract Method, Rename Variable, Move Method</a:t>
+            </a:r>
+          </a:p>
+          <a:p>
+            <a:pPr/>
+            <a:r>
+              <a:t>IDE kann viel automatisch und sicher machen</a:t>
             </a:r>
           </a:p>
         </p:txBody>
@@ -8089,7 +8444,7 @@
           <a:lstStyle/>
           <a:p>
             <a:r>
-              <a:t>Patterns sind NICHT... - Pattern-Missbrauch vermeiden</a:t>
+              <a:t>Refactoring als Weg zu Patterns</a:t>
             </a:r>
           </a:p>
         </p:txBody>
@@ -8101,72 +8456,60 @@
             <a:spLocks noGrp="1"/>
           </p:cNvSpPr>
           <p:nvPr>
-            <p:ph idx="1" sz="half"/>
+            <p:ph idx="1"/>
           </p:nvPr>
         </p:nvSpPr>
         <p:spPr/>
         <p:txBody>
           <a:bodyPr/>
           <a:lstStyle/>
-          <a:p>
-            <a:r>
-              <a:t>Patterns sind NICHT:</a:t>
-            </a:r>
-          </a:p>
-          <a:p>
-            <a:r>
-              <a:t>Silberkugeln: Patterns lösen nicht alle Probleme</a:t>
-            </a:r>
-          </a:p>
-          <a:p>
-            <a:r>
-              <a:t>Dogmen: Patterns müssen nicht sklavisch befolgt werden</a:t>
-            </a:r>
-          </a:p>
-          <a:p>
-            <a:r>
-              <a:t>Komplexität um der Komplexität willen</a:t>
-            </a:r>
-          </a:p>
-          <a:p>
-            <a:r>
-              <a:t>Copy-Paste Code: Patterns sind konzeptuelle Lösungen</a:t>
-            </a:r>
-          </a:p>
-        </p:txBody>
-      </p:sp>
-      <p:sp>
-        <p:nvSpPr>
-          <p:cNvPr id="4" name="Content Placeholder 3"/>
-          <p:cNvSpPr>
-            <a:spLocks noGrp="1"/>
-          </p:cNvSpPr>
-          <p:nvPr>
-            <p:ph idx="2" sz="half"/>
-          </p:nvPr>
-        </p:nvSpPr>
-        <p:spPr/>
-        <p:txBody>
-          <a:bodyPr/>
-          <a:lstStyle/>
-          <a:p>
-            <a:r>
-              <a:t>Anti-Beispiel aus der Praxis:</a:t>
-            </a:r>
-          </a:p>
-          <a:p>
-            <a:r>
-              <a:t>Problem: Einfache Konfigurationswerte lesen</a:t>
-            </a:r>
-          </a:p>
-          <a:p>
-            <a:r>
-              <a:t>Overengineered: AbstractConfigurationFactoryBuilderStrategyProxy</a:t>
-            </a:r>
-          </a:p>
-          <a:p>
-            <a:r>
-              <a:t>Einfach: Properties.load()</a:t>
+          <a:p/>
+          <a:p>
+            <a:pPr/>
+            <a:r>
+              <a:t>Patterns entstehen durch Refactoring</a:t>
+            </a:r>
+          </a:p>
+          <a:p>
+            <a:pPr/>
+            <a:r>
+              <a:t>Typischer Ablauf:</a:t>
+            </a:r>
+          </a:p>
+          <a:p>
+            <a:pPr/>
+            <a:r>
+              <a:t>1. Duplikation entsteht natürlich</a:t>
+            </a:r>
+          </a:p>
+          <a:p>
+            <a:pPr/>
+            <a:r>
+              <a:t>2. Refactoring macht Gemeinsamkeiten sichtbar</a:t>
+            </a:r>
+          </a:p>
+          <a:p>
+            <a:pPr/>
+            <a:r>
+              <a:t>3. Pattern Recognition - "Das ist ein bekanntes Problem"</a:t>
+            </a:r>
+          </a:p>
+          <a:p>
+            <a:pPr/>
+            <a:r>
+              <a:t>4. Pattern Application - Bekannte Lösung anwenden</a:t>
+            </a:r>
+          </a:p>
+          <a:p>
+            <a:pPr/>
+            <a:r>
+              <a:t>Wichtige Erkenntnis</a:t>
+            </a:r>
+          </a:p>
+          <a:p>
+            <a:pPr/>
+            <a:r>
+              <a:t>Patterns werden durch Refactoring eingeführt, nicht von Anfang an geplant!</a:t>
             </a:r>
           </a:p>
         </p:txBody>
@@ -8196,7 +8539,7 @@
             <a:spLocks noGrp="1"/>
           </p:cNvSpPr>
           <p:nvPr>
-            <p:ph type="ctrTitle"/>
+            <p:ph type="title"/>
           </p:nvPr>
         </p:nvSpPr>
         <p:spPr/>
@@ -8205,28 +8548,60 @@
           <a:lstStyle/>
           <a:p>
             <a:r>
-              <a:t>Refactoring Philosophie</a:t>
-            </a:r>
-          </a:p>
-        </p:txBody>
-      </p:sp>
-      <p:sp>
-        <p:nvSpPr>
-          <p:cNvPr id="3" name="Subtitle 2"/>
-          <p:cNvSpPr>
-            <a:spLocks noGrp="1"/>
-          </p:cNvSpPr>
-          <p:nvPr>
-            <p:ph type="subTitle" idx="1"/>
+              <a:t>Workshop-Bereitschaft</a:t>
+            </a:r>
+          </a:p>
+        </p:txBody>
+      </p:sp>
+      <p:sp>
+        <p:nvSpPr>
+          <p:cNvPr id="3" name="Content Placeholder 2"/>
+          <p:cNvSpPr>
+            <a:spLocks noGrp="1"/>
+          </p:cNvSpPr>
+          <p:nvPr>
+            <p:ph idx="1"/>
           </p:nvPr>
         </p:nvSpPr>
         <p:spPr/>
         <p:txBody>
           <a:bodyPr/>
           <a:lstStyle/>
-          <a:p>
-            <a:r>
-              <a:t>Der Weg zu besserer Code-Qualität</a:t>
+          <a:p/>
+          <a:p>
+            <a:pPr/>
+            <a:r>
+              <a:t>Ihr persönliches Lernziel</a:t>
+            </a:r>
+          </a:p>
+          <a:p>
+            <a:pPr/>
+            <a:r>
+              <a:t>Frage an die Teilnehmer:</a:t>
+            </a:r>
+          </a:p>
+          <a:p>
+            <a:pPr/>
+            <a:r>
+              <a:t>&gt; "Was ist Ihr persönliches Lernziel für diese 4 Blöcke?"</a:t>
+            </a:r>
+          </a:p>
+          <a:p>
+            <a:pPr/>
+            <a:r>
+              <a:t>Zielsetzung</a:t>
+            </a:r>
+          </a:p>
+          <a:p>
+            <a:pPr/>
+            <a:r>
+              <a:t>Systematische Anwendung von Design Patterns zur Verbesserung von Code-Qualität, Wartbarkeit und Systemarchitektur in Enterprise-Umgebungen.</a:t>
+            </a:r>
+          </a:p>
+          <a:p>
+            <a:pPr/>
+            <a:r>
+              <a:t>Sind Sie bereit? Dann starten wir mit Block 1: Creational Patterns!</a:t>
             </a:r>
           </a:p>
         </p:txBody>
@@ -8265,7 +8640,7 @@
           <a:lstStyle/>
           <a:p>
             <a:r>
-              <a:t>Was werden wir in den nächsten 4 Blöcken lernen?</a:t>
+              <a:t>Block 1: Creational Patterns</a:t>
             </a:r>
           </a:p>
         </p:txBody>
@@ -8284,636 +8659,41 @@
         <p:txBody>
           <a:bodyPr/>
           <a:lstStyle/>
-          <a:p>
-            <a:r>
-              <a:t>Block 1: Creational Patterns - Flexible Objekterzeugung in Enterprise-Systemen</a:t>
-            </a:r>
-          </a:p>
-          <a:p>
-            <a:r>
-              <a:t>Block 2: Structural Patterns - Objektkomposition und Systemintegration</a:t>
-            </a:r>
-          </a:p>
-          <a:p>
-            <a:r>
-              <a:t>Block 3: Behavioral Patterns - Verhalten und Kommunikation zwischen Objekten</a:t>
-            </a:r>
-          </a:p>
-          <a:p>
-            <a:r>
-              <a:t>Block 4: Advanced Patterns - Komplexe Szenarien und Pattern-Kombinationen</a:t>
-            </a:r>
-          </a:p>
-        </p:txBody>
-      </p:sp>
-    </p:spTree>
-  </p:cSld>
-  <p:clrMapOvr>
-    <a:masterClrMapping/>
-  </p:clrMapOvr>
-</p:sld>
-</file>
-
-<file path=ppt/slides/slide30.xml><?xml version="1.0" encoding="utf-8"?>
-<p:sld xmlns:a="http://schemas.openxmlformats.org/drawingml/2006/main" xmlns:p="http://schemas.openxmlformats.org/presentationml/2006/main" xmlns:r="http://schemas.openxmlformats.org/officeDocument/2006/relationships">
-  <p:cSld>
-    <p:spTree>
-      <p:nvGrpSpPr>
-        <p:cNvPr id="1" name=""/>
-        <p:cNvGrpSpPr/>
-        <p:nvPr/>
-      </p:nvGrpSpPr>
-      <p:grpSpPr/>
-      <p:sp>
-        <p:nvSpPr>
-          <p:cNvPr id="2" name="Title 1"/>
-          <p:cNvSpPr>
-            <a:spLocks noGrp="1"/>
-          </p:cNvSpPr>
-          <p:nvPr>
-            <p:ph type="title"/>
-          </p:nvPr>
-        </p:nvSpPr>
-        <p:spPr/>
-        <p:txBody>
-          <a:bodyPr/>
-          <a:lstStyle/>
-          <a:p>
-            <a:r>
-              <a:t>Was ist Refactoring?</a:t>
-            </a:r>
-          </a:p>
-        </p:txBody>
-      </p:sp>
-      <p:sp>
-        <p:nvSpPr>
-          <p:cNvPr id="3" name="Content Placeholder 2"/>
-          <p:cNvSpPr>
-            <a:spLocks noGrp="1"/>
-          </p:cNvSpPr>
-          <p:nvPr>
-            <p:ph idx="1" sz="half"/>
-          </p:nvPr>
-        </p:nvSpPr>
-        <p:spPr/>
-        <p:txBody>
-          <a:bodyPr/>
-          <a:lstStyle/>
-          <a:p>
-            <a:r>
-              <a:t>Definition nach Martin Fowler:</a:t>
-            </a:r>
-          </a:p>
-          <a:p>
-            <a:r>
-              <a:t>"Refactoring is the process of changing a software system in such a way that it does not alter the external behavior of the code yet improves its internal structure."</a:t>
-            </a:r>
-          </a:p>
-        </p:txBody>
-      </p:sp>
-      <p:sp>
-        <p:nvSpPr>
-          <p:cNvPr id="4" name="Content Placeholder 3"/>
-          <p:cNvSpPr>
-            <a:spLocks noGrp="1"/>
-          </p:cNvSpPr>
-          <p:nvPr>
-            <p:ph idx="2" sz="half"/>
-          </p:nvPr>
-        </p:nvSpPr>
-        <p:spPr/>
-        <p:txBody>
-          <a:bodyPr/>
-          <a:lstStyle/>
-          <a:p>
-            <a:r>
-              <a:t>Schlüsselelemente:</a:t>
-            </a:r>
-          </a:p>
-          <a:p>
-            <a:r>
-              <a:t>Verhalten bleibt gleich - Funktionalität ändert sich nicht</a:t>
-            </a:r>
-          </a:p>
-          <a:p>
-            <a:r>
-              <a:t>Struktur wird besser - Code wird wartbarer</a:t>
-            </a:r>
-          </a:p>
-          <a:p>
-            <a:r>
-              <a:t>Kleine Schritte - Viele kleine, sichere Änderungen</a:t>
-            </a:r>
-          </a:p>
-        </p:txBody>
-      </p:sp>
-    </p:spTree>
-  </p:cSld>
-  <p:clrMapOvr>
-    <a:masterClrMapping/>
-  </p:clrMapOvr>
-</p:sld>
-</file>
-
-<file path=ppt/slides/slide31.xml><?xml version="1.0" encoding="utf-8"?>
-<p:sld xmlns:a="http://schemas.openxmlformats.org/drawingml/2006/main" xmlns:p="http://schemas.openxmlformats.org/presentationml/2006/main" xmlns:r="http://schemas.openxmlformats.org/officeDocument/2006/relationships">
-  <p:cSld>
-    <p:spTree>
-      <p:nvGrpSpPr>
-        <p:cNvPr id="1" name=""/>
-        <p:cNvGrpSpPr/>
-        <p:nvPr/>
-      </p:nvGrpSpPr>
-      <p:grpSpPr/>
-      <p:sp>
-        <p:nvSpPr>
-          <p:cNvPr id="2" name="Title 1"/>
-          <p:cNvSpPr>
-            <a:spLocks noGrp="1"/>
-          </p:cNvSpPr>
-          <p:nvPr>
-            <p:ph type="title"/>
-          </p:nvPr>
-        </p:nvSpPr>
-        <p:spPr/>
-        <p:txBody>
-          <a:bodyPr/>
-          <a:lstStyle/>
-          <a:p>
-            <a:r>
-              <a:t>Die Boy Scout Rule - Ursprung und Übertragung</a:t>
-            </a:r>
-          </a:p>
-        </p:txBody>
-      </p:sp>
-      <p:sp>
-        <p:nvSpPr>
-          <p:cNvPr id="3" name="Content Placeholder 2"/>
-          <p:cNvSpPr>
-            <a:spLocks noGrp="1"/>
-          </p:cNvSpPr>
-          <p:nvPr>
-            <p:ph idx="1" sz="half"/>
-          </p:nvPr>
-        </p:nvSpPr>
-        <p:spPr/>
-        <p:txBody>
-          <a:bodyPr/>
-          <a:lstStyle/>
-          <a:p>
-            <a:r>
-              <a:t>Boy Scouts of America:</a:t>
-            </a:r>
-          </a:p>
-          <a:p>
-            <a:r>
-              <a:t>"Try and leave this world a little better than you found it."</a:t>
-            </a:r>
-          </a:p>
-          <a:p>
-            <a:r>
-              <a:t>Uncle Bob für Software:</a:t>
-            </a:r>
-          </a:p>
-          <a:p>
-            <a:r>
-              <a:t>"Always leave the campground cleaner than you found it."</a:t>
-            </a:r>
-          </a:p>
-        </p:txBody>
-      </p:sp>
-      <p:sp>
-        <p:nvSpPr>
-          <p:cNvPr id="4" name="Content Placeholder 3"/>
-          <p:cNvSpPr>
-            <a:spLocks noGrp="1"/>
-          </p:cNvSpPr>
-          <p:nvPr>
-            <p:ph idx="2" sz="half"/>
-          </p:nvPr>
-        </p:nvSpPr>
-        <p:spPr/>
-        <p:txBody>
-          <a:bodyPr/>
-          <a:lstStyle/>
-          <a:p>
-            <a:r>
-              <a:t>Praktische Anwendung:</a:t>
-            </a:r>
-          </a:p>
-          <a:p>
-            <a:r>
-              <a:t>Bei jedem Code-Touch: Verstehe → Verbessere → Prüfe → Committe</a:t>
-            </a:r>
-          </a:p>
-          <a:p>
-            <a:r>
-              <a:t>Konkrete Aktionen: Variable umbenennen, Magic Numbers extrahieren, Long Methods aufteilen</a:t>
-            </a:r>
-          </a:p>
-        </p:txBody>
-      </p:sp>
-    </p:spTree>
-  </p:cSld>
-  <p:clrMapOvr>
-    <a:masterClrMapping/>
-  </p:clrMapOvr>
-</p:sld>
-</file>
-
-<file path=ppt/slides/slide32.xml><?xml version="1.0" encoding="utf-8"?>
-<p:sld xmlns:a="http://schemas.openxmlformats.org/drawingml/2006/main" xmlns:p="http://schemas.openxmlformats.org/presentationml/2006/main" xmlns:r="http://schemas.openxmlformats.org/officeDocument/2006/relationships">
-  <p:cSld>
-    <p:spTree>
-      <p:nvGrpSpPr>
-        <p:cNvPr id="1" name=""/>
-        <p:cNvGrpSpPr/>
-        <p:nvPr/>
-      </p:nvGrpSpPr>
-      <p:grpSpPr/>
-      <p:sp>
-        <p:nvSpPr>
-          <p:cNvPr id="2" name="Title 1"/>
-          <p:cNvSpPr>
-            <a:spLocks noGrp="1"/>
-          </p:cNvSpPr>
-          <p:nvPr>
-            <p:ph type="title"/>
-          </p:nvPr>
-        </p:nvSpPr>
-        <p:spPr/>
-        <p:txBody>
-          <a:bodyPr/>
-          <a:lstStyle/>
-          <a:p>
-            <a:r>
-              <a:t>Wann refactoren? - Die "Rule of Three"</a:t>
-            </a:r>
-          </a:p>
-        </p:txBody>
-      </p:sp>
-      <p:sp>
-        <p:nvSpPr>
-          <p:cNvPr id="3" name="Content Placeholder 2"/>
-          <p:cNvSpPr>
-            <a:spLocks noGrp="1"/>
-          </p:cNvSpPr>
-          <p:nvPr>
-            <p:ph idx="1" sz="half"/>
-          </p:nvPr>
-        </p:nvSpPr>
-        <p:spPr/>
-        <p:txBody>
-          <a:bodyPr/>
-          <a:lstStyle/>
-          <a:p>
-            <a:r>
-              <a:t>Die "Rule of Three":</a:t>
-            </a:r>
-          </a:p>
-          <a:p>
-            <a:r>
-              <a:t>1. Das erste Mal - mache es einfach</a:t>
-            </a:r>
-          </a:p>
-          <a:p>
-            <a:r>
-              <a:t>2. Das zweite Mal - ärgere dich über Duplikation, aber mache es trotzdem</a:t>
-            </a:r>
-          </a:p>
-          <a:p>
-            <a:r>
-              <a:t>3. Das dritte Mal - refactore!</a:t>
-            </a:r>
-          </a:p>
-        </p:txBody>
-      </p:sp>
-      <p:sp>
-        <p:nvSpPr>
-          <p:cNvPr id="4" name="Content Placeholder 3"/>
-          <p:cNvSpPr>
-            <a:spLocks noGrp="1"/>
-          </p:cNvSpPr>
-          <p:nvPr>
-            <p:ph idx="2" sz="half"/>
-          </p:nvPr>
-        </p:nvSpPr>
-        <p:spPr/>
-        <p:txBody>
-          <a:bodyPr/>
-          <a:lstStyle/>
-          <a:p>
-            <a:r>
-              <a:t>Refactoring-Trigger:</a:t>
-            </a:r>
-          </a:p>
-          <a:p>
-            <a:r>
-              <a:t>Wenn du Code verstehen musst (vor Bug-Fix, vor Feature)</a:t>
-            </a:r>
-          </a:p>
-          <a:p>
-            <a:r>
-              <a:t>Wenn du Duplikation siehst (Copy-Paste Code)</a:t>
-            </a:r>
-          </a:p>
-          <a:p>
-            <a:r>
-              <a:t>Wenn Code "riecht" (Long Method, Large Class, Long Parameter List)</a:t>
-            </a:r>
-          </a:p>
-        </p:txBody>
-      </p:sp>
-    </p:spTree>
-  </p:cSld>
-  <p:clrMapOvr>
-    <a:masterClrMapping/>
-  </p:clrMapOvr>
-</p:sld>
-</file>
-
-<file path=ppt/slides/slide33.xml><?xml version="1.0" encoding="utf-8"?>
-<p:sld xmlns:a="http://schemas.openxmlformats.org/drawingml/2006/main" xmlns:p="http://schemas.openxmlformats.org/presentationml/2006/main" xmlns:r="http://schemas.openxmlformats.org/officeDocument/2006/relationships">
-  <p:cSld>
-    <p:spTree>
-      <p:nvGrpSpPr>
-        <p:cNvPr id="1" name=""/>
-        <p:cNvGrpSpPr/>
-        <p:nvPr/>
-      </p:nvGrpSpPr>
-      <p:grpSpPr/>
-      <p:sp>
-        <p:nvSpPr>
-          <p:cNvPr id="2" name="Title 1"/>
-          <p:cNvSpPr>
-            <a:spLocks noGrp="1"/>
-          </p:cNvSpPr>
-          <p:nvPr>
-            <p:ph type="title"/>
-          </p:nvPr>
-        </p:nvSpPr>
-        <p:spPr/>
-        <p:txBody>
-          <a:bodyPr/>
-          <a:lstStyle/>
-          <a:p>
-            <a:r>
-              <a:t>Refactoring-Sicherheitsmaßnahmen</a:t>
-            </a:r>
-          </a:p>
-        </p:txBody>
-      </p:sp>
-      <p:sp>
-        <p:nvSpPr>
-          <p:cNvPr id="3" name="Content Placeholder 2"/>
-          <p:cNvSpPr>
-            <a:spLocks noGrp="1"/>
-          </p:cNvSpPr>
-          <p:nvPr>
-            <p:ph idx="1" sz="half"/>
-          </p:nvPr>
-        </p:nvSpPr>
-        <p:spPr/>
-        <p:txBody>
-          <a:bodyPr/>
-          <a:lstStyle/>
-          <a:p>
-            <a:r>
-              <a:t>Tests zuerst:</a:t>
-            </a:r>
-          </a:p>
-          <a:p>
-            <a:r>
-              <a:t>Vor Refactoring: Verstehe Verhalten, schreibe Tests, alle Tests grün</a:t>
-            </a:r>
-          </a:p>
-          <a:p>
-            <a:r>
-              <a:t>Während Refactoring: Nach jedem Schritt Tests laufen lassen</a:t>
-            </a:r>
-          </a:p>
-          <a:p>
-            <a:r>
-              <a:t>Nach Refactoring: Alle Tests noch grün</a:t>
-            </a:r>
-          </a:p>
-        </p:txBody>
-      </p:sp>
-      <p:sp>
-        <p:nvSpPr>
-          <p:cNvPr id="4" name="Content Placeholder 3"/>
-          <p:cNvSpPr>
-            <a:spLocks noGrp="1"/>
-          </p:cNvSpPr>
-          <p:nvPr>
-            <p:ph idx="2" sz="half"/>
-          </p:nvPr>
-        </p:nvSpPr>
-        <p:spPr/>
-        <p:txBody>
-          <a:bodyPr/>
-          <a:lstStyle/>
-          <a:p>
-            <a:r>
-              <a:t>Kleine Schritte und IDE-Unterstützung:</a:t>
-            </a:r>
-          </a:p>
-          <a:p>
-            <a:r>
-              <a:t>Ein Schritt nach dem anderen</a:t>
-            </a:r>
-          </a:p>
-          <a:p>
-            <a:r>
-              <a:t>Extract Method, Rename Variable, Move Method</a:t>
-            </a:r>
-          </a:p>
-          <a:p>
-            <a:r>
-              <a:t>IDE kann viel automatisch und sicher machen</a:t>
-            </a:r>
-          </a:p>
-        </p:txBody>
-      </p:sp>
-    </p:spTree>
-  </p:cSld>
-  <p:clrMapOvr>
-    <a:masterClrMapping/>
-  </p:clrMapOvr>
-</p:sld>
-</file>
-
-<file path=ppt/slides/slide34.xml><?xml version="1.0" encoding="utf-8"?>
-<p:sld xmlns:a="http://schemas.openxmlformats.org/drawingml/2006/main" xmlns:p="http://schemas.openxmlformats.org/presentationml/2006/main" xmlns:r="http://schemas.openxmlformats.org/officeDocument/2006/relationships">
-  <p:cSld>
-    <p:spTree>
-      <p:nvGrpSpPr>
-        <p:cNvPr id="1" name=""/>
-        <p:cNvGrpSpPr/>
-        <p:nvPr/>
-      </p:nvGrpSpPr>
-      <p:grpSpPr/>
-      <p:sp>
-        <p:nvSpPr>
-          <p:cNvPr id="2" name="Title 1"/>
-          <p:cNvSpPr>
-            <a:spLocks noGrp="1"/>
-          </p:cNvSpPr>
-          <p:nvPr>
-            <p:ph type="title"/>
-          </p:nvPr>
-        </p:nvSpPr>
-        <p:spPr/>
-        <p:txBody>
-          <a:bodyPr/>
-          <a:lstStyle/>
-          <a:p>
-            <a:r>
-              <a:t>Refactoring als Weg zu Patterns</a:t>
-            </a:r>
-          </a:p>
-        </p:txBody>
-      </p:sp>
-      <p:sp>
-        <p:nvSpPr>
-          <p:cNvPr id="3" name="Content Placeholder 2"/>
-          <p:cNvSpPr>
-            <a:spLocks noGrp="1"/>
-          </p:cNvSpPr>
-          <p:nvPr>
-            <p:ph idx="1" sz="half"/>
-          </p:nvPr>
-        </p:nvSpPr>
-        <p:spPr/>
-        <p:txBody>
-          <a:bodyPr/>
-          <a:lstStyle/>
-          <a:p>
-            <a:r>
-              <a:t>Typischer Ablauf:</a:t>
-            </a:r>
-          </a:p>
-          <a:p>
-            <a:r>
-              <a:t>1. Duplikation entsteht natürlich</a:t>
-            </a:r>
-          </a:p>
-          <a:p>
-            <a:r>
-              <a:t>2. Refactoring macht Gemeinsamkeiten sichtbar</a:t>
-            </a:r>
-          </a:p>
-          <a:p>
-            <a:r>
-              <a:t>3. Pattern Recognition - "Das ist ein bekanntes Problem"</a:t>
-            </a:r>
-          </a:p>
-          <a:p>
-            <a:r>
-              <a:t>4. Pattern Application - Bekannte Lösung anwenden</a:t>
-            </a:r>
-          </a:p>
-        </p:txBody>
-      </p:sp>
-      <p:sp>
-        <p:nvSpPr>
-          <p:cNvPr id="4" name="Content Placeholder 3"/>
-          <p:cNvSpPr>
-            <a:spLocks noGrp="1"/>
-          </p:cNvSpPr>
-          <p:nvPr>
-            <p:ph idx="2" sz="half"/>
-          </p:nvPr>
-        </p:nvSpPr>
-        <p:spPr/>
-        <p:txBody>
-          <a:bodyPr/>
-          <a:lstStyle/>
-          <a:p>
-            <a:r>
-              <a:t>Wichtige Erkenntnis:</a:t>
-            </a:r>
-          </a:p>
-          <a:p>
-            <a:r>
-              <a:t>Patterns werden durch Refactoring eingeführt, nicht von Anfang an geplant!</a:t>
-            </a:r>
-          </a:p>
-        </p:txBody>
-      </p:sp>
-    </p:spTree>
-  </p:cSld>
-  <p:clrMapOvr>
-    <a:masterClrMapping/>
-  </p:clrMapOvr>
-</p:sld>
-</file>
-
-<file path=ppt/slides/slide35.xml><?xml version="1.0" encoding="utf-8"?>
-<p:sld xmlns:a="http://schemas.openxmlformats.org/drawingml/2006/main" xmlns:p="http://schemas.openxmlformats.org/presentationml/2006/main" xmlns:r="http://schemas.openxmlformats.org/officeDocument/2006/relationships">
-  <p:cSld>
-    <p:spTree>
-      <p:nvGrpSpPr>
-        <p:cNvPr id="1" name=""/>
-        <p:cNvGrpSpPr/>
-        <p:nvPr/>
-      </p:nvGrpSpPr>
-      <p:grpSpPr/>
-      <p:sp>
-        <p:nvSpPr>
-          <p:cNvPr id="2" name="Title 1"/>
-          <p:cNvSpPr>
-            <a:spLocks noGrp="1"/>
-          </p:cNvSpPr>
-          <p:nvPr>
-            <p:ph type="title"/>
-          </p:nvPr>
-        </p:nvSpPr>
-        <p:spPr/>
-        <p:txBody>
-          <a:bodyPr/>
-          <a:lstStyle/>
-          <a:p>
-            <a:r>
-              <a:t>Workshop-Bereitschaft - Ihr persönliches Lernziel</a:t>
-            </a:r>
-          </a:p>
-        </p:txBody>
-      </p:sp>
-      <p:sp>
-        <p:nvSpPr>
-          <p:cNvPr id="3" name="Content Placeholder 2"/>
-          <p:cNvSpPr>
-            <a:spLocks noGrp="1"/>
-          </p:cNvSpPr>
-          <p:nvPr>
-            <p:ph idx="1"/>
-          </p:nvPr>
-        </p:nvSpPr>
-        <p:spPr/>
-        <p:txBody>
-          <a:bodyPr/>
-          <a:lstStyle/>
-          <a:p>
-            <a:r>
-              <a:t>Frage an die Teilnehmer:</a:t>
-            </a:r>
-          </a:p>
-          <a:p>
-            <a:r>
-              <a:t>"Was ist Ihr persönliches Lernziel für diese 4 Blöcke?"</a:t>
-            </a:r>
-          </a:p>
           <a:p/>
           <a:p>
-            <a:r>
-              <a:t>Zielsetzung: Systematische Anwendung von Design Patterns zur Verbesserung von Code-Qualität, Wartbarkeit und Systemarchitektur in Enterprise-Umgebungen.</a:t>
-            </a:r>
-          </a:p>
-          <a:p/>
-          <a:p>
-            <a:r>
-              <a:t>Sind Sie bereit? Dann starten wir mit Block 1: Creational Patterns!</a:t>
+            <a:pPr/>
+            <a:r>
+              <a:t>Schwerpunkt: Objekterzeugung</a:t>
+            </a:r>
+          </a:p>
+          <a:p>
+            <a:pPr/>
+            <a:r>
+              <a:t>Factory Method: Objekterzeugung ohne konkrete Klassen</a:t>
+            </a:r>
+          </a:p>
+          <a:p>
+            <a:pPr/>
+            <a:r>
+              <a:t>Abstract Factory: Familien verwandter Objekte</a:t>
+            </a:r>
+          </a:p>
+          <a:p>
+            <a:pPr/>
+            <a:r>
+              <a:t>Builder: Komplexe Objekte Schritt für Schritt aufbauen</a:t>
+            </a:r>
+          </a:p>
+          <a:p>
+            <a:pPr/>
+            <a:r>
+              <a:t>Prototype: Objektklonierung für kostspielige Initialisierung</a:t>
+            </a:r>
+          </a:p>
+          <a:p>
+            <a:pPr/>
+            <a:r>
+              <a:t>Singleton: Eine Instanz für das ganze System</a:t>
             </a:r>
           </a:p>
         </p:txBody>
@@ -8952,7 +8732,7 @@
           <a:lstStyle/>
           <a:p>
             <a:r>
-              <a:t>Block 1: Creational Patterns - Schwerpunkt: Objekterzeugung</a:t>
+              <a:t>Block 2: Structural Patterns</a:t>
             </a:r>
           </a:p>
         </p:txBody>
@@ -8971,29 +8751,35 @@
         <p:txBody>
           <a:bodyPr/>
           <a:lstStyle/>
-          <a:p>
-            <a:r>
-              <a:t>Factory Method: Objekterzeugung ohne konkrete Klassen</a:t>
-            </a:r>
-          </a:p>
-          <a:p>
-            <a:r>
-              <a:t>Abstract Factory: Familien verwandter Objekte</a:t>
-            </a:r>
-          </a:p>
-          <a:p>
-            <a:r>
-              <a:t>Builder: Komplexe Objekte Schritt für Schritt aufbauen</a:t>
-            </a:r>
-          </a:p>
-          <a:p>
-            <a:r>
-              <a:t>Prototype: Objektklonierung für kostspielige Initialisierung</a:t>
-            </a:r>
-          </a:p>
-          <a:p>
-            <a:r>
-              <a:t>Singleton: Eine Instanz für das ganze System</a:t>
+          <a:p/>
+          <a:p>
+            <a:pPr/>
+            <a:r>
+              <a:t>Schwerpunkt: Strukturelle Komposition</a:t>
+            </a:r>
+          </a:p>
+          <a:p>
+            <a:pPr/>
+            <a:r>
+              <a:t>Adapter: Inkompatible Schnittstellen verbinden</a:t>
+            </a:r>
+          </a:p>
+          <a:p>
+            <a:pPr/>
+            <a:r>
+              <a:t>Decorator: Verhalten dynamisch erweitern</a:t>
+            </a:r>
+          </a:p>
+          <a:p>
+            <a:pPr/>
+            <a:r>
+              <a:t>Facade: Komplexe Subsysteme vereinfachen</a:t>
+            </a:r>
+          </a:p>
+          <a:p>
+            <a:pPr/>
+            <a:r>
+              <a:t>Composite: Hierarchische Strukturen behandeln</a:t>
             </a:r>
           </a:p>
         </p:txBody>
@@ -9032,7 +8818,7 @@
           <a:lstStyle/>
           <a:p>
             <a:r>
-              <a:t>Block 2: Structural Patterns - Schwerpunkt: Strukturelle Komposition</a:t>
+              <a:t>Block 3: Behavioral Patterns</a:t>
             </a:r>
           </a:p>
         </p:txBody>
@@ -9051,24 +8837,35 @@
         <p:txBody>
           <a:bodyPr/>
           <a:lstStyle/>
-          <a:p>
-            <a:r>
-              <a:t>Adapter: Inkompatible Schnittstellen verbinden</a:t>
-            </a:r>
-          </a:p>
-          <a:p>
-            <a:r>
-              <a:t>Decorator: Verhalten dynamisch erweitern</a:t>
-            </a:r>
-          </a:p>
-          <a:p>
-            <a:r>
-              <a:t>Facade: Komplexe Subsysteme vereinfachen</a:t>
-            </a:r>
-          </a:p>
-          <a:p>
-            <a:r>
-              <a:t>Composite: Hierarchische Strukturen behandeln</a:t>
+          <a:p/>
+          <a:p>
+            <a:pPr/>
+            <a:r>
+              <a:t>Schwerpunkt: Verhalten und Kommunikation</a:t>
+            </a:r>
+          </a:p>
+          <a:p>
+            <a:pPr/>
+            <a:r>
+              <a:t>Observer: Ereignisse propagieren</a:t>
+            </a:r>
+          </a:p>
+          <a:p>
+            <a:pPr/>
+            <a:r>
+              <a:t>Strategy: Algorithmen austauschbar machen</a:t>
+            </a:r>
+          </a:p>
+          <a:p>
+            <a:pPr/>
+            <a:r>
+              <a:t>Command: Operationen als Objekte</a:t>
+            </a:r>
+          </a:p>
+          <a:p>
+            <a:pPr/>
+            <a:r>
+              <a:t>State: Zustandsabhängiges Verhalten</a:t>
             </a:r>
           </a:p>
         </p:txBody>
@@ -9107,7 +8904,7 @@
           <a:lstStyle/>
           <a:p>
             <a:r>
-              <a:t>Block 3: Behavioral Patterns - Schwerpunkt: Verhalten und Kommunikation</a:t>
+              <a:t>Block 4: Advanced Patterns</a:t>
             </a:r>
           </a:p>
         </p:txBody>
@@ -9126,24 +8923,41 @@
         <p:txBody>
           <a:bodyPr/>
           <a:lstStyle/>
-          <a:p>
-            <a:r>
-              <a:t>Observer: Ereignisse propagieren</a:t>
-            </a:r>
-          </a:p>
-          <a:p>
-            <a:r>
-              <a:t>Strategy: Algorithmen austauschbar machen</a:t>
-            </a:r>
-          </a:p>
-          <a:p>
-            <a:r>
-              <a:t>Command: Operationen als Objekte</a:t>
-            </a:r>
-          </a:p>
-          <a:p>
-            <a:r>
-              <a:t>State: Zustandsabhängiges Verhalten</a:t>
+          <a:p/>
+          <a:p>
+            <a:pPr/>
+            <a:r>
+              <a:t>Schwerpunkt: Komplexe Szenarien</a:t>
+            </a:r>
+          </a:p>
+          <a:p>
+            <a:pPr/>
+            <a:r>
+              <a:t>Template Method: Algorithmus-Skelett mit variablen Teilen</a:t>
+            </a:r>
+          </a:p>
+          <a:p>
+            <a:pPr/>
+            <a:r>
+              <a:t>Visitor: Operationen von Datenstruktur trennen</a:t>
+            </a:r>
+          </a:p>
+          <a:p>
+            <a:pPr/>
+            <a:r>
+              <a:t>Chain of Responsibility: Requests durch Handler-Kette</a:t>
+            </a:r>
+          </a:p>
+          <a:p>
+            <a:pPr/>
+            <a:r>
+              <a:t>Mediator: Komplexe Objekt-Interaktionen koordinieren</a:t>
+            </a:r>
+          </a:p>
+          <a:p>
+            <a:pPr/>
+            <a:r>
+              <a:t>Enterprise Patterns: Repository, Unit of Work, MVC/MVP/MVVM</a:t>
             </a:r>
           </a:p>
         </p:txBody>
@@ -9182,7 +8996,7 @@
           <a:lstStyle/>
           <a:p>
             <a:r>
-              <a:t>Block 4: Advanced Patterns - Schwerpunkt: Komplexe Szenarien</a:t>
+              <a:t>Was werden wir NICHT behandeln?</a:t>
             </a:r>
           </a:p>
         </p:txBody>
@@ -9201,29 +9015,41 @@
         <p:txBody>
           <a:bodyPr/>
           <a:lstStyle/>
-          <a:p>
-            <a:r>
-              <a:t>Template Method: Algorithmus-Skelett mit variablen Teilen</a:t>
-            </a:r>
-          </a:p>
-          <a:p>
-            <a:r>
-              <a:t>Visitor: Operationen von Datenstruktur trennen</a:t>
-            </a:r>
-          </a:p>
-          <a:p>
-            <a:r>
-              <a:t>Chain of Responsibility: Requests durch Handler-Kette</a:t>
-            </a:r>
-          </a:p>
-          <a:p>
-            <a:r>
-              <a:t>Mediator: Komplexe Objekt-Interaktionen koordinieren</a:t>
-            </a:r>
-          </a:p>
-          <a:p>
-            <a:r>
-              <a:t>Enterprise Patterns: Repository, Unit of Work, MVC/MVP/MVVM</a:t>
+          <a:p/>
+          <a:p>
+            <a:pPr/>
+            <a:r>
+              <a:t>Bewusst ausgeklammerte Themen</a:t>
+            </a:r>
+          </a:p>
+          <a:p>
+            <a:pPr/>
+            <a:r>
+              <a:t>Framework-spezifische Patterns (Spring, Hibernate, etc.)</a:t>
+            </a:r>
+          </a:p>
+          <a:p>
+            <a:pPr/>
+            <a:r>
+              <a:t>Architektur-Patterns (Microservices, CQRS, Event Sourcing)</a:t>
+            </a:r>
+          </a:p>
+          <a:p>
+            <a:pPr/>
+            <a:r>
+              <a:t>Concurrency-Patterns (würde eigenen Workshop füllen)</a:t>
+            </a:r>
+          </a:p>
+          <a:p>
+            <a:pPr/>
+            <a:r>
+              <a:t>Specific UI-Frameworks (Angular, React, Vue)</a:t>
+            </a:r>
+          </a:p>
+          <a:p>
+            <a:pPr/>
+            <a:r>
+              <a:t>Cloud-native Patterns (separate Workshop-Serie)</a:t>
             </a:r>
           </a:p>
         </p:txBody>
@@ -9262,7 +9088,7 @@
           <a:lstStyle/>
           <a:p>
             <a:r>
-              <a:t>Was werden wir NICHT behandeln? - Bewusst ausgeklammerte Themen</a:t>
+              <a:t>Lernziele und Kompetenzen</a:t>
             </a:r>
           </a:p>
         </p:txBody>
@@ -9281,29 +9107,41 @@
         <p:txBody>
           <a:bodyPr/>
           <a:lstStyle/>
-          <a:p>
-            <a:r>
-              <a:t>Framework-spezifische Patterns (Spring, Hibernate, etc.)</a:t>
-            </a:r>
-          </a:p>
-          <a:p>
-            <a:r>
-              <a:t>Architektur-Patterns (Microservices, CQRS, Event Sourcing)</a:t>
-            </a:r>
-          </a:p>
-          <a:p>
-            <a:r>
-              <a:t>Concurrency-Patterns (würde eigenen Workshop füllen)</a:t>
-            </a:r>
-          </a:p>
-          <a:p>
-            <a:r>
-              <a:t>Specific UI-Frameworks (Angular, React, Vue)</a:t>
-            </a:r>
-          </a:p>
-          <a:p>
-            <a:r>
-              <a:t>Cloud-native Patterns (separate Workshop-Serie)</a:t>
+          <a:p/>
+          <a:p>
+            <a:pPr/>
+            <a:r>
+              <a:t>Zentrale Problemstellungen</a:t>
+            </a:r>
+          </a:p>
+          <a:p>
+            <a:pPr/>
+            <a:r>
+              <a:t>Legacy-System Integration und Adapter-Patterns</a:t>
+            </a:r>
+          </a:p>
+          <a:p>
+            <a:pPr/>
+            <a:r>
+              <a:t>Flexible Objekterzeugung und Dependency Management</a:t>
+            </a:r>
+          </a:p>
+          <a:p>
+            <a:pPr/>
+            <a:r>
+              <a:t>Algorithmus-Variationen und Strategy-Patterns</a:t>
+            </a:r>
+          </a:p>
+          <a:p>
+            <a:pPr/>
+            <a:r>
+              <a:t>Event-basierte Kommunikation und Observer-Patterns</a:t>
+            </a:r>
+          </a:p>
+          <a:p>
+            <a:pPr/>
+            <a:r>
+              <a:t>Komplexe Objektstrukturen und Composite-Patterns</a:t>
             </a:r>
           </a:p>
         </p:txBody>
@@ -9342,7 +9180,7 @@
           <a:lstStyle/>
           <a:p>
             <a:r>
-              <a:t>Lernziele und Kompetenzen - Zentrale Problemstellungen</a:t>
+              <a:t>Praktische Organisation</a:t>
             </a:r>
           </a:p>
         </p:txBody>
@@ -9361,29 +9199,35 @@
         <p:txBody>
           <a:bodyPr/>
           <a:lstStyle/>
-          <a:p>
-            <a:r>
-              <a:t>Legacy-System Integration und Adapter-Patterns</a:t>
-            </a:r>
-          </a:p>
-          <a:p>
-            <a:r>
-              <a:t>Flexible Objekterzeugung und Dependency Management</a:t>
-            </a:r>
-          </a:p>
-          <a:p>
-            <a:r>
-              <a:t>Algorithmus-Variationen und Strategy-Patterns</a:t>
-            </a:r>
-          </a:p>
-          <a:p>
-            <a:r>
-              <a:t>Event-basierte Kommunikation und Observer-Patterns</a:t>
-            </a:r>
-          </a:p>
-          <a:p>
-            <a:r>
-              <a:t>Komplexe Objektstrukturen und Composite-Patterns</a:t>
+          <a:p/>
+          <a:p>
+            <a:pPr/>
+            <a:r>
+              <a:t>Was Sie mitbringen sollten</a:t>
+            </a:r>
+          </a:p>
+          <a:p>
+            <a:pPr/>
+            <a:r>
+              <a:t>Laptop mit Java 11+ und IDE (IntelliJ/Eclipse)</a:t>
+            </a:r>
+          </a:p>
+          <a:p>
+            <a:pPr/>
+            <a:r>
+              <a:t>Git für Code-Austausch</a:t>
+            </a:r>
+          </a:p>
+          <a:p>
+            <a:pPr/>
+            <a:r>
+              <a:t>Offenheit für neue Perspektiven</a:t>
+            </a:r>
+          </a:p>
+          <a:p>
+            <a:pPr/>
+            <a:r>
+              <a:t>Eigene Code-Beispiele (wenn möglich)</a:t>
             </a:r>
           </a:p>
         </p:txBody>

</xml_diff>